<commit_message>
[FIX] Replaced with better slides
</commit_message>
<xml_diff>
--- a/resources/sample.pptx
+++ b/resources/sample.pptx
@@ -5,19 +5,18 @@
     <p:sldMasterId id="2147483659" r:id="rId1"/>
   </p:sldMasterIdLst>
   <p:notesMasterIdLst>
-    <p:notesMasterId r:id="rId12"/>
+    <p:notesMasterId r:id="rId11"/>
   </p:notesMasterIdLst>
   <p:sldIdLst>
     <p:sldId id="265" r:id="rId2"/>
-    <p:sldId id="266" r:id="rId3"/>
-    <p:sldId id="267" r:id="rId4"/>
-    <p:sldId id="268" r:id="rId5"/>
-    <p:sldId id="269" r:id="rId6"/>
-    <p:sldId id="270" r:id="rId7"/>
-    <p:sldId id="271" r:id="rId8"/>
-    <p:sldId id="272" r:id="rId9"/>
-    <p:sldId id="273" r:id="rId10"/>
-    <p:sldId id="274" r:id="rId11"/>
+    <p:sldId id="280" r:id="rId3"/>
+    <p:sldId id="268" r:id="rId4"/>
+    <p:sldId id="278" r:id="rId5"/>
+    <p:sldId id="279" r:id="rId6"/>
+    <p:sldId id="276" r:id="rId7"/>
+    <p:sldId id="281" r:id="rId8"/>
+    <p:sldId id="275" r:id="rId9"/>
+    <p:sldId id="282" r:id="rId10"/>
   </p:sldIdLst>
   <p:sldSz cx="18288000" cy="10287000"/>
   <p:notesSz cx="6858000" cy="9144000"/>
@@ -137,7 +136,7 @@
             <a:srgbClr val="A4A3A4"/>
           </p15:clr>
         </p15:guide>
-        <p15:guide id="5" pos="1134" userDrawn="1">
+        <p15:guide id="5" pos="1133" userDrawn="1">
           <p15:clr>
             <a:srgbClr val="A4A3A4"/>
           </p15:clr>
@@ -770,311 +769,6 @@
 </p:notes>
 </file>
 
-<file path=ppt/notesSlides/notesSlide10.xml><?xml version="1.0" encoding="utf-8"?>
-<p:notes xmlns:a="http://schemas.openxmlformats.org/drawingml/2006/main" xmlns:r="http://schemas.openxmlformats.org/officeDocument/2006/relationships" xmlns:p="http://schemas.openxmlformats.org/presentationml/2006/main">
-  <p:cSld>
-    <p:spTree>
-      <p:nvGrpSpPr>
-        <p:cNvPr id="1" name=""/>
-        <p:cNvGrpSpPr/>
-        <p:nvPr/>
-      </p:nvGrpSpPr>
-      <p:grpSpPr>
-        <a:xfrm>
-          <a:off x="0" y="0"/>
-          <a:ext cx="0" cy="0"/>
-          <a:chOff x="0" y="0"/>
-          <a:chExt cx="0" cy="0"/>
-        </a:xfrm>
-      </p:grpSpPr>
-      <p:sp>
-        <p:nvSpPr>
-          <p:cNvPr id="4098" name="Slide Image Placeholder 1"/>
-          <p:cNvSpPr>
-            <a:spLocks noGrp="1" noRot="1" noChangeAspect="1" noTextEdit="1"/>
-          </p:cNvSpPr>
-          <p:nvPr>
-            <p:ph type="sldImg"/>
-          </p:nvPr>
-        </p:nvSpPr>
-        <p:spPr bwMode="auto">
-          <a:xfrm>
-            <a:off x="381000" y="685800"/>
-            <a:ext cx="6096000" cy="3429000"/>
-          </a:xfrm>
-          <a:noFill/>
-          <a:ln>
-            <a:solidFill>
-              <a:srgbClr val="000000"/>
-            </a:solidFill>
-            <a:miter lim="800000"/>
-            <a:headEnd/>
-            <a:tailEnd/>
-          </a:ln>
-          <a:extLst>
-            <a:ext uri="{909E8E84-426E-40DD-AFC4-6F175D3DCCD1}">
-              <a14:hiddenFill xmlns:a14="http://schemas.microsoft.com/office/drawing/2010/main">
-                <a:solidFill>
-                  <a:srgbClr val="FFFFFF"/>
-                </a:solidFill>
-              </a14:hiddenFill>
-            </a:ext>
-          </a:extLst>
-        </p:spPr>
-      </p:sp>
-      <p:sp>
-        <p:nvSpPr>
-          <p:cNvPr id="4099" name="Notes Placeholder 2"/>
-          <p:cNvSpPr>
-            <a:spLocks noGrp="1"/>
-          </p:cNvSpPr>
-          <p:nvPr>
-            <p:ph type="body" idx="1"/>
-          </p:nvPr>
-        </p:nvSpPr>
-        <p:spPr bwMode="auto">
-          <a:noFill/>
-          <a:extLst>
-            <a:ext uri="{909E8E84-426E-40DD-AFC4-6F175D3DCCD1}">
-              <a14:hiddenFill xmlns:a14="http://schemas.microsoft.com/office/drawing/2010/main">
-                <a:solidFill>
-                  <a:srgbClr val="FFFFFF"/>
-                </a:solidFill>
-              </a14:hiddenFill>
-            </a:ext>
-            <a:ext uri="{91240B29-F687-4F45-9708-019B960494DF}">
-              <a14:hiddenLine xmlns:a14="http://schemas.microsoft.com/office/drawing/2010/main" w="9525">
-                <a:solidFill>
-                  <a:srgbClr val="000000"/>
-                </a:solidFill>
-                <a:miter lim="800000"/>
-                <a:headEnd/>
-                <a:tailEnd/>
-              </a14:hiddenLine>
-            </a:ext>
-          </a:extLst>
-        </p:spPr>
-        <p:txBody>
-          <a:bodyPr/>
-          <a:lstStyle/>
-          <a:p>
-            <a:pPr eaLnBrk="1" hangingPunct="1">
-              <a:spcBef>
-                <a:spcPct val="0"/>
-              </a:spcBef>
-            </a:pPr>
-            <a:endParaRPr lang="en-US"/>
-          </a:p>
-        </p:txBody>
-      </p:sp>
-      <p:sp>
-        <p:nvSpPr>
-          <p:cNvPr id="4100" name="Slide Number Placeholder 3"/>
-          <p:cNvSpPr>
-            <a:spLocks noGrp="1"/>
-          </p:cNvSpPr>
-          <p:nvPr>
-            <p:ph type="sldNum" sz="quarter" idx="5"/>
-          </p:nvPr>
-        </p:nvSpPr>
-        <p:spPr bwMode="auto">
-          <a:ln>
-            <a:miter lim="800000"/>
-            <a:headEnd/>
-            <a:tailEnd/>
-          </a:ln>
-        </p:spPr>
-        <p:txBody>
-          <a:bodyPr/>
-          <a:lstStyle>
-            <a:lvl1pPr eaLnBrk="0" hangingPunct="0">
-              <a:defRPr>
-                <a:solidFill>
-                  <a:schemeClr val="tx1"/>
-                </a:solidFill>
-                <a:latin typeface="Arial" charset="0"/>
-                <a:cs typeface="Arial" charset="0"/>
-              </a:defRPr>
-            </a:lvl1pPr>
-            <a:lvl2pPr marL="742950" indent="-285750" eaLnBrk="0" hangingPunct="0">
-              <a:defRPr>
-                <a:solidFill>
-                  <a:schemeClr val="tx1"/>
-                </a:solidFill>
-                <a:latin typeface="Arial" charset="0"/>
-                <a:cs typeface="Arial" charset="0"/>
-              </a:defRPr>
-            </a:lvl2pPr>
-            <a:lvl3pPr marL="1143000" indent="-228600" eaLnBrk="0" hangingPunct="0">
-              <a:defRPr>
-                <a:solidFill>
-                  <a:schemeClr val="tx1"/>
-                </a:solidFill>
-                <a:latin typeface="Arial" charset="0"/>
-                <a:cs typeface="Arial" charset="0"/>
-              </a:defRPr>
-            </a:lvl3pPr>
-            <a:lvl4pPr marL="1600200" indent="-228600" eaLnBrk="0" hangingPunct="0">
-              <a:defRPr>
-                <a:solidFill>
-                  <a:schemeClr val="tx1"/>
-                </a:solidFill>
-                <a:latin typeface="Arial" charset="0"/>
-                <a:cs typeface="Arial" charset="0"/>
-              </a:defRPr>
-            </a:lvl4pPr>
-            <a:lvl5pPr marL="2057400" indent="-228600" eaLnBrk="0" hangingPunct="0">
-              <a:defRPr>
-                <a:solidFill>
-                  <a:schemeClr val="tx1"/>
-                </a:solidFill>
-                <a:latin typeface="Arial" charset="0"/>
-                <a:cs typeface="Arial" charset="0"/>
-              </a:defRPr>
-            </a:lvl5pPr>
-            <a:lvl6pPr marL="2514600" indent="-228600" eaLnBrk="0" fontAlgn="base" hangingPunct="0">
-              <a:spcBef>
-                <a:spcPct val="0"/>
-              </a:spcBef>
-              <a:spcAft>
-                <a:spcPct val="0"/>
-              </a:spcAft>
-              <a:defRPr>
-                <a:solidFill>
-                  <a:schemeClr val="tx1"/>
-                </a:solidFill>
-                <a:latin typeface="Arial" charset="0"/>
-                <a:cs typeface="Arial" charset="0"/>
-              </a:defRPr>
-            </a:lvl6pPr>
-            <a:lvl7pPr marL="2971800" indent="-228600" eaLnBrk="0" fontAlgn="base" hangingPunct="0">
-              <a:spcBef>
-                <a:spcPct val="0"/>
-              </a:spcBef>
-              <a:spcAft>
-                <a:spcPct val="0"/>
-              </a:spcAft>
-              <a:defRPr>
-                <a:solidFill>
-                  <a:schemeClr val="tx1"/>
-                </a:solidFill>
-                <a:latin typeface="Arial" charset="0"/>
-                <a:cs typeface="Arial" charset="0"/>
-              </a:defRPr>
-            </a:lvl7pPr>
-            <a:lvl8pPr marL="3429000" indent="-228600" eaLnBrk="0" fontAlgn="base" hangingPunct="0">
-              <a:spcBef>
-                <a:spcPct val="0"/>
-              </a:spcBef>
-              <a:spcAft>
-                <a:spcPct val="0"/>
-              </a:spcAft>
-              <a:defRPr>
-                <a:solidFill>
-                  <a:schemeClr val="tx1"/>
-                </a:solidFill>
-                <a:latin typeface="Arial" charset="0"/>
-                <a:cs typeface="Arial" charset="0"/>
-              </a:defRPr>
-            </a:lvl8pPr>
-            <a:lvl9pPr marL="3886200" indent="-228600" eaLnBrk="0" fontAlgn="base" hangingPunct="0">
-              <a:spcBef>
-                <a:spcPct val="0"/>
-              </a:spcBef>
-              <a:spcAft>
-                <a:spcPct val="0"/>
-              </a:spcAft>
-              <a:defRPr>
-                <a:solidFill>
-                  <a:schemeClr val="tx1"/>
-                </a:solidFill>
-                <a:latin typeface="Arial" charset="0"/>
-                <a:cs typeface="Arial" charset="0"/>
-              </a:defRPr>
-            </a:lvl9pPr>
-          </a:lstStyle>
-          <a:p>
-            <a:pPr marL="0" marR="0" lvl="0" indent="0" algn="r" defTabSz="914400" rtl="0" eaLnBrk="1" fontAlgn="auto" latinLnBrk="1" hangingPunct="1">
-              <a:lnSpc>
-                <a:spcPct val="100000"/>
-              </a:lnSpc>
-              <a:spcBef>
-                <a:spcPts val="0"/>
-              </a:spcBef>
-              <a:spcAft>
-                <a:spcPts val="0"/>
-              </a:spcAft>
-              <a:buClrTx/>
-              <a:buSzTx/>
-              <a:buFontTx/>
-              <a:buNone/>
-              <a:tabLst/>
-              <a:defRPr/>
-            </a:pPr>
-            <a:fld id="{E7649BAD-CB0D-4523-BB4C-E510FB45DBB8}" type="slidenum">
-              <a:rPr kumimoji="0" lang="en-AU" altLang="ko-KR" sz="1200" b="0" i="0" u="none" strike="noStrike" kern="1200" cap="none" spc="0" normalizeH="0" baseline="0" noProof="0">
-                <a:ln>
-                  <a:noFill/>
-                </a:ln>
-                <a:solidFill>
-                  <a:prstClr val="black"/>
-                </a:solidFill>
-                <a:effectLst/>
-                <a:uLnTx/>
-                <a:uFillTx/>
-                <a:latin typeface="Calibri" pitchFamily="34" charset="0"/>
-                <a:ea typeface="맑은 고딕" panose="020B0503020000020004" pitchFamily="50" charset="-127"/>
-                <a:cs typeface="Arial" charset="0"/>
-              </a:rPr>
-              <a:pPr marL="0" marR="0" lvl="0" indent="0" algn="r" defTabSz="914400" rtl="0" eaLnBrk="1" fontAlgn="auto" latinLnBrk="1" hangingPunct="1">
-                <a:lnSpc>
-                  <a:spcPct val="100000"/>
-                </a:lnSpc>
-                <a:spcBef>
-                  <a:spcPts val="0"/>
-                </a:spcBef>
-                <a:spcAft>
-                  <a:spcPts val="0"/>
-                </a:spcAft>
-                <a:buClrTx/>
-                <a:buSzTx/>
-                <a:buFontTx/>
-                <a:buNone/>
-                <a:tabLst/>
-                <a:defRPr/>
-              </a:pPr>
-              <a:t>10</a:t>
-            </a:fld>
-            <a:endParaRPr kumimoji="0" lang="en-AU" altLang="ko-KR" sz="1200" b="0" i="0" u="none" strike="noStrike" kern="1200" cap="none" spc="0" normalizeH="0" baseline="0" noProof="0">
-              <a:ln>
-                <a:noFill/>
-              </a:ln>
-              <a:solidFill>
-                <a:prstClr val="black"/>
-              </a:solidFill>
-              <a:effectLst/>
-              <a:uLnTx/>
-              <a:uFillTx/>
-              <a:latin typeface="Calibri" pitchFamily="34" charset="0"/>
-              <a:ea typeface="맑은 고딕" panose="020B0503020000020004" pitchFamily="50" charset="-127"/>
-              <a:cs typeface="Arial" charset="0"/>
-            </a:endParaRPr>
-          </a:p>
-        </p:txBody>
-      </p:sp>
-    </p:spTree>
-    <p:extLst>
-      <p:ext uri="{BB962C8B-B14F-4D97-AF65-F5344CB8AC3E}">
-        <p14:creationId xmlns:p14="http://schemas.microsoft.com/office/powerpoint/2010/main" val="2024226899"/>
-      </p:ext>
-    </p:extLst>
-  </p:cSld>
-  <p:clrMapOvr>
-    <a:masterClrMapping/>
-  </p:clrMapOvr>
-</p:notes>
-</file>
-
 <file path=ppt/notesSlides/notesSlide2.xml><?xml version="1.0" encoding="utf-8"?>
 <p:notes xmlns:a="http://schemas.openxmlformats.org/drawingml/2006/main" xmlns:r="http://schemas.openxmlformats.org/officeDocument/2006/relationships" xmlns:p="http://schemas.openxmlformats.org/presentationml/2006/main">
   <p:cSld>
@@ -1370,7 +1064,7 @@
     </p:spTree>
     <p:extLst>
       <p:ext uri="{BB962C8B-B14F-4D97-AF65-F5344CB8AC3E}">
-        <p14:creationId xmlns:p14="http://schemas.microsoft.com/office/powerpoint/2010/main" val="2134678768"/>
+        <p14:creationId xmlns:p14="http://schemas.microsoft.com/office/powerpoint/2010/main" val="622407469"/>
       </p:ext>
     </p:extLst>
   </p:cSld>
@@ -1675,7 +1369,7 @@
     </p:spTree>
     <p:extLst>
       <p:ext uri="{BB962C8B-B14F-4D97-AF65-F5344CB8AC3E}">
-        <p14:creationId xmlns:p14="http://schemas.microsoft.com/office/powerpoint/2010/main" val="2586229345"/>
+        <p14:creationId xmlns:p14="http://schemas.microsoft.com/office/powerpoint/2010/main" val="1704746766"/>
       </p:ext>
     </p:extLst>
   </p:cSld>
@@ -1980,1532 +1674,7 @@
     </p:spTree>
     <p:extLst>
       <p:ext uri="{BB962C8B-B14F-4D97-AF65-F5344CB8AC3E}">
-        <p14:creationId xmlns:p14="http://schemas.microsoft.com/office/powerpoint/2010/main" val="1704746766"/>
-      </p:ext>
-    </p:extLst>
-  </p:cSld>
-  <p:clrMapOvr>
-    <a:masterClrMapping/>
-  </p:clrMapOvr>
-</p:notes>
-</file>
-
-<file path=ppt/notesSlides/notesSlide5.xml><?xml version="1.0" encoding="utf-8"?>
-<p:notes xmlns:a="http://schemas.openxmlformats.org/drawingml/2006/main" xmlns:r="http://schemas.openxmlformats.org/officeDocument/2006/relationships" xmlns:p="http://schemas.openxmlformats.org/presentationml/2006/main">
-  <p:cSld>
-    <p:spTree>
-      <p:nvGrpSpPr>
-        <p:cNvPr id="1" name=""/>
-        <p:cNvGrpSpPr/>
-        <p:nvPr/>
-      </p:nvGrpSpPr>
-      <p:grpSpPr>
-        <a:xfrm>
-          <a:off x="0" y="0"/>
-          <a:ext cx="0" cy="0"/>
-          <a:chOff x="0" y="0"/>
-          <a:chExt cx="0" cy="0"/>
-        </a:xfrm>
-      </p:grpSpPr>
-      <p:sp>
-        <p:nvSpPr>
-          <p:cNvPr id="4098" name="Slide Image Placeholder 1"/>
-          <p:cNvSpPr>
-            <a:spLocks noGrp="1" noRot="1" noChangeAspect="1" noTextEdit="1"/>
-          </p:cNvSpPr>
-          <p:nvPr>
-            <p:ph type="sldImg"/>
-          </p:nvPr>
-        </p:nvSpPr>
-        <p:spPr bwMode="auto">
-          <a:xfrm>
-            <a:off x="381000" y="685800"/>
-            <a:ext cx="6096000" cy="3429000"/>
-          </a:xfrm>
-          <a:noFill/>
-          <a:ln>
-            <a:solidFill>
-              <a:srgbClr val="000000"/>
-            </a:solidFill>
-            <a:miter lim="800000"/>
-            <a:headEnd/>
-            <a:tailEnd/>
-          </a:ln>
-          <a:extLst>
-            <a:ext uri="{909E8E84-426E-40DD-AFC4-6F175D3DCCD1}">
-              <a14:hiddenFill xmlns:a14="http://schemas.microsoft.com/office/drawing/2010/main">
-                <a:solidFill>
-                  <a:srgbClr val="FFFFFF"/>
-                </a:solidFill>
-              </a14:hiddenFill>
-            </a:ext>
-          </a:extLst>
-        </p:spPr>
-      </p:sp>
-      <p:sp>
-        <p:nvSpPr>
-          <p:cNvPr id="4099" name="Notes Placeholder 2"/>
-          <p:cNvSpPr>
-            <a:spLocks noGrp="1"/>
-          </p:cNvSpPr>
-          <p:nvPr>
-            <p:ph type="body" idx="1"/>
-          </p:nvPr>
-        </p:nvSpPr>
-        <p:spPr bwMode="auto">
-          <a:noFill/>
-          <a:extLst>
-            <a:ext uri="{909E8E84-426E-40DD-AFC4-6F175D3DCCD1}">
-              <a14:hiddenFill xmlns:a14="http://schemas.microsoft.com/office/drawing/2010/main">
-                <a:solidFill>
-                  <a:srgbClr val="FFFFFF"/>
-                </a:solidFill>
-              </a14:hiddenFill>
-            </a:ext>
-            <a:ext uri="{91240B29-F687-4F45-9708-019B960494DF}">
-              <a14:hiddenLine xmlns:a14="http://schemas.microsoft.com/office/drawing/2010/main" w="9525">
-                <a:solidFill>
-                  <a:srgbClr val="000000"/>
-                </a:solidFill>
-                <a:miter lim="800000"/>
-                <a:headEnd/>
-                <a:tailEnd/>
-              </a14:hiddenLine>
-            </a:ext>
-          </a:extLst>
-        </p:spPr>
-        <p:txBody>
-          <a:bodyPr/>
-          <a:lstStyle/>
-          <a:p>
-            <a:pPr eaLnBrk="1" hangingPunct="1">
-              <a:spcBef>
-                <a:spcPct val="0"/>
-              </a:spcBef>
-            </a:pPr>
-            <a:endParaRPr lang="en-US"/>
-          </a:p>
-        </p:txBody>
-      </p:sp>
-      <p:sp>
-        <p:nvSpPr>
-          <p:cNvPr id="4100" name="Slide Number Placeholder 3"/>
-          <p:cNvSpPr>
-            <a:spLocks noGrp="1"/>
-          </p:cNvSpPr>
-          <p:nvPr>
-            <p:ph type="sldNum" sz="quarter" idx="5"/>
-          </p:nvPr>
-        </p:nvSpPr>
-        <p:spPr bwMode="auto">
-          <a:ln>
-            <a:miter lim="800000"/>
-            <a:headEnd/>
-            <a:tailEnd/>
-          </a:ln>
-        </p:spPr>
-        <p:txBody>
-          <a:bodyPr/>
-          <a:lstStyle>
-            <a:lvl1pPr eaLnBrk="0" hangingPunct="0">
-              <a:defRPr>
-                <a:solidFill>
-                  <a:schemeClr val="tx1"/>
-                </a:solidFill>
-                <a:latin typeface="Arial" charset="0"/>
-                <a:cs typeface="Arial" charset="0"/>
-              </a:defRPr>
-            </a:lvl1pPr>
-            <a:lvl2pPr marL="742950" indent="-285750" eaLnBrk="0" hangingPunct="0">
-              <a:defRPr>
-                <a:solidFill>
-                  <a:schemeClr val="tx1"/>
-                </a:solidFill>
-                <a:latin typeface="Arial" charset="0"/>
-                <a:cs typeface="Arial" charset="0"/>
-              </a:defRPr>
-            </a:lvl2pPr>
-            <a:lvl3pPr marL="1143000" indent="-228600" eaLnBrk="0" hangingPunct="0">
-              <a:defRPr>
-                <a:solidFill>
-                  <a:schemeClr val="tx1"/>
-                </a:solidFill>
-                <a:latin typeface="Arial" charset="0"/>
-                <a:cs typeface="Arial" charset="0"/>
-              </a:defRPr>
-            </a:lvl3pPr>
-            <a:lvl4pPr marL="1600200" indent="-228600" eaLnBrk="0" hangingPunct="0">
-              <a:defRPr>
-                <a:solidFill>
-                  <a:schemeClr val="tx1"/>
-                </a:solidFill>
-                <a:latin typeface="Arial" charset="0"/>
-                <a:cs typeface="Arial" charset="0"/>
-              </a:defRPr>
-            </a:lvl4pPr>
-            <a:lvl5pPr marL="2057400" indent="-228600" eaLnBrk="0" hangingPunct="0">
-              <a:defRPr>
-                <a:solidFill>
-                  <a:schemeClr val="tx1"/>
-                </a:solidFill>
-                <a:latin typeface="Arial" charset="0"/>
-                <a:cs typeface="Arial" charset="0"/>
-              </a:defRPr>
-            </a:lvl5pPr>
-            <a:lvl6pPr marL="2514600" indent="-228600" eaLnBrk="0" fontAlgn="base" hangingPunct="0">
-              <a:spcBef>
-                <a:spcPct val="0"/>
-              </a:spcBef>
-              <a:spcAft>
-                <a:spcPct val="0"/>
-              </a:spcAft>
-              <a:defRPr>
-                <a:solidFill>
-                  <a:schemeClr val="tx1"/>
-                </a:solidFill>
-                <a:latin typeface="Arial" charset="0"/>
-                <a:cs typeface="Arial" charset="0"/>
-              </a:defRPr>
-            </a:lvl6pPr>
-            <a:lvl7pPr marL="2971800" indent="-228600" eaLnBrk="0" fontAlgn="base" hangingPunct="0">
-              <a:spcBef>
-                <a:spcPct val="0"/>
-              </a:spcBef>
-              <a:spcAft>
-                <a:spcPct val="0"/>
-              </a:spcAft>
-              <a:defRPr>
-                <a:solidFill>
-                  <a:schemeClr val="tx1"/>
-                </a:solidFill>
-                <a:latin typeface="Arial" charset="0"/>
-                <a:cs typeface="Arial" charset="0"/>
-              </a:defRPr>
-            </a:lvl7pPr>
-            <a:lvl8pPr marL="3429000" indent="-228600" eaLnBrk="0" fontAlgn="base" hangingPunct="0">
-              <a:spcBef>
-                <a:spcPct val="0"/>
-              </a:spcBef>
-              <a:spcAft>
-                <a:spcPct val="0"/>
-              </a:spcAft>
-              <a:defRPr>
-                <a:solidFill>
-                  <a:schemeClr val="tx1"/>
-                </a:solidFill>
-                <a:latin typeface="Arial" charset="0"/>
-                <a:cs typeface="Arial" charset="0"/>
-              </a:defRPr>
-            </a:lvl8pPr>
-            <a:lvl9pPr marL="3886200" indent="-228600" eaLnBrk="0" fontAlgn="base" hangingPunct="0">
-              <a:spcBef>
-                <a:spcPct val="0"/>
-              </a:spcBef>
-              <a:spcAft>
-                <a:spcPct val="0"/>
-              </a:spcAft>
-              <a:defRPr>
-                <a:solidFill>
-                  <a:schemeClr val="tx1"/>
-                </a:solidFill>
-                <a:latin typeface="Arial" charset="0"/>
-                <a:cs typeface="Arial" charset="0"/>
-              </a:defRPr>
-            </a:lvl9pPr>
-          </a:lstStyle>
-          <a:p>
-            <a:pPr marL="0" marR="0" lvl="0" indent="0" algn="r" defTabSz="914400" rtl="0" eaLnBrk="1" fontAlgn="auto" latinLnBrk="1" hangingPunct="1">
-              <a:lnSpc>
-                <a:spcPct val="100000"/>
-              </a:lnSpc>
-              <a:spcBef>
-                <a:spcPts val="0"/>
-              </a:spcBef>
-              <a:spcAft>
-                <a:spcPts val="0"/>
-              </a:spcAft>
-              <a:buClrTx/>
-              <a:buSzTx/>
-              <a:buFontTx/>
-              <a:buNone/>
-              <a:tabLst/>
-              <a:defRPr/>
-            </a:pPr>
-            <a:fld id="{E7649BAD-CB0D-4523-BB4C-E510FB45DBB8}" type="slidenum">
-              <a:rPr kumimoji="0" lang="en-AU" altLang="ko-KR" sz="1200" b="0" i="0" u="none" strike="noStrike" kern="1200" cap="none" spc="0" normalizeH="0" baseline="0" noProof="0">
-                <a:ln>
-                  <a:noFill/>
-                </a:ln>
-                <a:solidFill>
-                  <a:prstClr val="black"/>
-                </a:solidFill>
-                <a:effectLst/>
-                <a:uLnTx/>
-                <a:uFillTx/>
-                <a:latin typeface="Calibri" pitchFamily="34" charset="0"/>
-                <a:ea typeface="맑은 고딕" panose="020B0503020000020004" pitchFamily="50" charset="-127"/>
-                <a:cs typeface="Arial" charset="0"/>
-              </a:rPr>
-              <a:pPr marL="0" marR="0" lvl="0" indent="0" algn="r" defTabSz="914400" rtl="0" eaLnBrk="1" fontAlgn="auto" latinLnBrk="1" hangingPunct="1">
-                <a:lnSpc>
-                  <a:spcPct val="100000"/>
-                </a:lnSpc>
-                <a:spcBef>
-                  <a:spcPts val="0"/>
-                </a:spcBef>
-                <a:spcAft>
-                  <a:spcPts val="0"/>
-                </a:spcAft>
-                <a:buClrTx/>
-                <a:buSzTx/>
-                <a:buFontTx/>
-                <a:buNone/>
-                <a:tabLst/>
-                <a:defRPr/>
-              </a:pPr>
-              <a:t>5</a:t>
-            </a:fld>
-            <a:endParaRPr kumimoji="0" lang="en-AU" altLang="ko-KR" sz="1200" b="0" i="0" u="none" strike="noStrike" kern="1200" cap="none" spc="0" normalizeH="0" baseline="0" noProof="0">
-              <a:ln>
-                <a:noFill/>
-              </a:ln>
-              <a:solidFill>
-                <a:prstClr val="black"/>
-              </a:solidFill>
-              <a:effectLst/>
-              <a:uLnTx/>
-              <a:uFillTx/>
-              <a:latin typeface="Calibri" pitchFamily="34" charset="0"/>
-              <a:ea typeface="맑은 고딕" panose="020B0503020000020004" pitchFamily="50" charset="-127"/>
-              <a:cs typeface="Arial" charset="0"/>
-            </a:endParaRPr>
-          </a:p>
-        </p:txBody>
-      </p:sp>
-    </p:spTree>
-    <p:extLst>
-      <p:ext uri="{BB962C8B-B14F-4D97-AF65-F5344CB8AC3E}">
-        <p14:creationId xmlns:p14="http://schemas.microsoft.com/office/powerpoint/2010/main" val="974952757"/>
-      </p:ext>
-    </p:extLst>
-  </p:cSld>
-  <p:clrMapOvr>
-    <a:masterClrMapping/>
-  </p:clrMapOvr>
-</p:notes>
-</file>
-
-<file path=ppt/notesSlides/notesSlide6.xml><?xml version="1.0" encoding="utf-8"?>
-<p:notes xmlns:a="http://schemas.openxmlformats.org/drawingml/2006/main" xmlns:r="http://schemas.openxmlformats.org/officeDocument/2006/relationships" xmlns:p="http://schemas.openxmlformats.org/presentationml/2006/main">
-  <p:cSld>
-    <p:spTree>
-      <p:nvGrpSpPr>
-        <p:cNvPr id="1" name=""/>
-        <p:cNvGrpSpPr/>
-        <p:nvPr/>
-      </p:nvGrpSpPr>
-      <p:grpSpPr>
-        <a:xfrm>
-          <a:off x="0" y="0"/>
-          <a:ext cx="0" cy="0"/>
-          <a:chOff x="0" y="0"/>
-          <a:chExt cx="0" cy="0"/>
-        </a:xfrm>
-      </p:grpSpPr>
-      <p:sp>
-        <p:nvSpPr>
-          <p:cNvPr id="4098" name="Slide Image Placeholder 1"/>
-          <p:cNvSpPr>
-            <a:spLocks noGrp="1" noRot="1" noChangeAspect="1" noTextEdit="1"/>
-          </p:cNvSpPr>
-          <p:nvPr>
-            <p:ph type="sldImg"/>
-          </p:nvPr>
-        </p:nvSpPr>
-        <p:spPr bwMode="auto">
-          <a:xfrm>
-            <a:off x="381000" y="685800"/>
-            <a:ext cx="6096000" cy="3429000"/>
-          </a:xfrm>
-          <a:noFill/>
-          <a:ln>
-            <a:solidFill>
-              <a:srgbClr val="000000"/>
-            </a:solidFill>
-            <a:miter lim="800000"/>
-            <a:headEnd/>
-            <a:tailEnd/>
-          </a:ln>
-          <a:extLst>
-            <a:ext uri="{909E8E84-426E-40DD-AFC4-6F175D3DCCD1}">
-              <a14:hiddenFill xmlns:a14="http://schemas.microsoft.com/office/drawing/2010/main">
-                <a:solidFill>
-                  <a:srgbClr val="FFFFFF"/>
-                </a:solidFill>
-              </a14:hiddenFill>
-            </a:ext>
-          </a:extLst>
-        </p:spPr>
-      </p:sp>
-      <p:sp>
-        <p:nvSpPr>
-          <p:cNvPr id="4099" name="Notes Placeholder 2"/>
-          <p:cNvSpPr>
-            <a:spLocks noGrp="1"/>
-          </p:cNvSpPr>
-          <p:nvPr>
-            <p:ph type="body" idx="1"/>
-          </p:nvPr>
-        </p:nvSpPr>
-        <p:spPr bwMode="auto">
-          <a:noFill/>
-          <a:extLst>
-            <a:ext uri="{909E8E84-426E-40DD-AFC4-6F175D3DCCD1}">
-              <a14:hiddenFill xmlns:a14="http://schemas.microsoft.com/office/drawing/2010/main">
-                <a:solidFill>
-                  <a:srgbClr val="FFFFFF"/>
-                </a:solidFill>
-              </a14:hiddenFill>
-            </a:ext>
-            <a:ext uri="{91240B29-F687-4F45-9708-019B960494DF}">
-              <a14:hiddenLine xmlns:a14="http://schemas.microsoft.com/office/drawing/2010/main" w="9525">
-                <a:solidFill>
-                  <a:srgbClr val="000000"/>
-                </a:solidFill>
-                <a:miter lim="800000"/>
-                <a:headEnd/>
-                <a:tailEnd/>
-              </a14:hiddenLine>
-            </a:ext>
-          </a:extLst>
-        </p:spPr>
-        <p:txBody>
-          <a:bodyPr/>
-          <a:lstStyle/>
-          <a:p>
-            <a:pPr eaLnBrk="1" hangingPunct="1">
-              <a:spcBef>
-                <a:spcPct val="0"/>
-              </a:spcBef>
-            </a:pPr>
-            <a:endParaRPr lang="en-US"/>
-          </a:p>
-        </p:txBody>
-      </p:sp>
-      <p:sp>
-        <p:nvSpPr>
-          <p:cNvPr id="4100" name="Slide Number Placeholder 3"/>
-          <p:cNvSpPr>
-            <a:spLocks noGrp="1"/>
-          </p:cNvSpPr>
-          <p:nvPr>
-            <p:ph type="sldNum" sz="quarter" idx="5"/>
-          </p:nvPr>
-        </p:nvSpPr>
-        <p:spPr bwMode="auto">
-          <a:ln>
-            <a:miter lim="800000"/>
-            <a:headEnd/>
-            <a:tailEnd/>
-          </a:ln>
-        </p:spPr>
-        <p:txBody>
-          <a:bodyPr/>
-          <a:lstStyle>
-            <a:lvl1pPr eaLnBrk="0" hangingPunct="0">
-              <a:defRPr>
-                <a:solidFill>
-                  <a:schemeClr val="tx1"/>
-                </a:solidFill>
-                <a:latin typeface="Arial" charset="0"/>
-                <a:cs typeface="Arial" charset="0"/>
-              </a:defRPr>
-            </a:lvl1pPr>
-            <a:lvl2pPr marL="742950" indent="-285750" eaLnBrk="0" hangingPunct="0">
-              <a:defRPr>
-                <a:solidFill>
-                  <a:schemeClr val="tx1"/>
-                </a:solidFill>
-                <a:latin typeface="Arial" charset="0"/>
-                <a:cs typeface="Arial" charset="0"/>
-              </a:defRPr>
-            </a:lvl2pPr>
-            <a:lvl3pPr marL="1143000" indent="-228600" eaLnBrk="0" hangingPunct="0">
-              <a:defRPr>
-                <a:solidFill>
-                  <a:schemeClr val="tx1"/>
-                </a:solidFill>
-                <a:latin typeface="Arial" charset="0"/>
-                <a:cs typeface="Arial" charset="0"/>
-              </a:defRPr>
-            </a:lvl3pPr>
-            <a:lvl4pPr marL="1600200" indent="-228600" eaLnBrk="0" hangingPunct="0">
-              <a:defRPr>
-                <a:solidFill>
-                  <a:schemeClr val="tx1"/>
-                </a:solidFill>
-                <a:latin typeface="Arial" charset="0"/>
-                <a:cs typeface="Arial" charset="0"/>
-              </a:defRPr>
-            </a:lvl4pPr>
-            <a:lvl5pPr marL="2057400" indent="-228600" eaLnBrk="0" hangingPunct="0">
-              <a:defRPr>
-                <a:solidFill>
-                  <a:schemeClr val="tx1"/>
-                </a:solidFill>
-                <a:latin typeface="Arial" charset="0"/>
-                <a:cs typeface="Arial" charset="0"/>
-              </a:defRPr>
-            </a:lvl5pPr>
-            <a:lvl6pPr marL="2514600" indent="-228600" eaLnBrk="0" fontAlgn="base" hangingPunct="0">
-              <a:spcBef>
-                <a:spcPct val="0"/>
-              </a:spcBef>
-              <a:spcAft>
-                <a:spcPct val="0"/>
-              </a:spcAft>
-              <a:defRPr>
-                <a:solidFill>
-                  <a:schemeClr val="tx1"/>
-                </a:solidFill>
-                <a:latin typeface="Arial" charset="0"/>
-                <a:cs typeface="Arial" charset="0"/>
-              </a:defRPr>
-            </a:lvl6pPr>
-            <a:lvl7pPr marL="2971800" indent="-228600" eaLnBrk="0" fontAlgn="base" hangingPunct="0">
-              <a:spcBef>
-                <a:spcPct val="0"/>
-              </a:spcBef>
-              <a:spcAft>
-                <a:spcPct val="0"/>
-              </a:spcAft>
-              <a:defRPr>
-                <a:solidFill>
-                  <a:schemeClr val="tx1"/>
-                </a:solidFill>
-                <a:latin typeface="Arial" charset="0"/>
-                <a:cs typeface="Arial" charset="0"/>
-              </a:defRPr>
-            </a:lvl7pPr>
-            <a:lvl8pPr marL="3429000" indent="-228600" eaLnBrk="0" fontAlgn="base" hangingPunct="0">
-              <a:spcBef>
-                <a:spcPct val="0"/>
-              </a:spcBef>
-              <a:spcAft>
-                <a:spcPct val="0"/>
-              </a:spcAft>
-              <a:defRPr>
-                <a:solidFill>
-                  <a:schemeClr val="tx1"/>
-                </a:solidFill>
-                <a:latin typeface="Arial" charset="0"/>
-                <a:cs typeface="Arial" charset="0"/>
-              </a:defRPr>
-            </a:lvl8pPr>
-            <a:lvl9pPr marL="3886200" indent="-228600" eaLnBrk="0" fontAlgn="base" hangingPunct="0">
-              <a:spcBef>
-                <a:spcPct val="0"/>
-              </a:spcBef>
-              <a:spcAft>
-                <a:spcPct val="0"/>
-              </a:spcAft>
-              <a:defRPr>
-                <a:solidFill>
-                  <a:schemeClr val="tx1"/>
-                </a:solidFill>
-                <a:latin typeface="Arial" charset="0"/>
-                <a:cs typeface="Arial" charset="0"/>
-              </a:defRPr>
-            </a:lvl9pPr>
-          </a:lstStyle>
-          <a:p>
-            <a:pPr marL="0" marR="0" lvl="0" indent="0" algn="r" defTabSz="914400" rtl="0" eaLnBrk="1" fontAlgn="auto" latinLnBrk="1" hangingPunct="1">
-              <a:lnSpc>
-                <a:spcPct val="100000"/>
-              </a:lnSpc>
-              <a:spcBef>
-                <a:spcPts val="0"/>
-              </a:spcBef>
-              <a:spcAft>
-                <a:spcPts val="0"/>
-              </a:spcAft>
-              <a:buClrTx/>
-              <a:buSzTx/>
-              <a:buFontTx/>
-              <a:buNone/>
-              <a:tabLst/>
-              <a:defRPr/>
-            </a:pPr>
-            <a:fld id="{E7649BAD-CB0D-4523-BB4C-E510FB45DBB8}" type="slidenum">
-              <a:rPr kumimoji="0" lang="en-AU" altLang="ko-KR" sz="1200" b="0" i="0" u="none" strike="noStrike" kern="1200" cap="none" spc="0" normalizeH="0" baseline="0" noProof="0">
-                <a:ln>
-                  <a:noFill/>
-                </a:ln>
-                <a:solidFill>
-                  <a:prstClr val="black"/>
-                </a:solidFill>
-                <a:effectLst/>
-                <a:uLnTx/>
-                <a:uFillTx/>
-                <a:latin typeface="Calibri" pitchFamily="34" charset="0"/>
-                <a:ea typeface="맑은 고딕" panose="020B0503020000020004" pitchFamily="50" charset="-127"/>
-                <a:cs typeface="Arial" charset="0"/>
-              </a:rPr>
-              <a:pPr marL="0" marR="0" lvl="0" indent="0" algn="r" defTabSz="914400" rtl="0" eaLnBrk="1" fontAlgn="auto" latinLnBrk="1" hangingPunct="1">
-                <a:lnSpc>
-                  <a:spcPct val="100000"/>
-                </a:lnSpc>
-                <a:spcBef>
-                  <a:spcPts val="0"/>
-                </a:spcBef>
-                <a:spcAft>
-                  <a:spcPts val="0"/>
-                </a:spcAft>
-                <a:buClrTx/>
-                <a:buSzTx/>
-                <a:buFontTx/>
-                <a:buNone/>
-                <a:tabLst/>
-                <a:defRPr/>
-              </a:pPr>
-              <a:t>6</a:t>
-            </a:fld>
-            <a:endParaRPr kumimoji="0" lang="en-AU" altLang="ko-KR" sz="1200" b="0" i="0" u="none" strike="noStrike" kern="1200" cap="none" spc="0" normalizeH="0" baseline="0" noProof="0">
-              <a:ln>
-                <a:noFill/>
-              </a:ln>
-              <a:solidFill>
-                <a:prstClr val="black"/>
-              </a:solidFill>
-              <a:effectLst/>
-              <a:uLnTx/>
-              <a:uFillTx/>
-              <a:latin typeface="Calibri" pitchFamily="34" charset="0"/>
-              <a:ea typeface="맑은 고딕" panose="020B0503020000020004" pitchFamily="50" charset="-127"/>
-              <a:cs typeface="Arial" charset="0"/>
-            </a:endParaRPr>
-          </a:p>
-        </p:txBody>
-      </p:sp>
-    </p:spTree>
-    <p:extLst>
-      <p:ext uri="{BB962C8B-B14F-4D97-AF65-F5344CB8AC3E}">
-        <p14:creationId xmlns:p14="http://schemas.microsoft.com/office/powerpoint/2010/main" val="905347448"/>
-      </p:ext>
-    </p:extLst>
-  </p:cSld>
-  <p:clrMapOvr>
-    <a:masterClrMapping/>
-  </p:clrMapOvr>
-</p:notes>
-</file>
-
-<file path=ppt/notesSlides/notesSlide7.xml><?xml version="1.0" encoding="utf-8"?>
-<p:notes xmlns:a="http://schemas.openxmlformats.org/drawingml/2006/main" xmlns:r="http://schemas.openxmlformats.org/officeDocument/2006/relationships" xmlns:p="http://schemas.openxmlformats.org/presentationml/2006/main">
-  <p:cSld>
-    <p:spTree>
-      <p:nvGrpSpPr>
-        <p:cNvPr id="1" name=""/>
-        <p:cNvGrpSpPr/>
-        <p:nvPr/>
-      </p:nvGrpSpPr>
-      <p:grpSpPr>
-        <a:xfrm>
-          <a:off x="0" y="0"/>
-          <a:ext cx="0" cy="0"/>
-          <a:chOff x="0" y="0"/>
-          <a:chExt cx="0" cy="0"/>
-        </a:xfrm>
-      </p:grpSpPr>
-      <p:sp>
-        <p:nvSpPr>
-          <p:cNvPr id="4098" name="Slide Image Placeholder 1"/>
-          <p:cNvSpPr>
-            <a:spLocks noGrp="1" noRot="1" noChangeAspect="1" noTextEdit="1"/>
-          </p:cNvSpPr>
-          <p:nvPr>
-            <p:ph type="sldImg"/>
-          </p:nvPr>
-        </p:nvSpPr>
-        <p:spPr bwMode="auto">
-          <a:xfrm>
-            <a:off x="381000" y="685800"/>
-            <a:ext cx="6096000" cy="3429000"/>
-          </a:xfrm>
-          <a:noFill/>
-          <a:ln>
-            <a:solidFill>
-              <a:srgbClr val="000000"/>
-            </a:solidFill>
-            <a:miter lim="800000"/>
-            <a:headEnd/>
-            <a:tailEnd/>
-          </a:ln>
-          <a:extLst>
-            <a:ext uri="{909E8E84-426E-40DD-AFC4-6F175D3DCCD1}">
-              <a14:hiddenFill xmlns:a14="http://schemas.microsoft.com/office/drawing/2010/main">
-                <a:solidFill>
-                  <a:srgbClr val="FFFFFF"/>
-                </a:solidFill>
-              </a14:hiddenFill>
-            </a:ext>
-          </a:extLst>
-        </p:spPr>
-      </p:sp>
-      <p:sp>
-        <p:nvSpPr>
-          <p:cNvPr id="4099" name="Notes Placeholder 2"/>
-          <p:cNvSpPr>
-            <a:spLocks noGrp="1"/>
-          </p:cNvSpPr>
-          <p:nvPr>
-            <p:ph type="body" idx="1"/>
-          </p:nvPr>
-        </p:nvSpPr>
-        <p:spPr bwMode="auto">
-          <a:noFill/>
-          <a:extLst>
-            <a:ext uri="{909E8E84-426E-40DD-AFC4-6F175D3DCCD1}">
-              <a14:hiddenFill xmlns:a14="http://schemas.microsoft.com/office/drawing/2010/main">
-                <a:solidFill>
-                  <a:srgbClr val="FFFFFF"/>
-                </a:solidFill>
-              </a14:hiddenFill>
-            </a:ext>
-            <a:ext uri="{91240B29-F687-4F45-9708-019B960494DF}">
-              <a14:hiddenLine xmlns:a14="http://schemas.microsoft.com/office/drawing/2010/main" w="9525">
-                <a:solidFill>
-                  <a:srgbClr val="000000"/>
-                </a:solidFill>
-                <a:miter lim="800000"/>
-                <a:headEnd/>
-                <a:tailEnd/>
-              </a14:hiddenLine>
-            </a:ext>
-          </a:extLst>
-        </p:spPr>
-        <p:txBody>
-          <a:bodyPr/>
-          <a:lstStyle/>
-          <a:p>
-            <a:pPr eaLnBrk="1" hangingPunct="1">
-              <a:spcBef>
-                <a:spcPct val="0"/>
-              </a:spcBef>
-            </a:pPr>
-            <a:endParaRPr lang="en-US"/>
-          </a:p>
-        </p:txBody>
-      </p:sp>
-      <p:sp>
-        <p:nvSpPr>
-          <p:cNvPr id="4100" name="Slide Number Placeholder 3"/>
-          <p:cNvSpPr>
-            <a:spLocks noGrp="1"/>
-          </p:cNvSpPr>
-          <p:nvPr>
-            <p:ph type="sldNum" sz="quarter" idx="5"/>
-          </p:nvPr>
-        </p:nvSpPr>
-        <p:spPr bwMode="auto">
-          <a:ln>
-            <a:miter lim="800000"/>
-            <a:headEnd/>
-            <a:tailEnd/>
-          </a:ln>
-        </p:spPr>
-        <p:txBody>
-          <a:bodyPr/>
-          <a:lstStyle>
-            <a:lvl1pPr eaLnBrk="0" hangingPunct="0">
-              <a:defRPr>
-                <a:solidFill>
-                  <a:schemeClr val="tx1"/>
-                </a:solidFill>
-                <a:latin typeface="Arial" charset="0"/>
-                <a:cs typeface="Arial" charset="0"/>
-              </a:defRPr>
-            </a:lvl1pPr>
-            <a:lvl2pPr marL="742950" indent="-285750" eaLnBrk="0" hangingPunct="0">
-              <a:defRPr>
-                <a:solidFill>
-                  <a:schemeClr val="tx1"/>
-                </a:solidFill>
-                <a:latin typeface="Arial" charset="0"/>
-                <a:cs typeface="Arial" charset="0"/>
-              </a:defRPr>
-            </a:lvl2pPr>
-            <a:lvl3pPr marL="1143000" indent="-228600" eaLnBrk="0" hangingPunct="0">
-              <a:defRPr>
-                <a:solidFill>
-                  <a:schemeClr val="tx1"/>
-                </a:solidFill>
-                <a:latin typeface="Arial" charset="0"/>
-                <a:cs typeface="Arial" charset="0"/>
-              </a:defRPr>
-            </a:lvl3pPr>
-            <a:lvl4pPr marL="1600200" indent="-228600" eaLnBrk="0" hangingPunct="0">
-              <a:defRPr>
-                <a:solidFill>
-                  <a:schemeClr val="tx1"/>
-                </a:solidFill>
-                <a:latin typeface="Arial" charset="0"/>
-                <a:cs typeface="Arial" charset="0"/>
-              </a:defRPr>
-            </a:lvl4pPr>
-            <a:lvl5pPr marL="2057400" indent="-228600" eaLnBrk="0" hangingPunct="0">
-              <a:defRPr>
-                <a:solidFill>
-                  <a:schemeClr val="tx1"/>
-                </a:solidFill>
-                <a:latin typeface="Arial" charset="0"/>
-                <a:cs typeface="Arial" charset="0"/>
-              </a:defRPr>
-            </a:lvl5pPr>
-            <a:lvl6pPr marL="2514600" indent="-228600" eaLnBrk="0" fontAlgn="base" hangingPunct="0">
-              <a:spcBef>
-                <a:spcPct val="0"/>
-              </a:spcBef>
-              <a:spcAft>
-                <a:spcPct val="0"/>
-              </a:spcAft>
-              <a:defRPr>
-                <a:solidFill>
-                  <a:schemeClr val="tx1"/>
-                </a:solidFill>
-                <a:latin typeface="Arial" charset="0"/>
-                <a:cs typeface="Arial" charset="0"/>
-              </a:defRPr>
-            </a:lvl6pPr>
-            <a:lvl7pPr marL="2971800" indent="-228600" eaLnBrk="0" fontAlgn="base" hangingPunct="0">
-              <a:spcBef>
-                <a:spcPct val="0"/>
-              </a:spcBef>
-              <a:spcAft>
-                <a:spcPct val="0"/>
-              </a:spcAft>
-              <a:defRPr>
-                <a:solidFill>
-                  <a:schemeClr val="tx1"/>
-                </a:solidFill>
-                <a:latin typeface="Arial" charset="0"/>
-                <a:cs typeface="Arial" charset="0"/>
-              </a:defRPr>
-            </a:lvl7pPr>
-            <a:lvl8pPr marL="3429000" indent="-228600" eaLnBrk="0" fontAlgn="base" hangingPunct="0">
-              <a:spcBef>
-                <a:spcPct val="0"/>
-              </a:spcBef>
-              <a:spcAft>
-                <a:spcPct val="0"/>
-              </a:spcAft>
-              <a:defRPr>
-                <a:solidFill>
-                  <a:schemeClr val="tx1"/>
-                </a:solidFill>
-                <a:latin typeface="Arial" charset="0"/>
-                <a:cs typeface="Arial" charset="0"/>
-              </a:defRPr>
-            </a:lvl8pPr>
-            <a:lvl9pPr marL="3886200" indent="-228600" eaLnBrk="0" fontAlgn="base" hangingPunct="0">
-              <a:spcBef>
-                <a:spcPct val="0"/>
-              </a:spcBef>
-              <a:spcAft>
-                <a:spcPct val="0"/>
-              </a:spcAft>
-              <a:defRPr>
-                <a:solidFill>
-                  <a:schemeClr val="tx1"/>
-                </a:solidFill>
-                <a:latin typeface="Arial" charset="0"/>
-                <a:cs typeface="Arial" charset="0"/>
-              </a:defRPr>
-            </a:lvl9pPr>
-          </a:lstStyle>
-          <a:p>
-            <a:pPr marL="0" marR="0" lvl="0" indent="0" algn="r" defTabSz="914400" rtl="0" eaLnBrk="1" fontAlgn="auto" latinLnBrk="1" hangingPunct="1">
-              <a:lnSpc>
-                <a:spcPct val="100000"/>
-              </a:lnSpc>
-              <a:spcBef>
-                <a:spcPts val="0"/>
-              </a:spcBef>
-              <a:spcAft>
-                <a:spcPts val="0"/>
-              </a:spcAft>
-              <a:buClrTx/>
-              <a:buSzTx/>
-              <a:buFontTx/>
-              <a:buNone/>
-              <a:tabLst/>
-              <a:defRPr/>
-            </a:pPr>
-            <a:fld id="{E7649BAD-CB0D-4523-BB4C-E510FB45DBB8}" type="slidenum">
-              <a:rPr kumimoji="0" lang="en-AU" altLang="ko-KR" sz="1200" b="0" i="0" u="none" strike="noStrike" kern="1200" cap="none" spc="0" normalizeH="0" baseline="0" noProof="0">
-                <a:ln>
-                  <a:noFill/>
-                </a:ln>
-                <a:solidFill>
-                  <a:prstClr val="black"/>
-                </a:solidFill>
-                <a:effectLst/>
-                <a:uLnTx/>
-                <a:uFillTx/>
-                <a:latin typeface="Calibri" pitchFamily="34" charset="0"/>
-                <a:ea typeface="맑은 고딕" panose="020B0503020000020004" pitchFamily="50" charset="-127"/>
-                <a:cs typeface="Arial" charset="0"/>
-              </a:rPr>
-              <a:pPr marL="0" marR="0" lvl="0" indent="0" algn="r" defTabSz="914400" rtl="0" eaLnBrk="1" fontAlgn="auto" latinLnBrk="1" hangingPunct="1">
-                <a:lnSpc>
-                  <a:spcPct val="100000"/>
-                </a:lnSpc>
-                <a:spcBef>
-                  <a:spcPts val="0"/>
-                </a:spcBef>
-                <a:spcAft>
-                  <a:spcPts val="0"/>
-                </a:spcAft>
-                <a:buClrTx/>
-                <a:buSzTx/>
-                <a:buFontTx/>
-                <a:buNone/>
-                <a:tabLst/>
-                <a:defRPr/>
-              </a:pPr>
-              <a:t>7</a:t>
-            </a:fld>
-            <a:endParaRPr kumimoji="0" lang="en-AU" altLang="ko-KR" sz="1200" b="0" i="0" u="none" strike="noStrike" kern="1200" cap="none" spc="0" normalizeH="0" baseline="0" noProof="0">
-              <a:ln>
-                <a:noFill/>
-              </a:ln>
-              <a:solidFill>
-                <a:prstClr val="black"/>
-              </a:solidFill>
-              <a:effectLst/>
-              <a:uLnTx/>
-              <a:uFillTx/>
-              <a:latin typeface="Calibri" pitchFamily="34" charset="0"/>
-              <a:ea typeface="맑은 고딕" panose="020B0503020000020004" pitchFamily="50" charset="-127"/>
-              <a:cs typeface="Arial" charset="0"/>
-            </a:endParaRPr>
-          </a:p>
-        </p:txBody>
-      </p:sp>
-    </p:spTree>
-    <p:extLst>
-      <p:ext uri="{BB962C8B-B14F-4D97-AF65-F5344CB8AC3E}">
-        <p14:creationId xmlns:p14="http://schemas.microsoft.com/office/powerpoint/2010/main" val="1907619266"/>
-      </p:ext>
-    </p:extLst>
-  </p:cSld>
-  <p:clrMapOvr>
-    <a:masterClrMapping/>
-  </p:clrMapOvr>
-</p:notes>
-</file>
-
-<file path=ppt/notesSlides/notesSlide8.xml><?xml version="1.0" encoding="utf-8"?>
-<p:notes xmlns:a="http://schemas.openxmlformats.org/drawingml/2006/main" xmlns:r="http://schemas.openxmlformats.org/officeDocument/2006/relationships" xmlns:p="http://schemas.openxmlformats.org/presentationml/2006/main">
-  <p:cSld>
-    <p:spTree>
-      <p:nvGrpSpPr>
-        <p:cNvPr id="1" name=""/>
-        <p:cNvGrpSpPr/>
-        <p:nvPr/>
-      </p:nvGrpSpPr>
-      <p:grpSpPr>
-        <a:xfrm>
-          <a:off x="0" y="0"/>
-          <a:ext cx="0" cy="0"/>
-          <a:chOff x="0" y="0"/>
-          <a:chExt cx="0" cy="0"/>
-        </a:xfrm>
-      </p:grpSpPr>
-      <p:sp>
-        <p:nvSpPr>
-          <p:cNvPr id="4098" name="Slide Image Placeholder 1"/>
-          <p:cNvSpPr>
-            <a:spLocks noGrp="1" noRot="1" noChangeAspect="1" noTextEdit="1"/>
-          </p:cNvSpPr>
-          <p:nvPr>
-            <p:ph type="sldImg"/>
-          </p:nvPr>
-        </p:nvSpPr>
-        <p:spPr bwMode="auto">
-          <a:xfrm>
-            <a:off x="381000" y="685800"/>
-            <a:ext cx="6096000" cy="3429000"/>
-          </a:xfrm>
-          <a:noFill/>
-          <a:ln>
-            <a:solidFill>
-              <a:srgbClr val="000000"/>
-            </a:solidFill>
-            <a:miter lim="800000"/>
-            <a:headEnd/>
-            <a:tailEnd/>
-          </a:ln>
-          <a:extLst>
-            <a:ext uri="{909E8E84-426E-40DD-AFC4-6F175D3DCCD1}">
-              <a14:hiddenFill xmlns:a14="http://schemas.microsoft.com/office/drawing/2010/main">
-                <a:solidFill>
-                  <a:srgbClr val="FFFFFF"/>
-                </a:solidFill>
-              </a14:hiddenFill>
-            </a:ext>
-          </a:extLst>
-        </p:spPr>
-      </p:sp>
-      <p:sp>
-        <p:nvSpPr>
-          <p:cNvPr id="4099" name="Notes Placeholder 2"/>
-          <p:cNvSpPr>
-            <a:spLocks noGrp="1"/>
-          </p:cNvSpPr>
-          <p:nvPr>
-            <p:ph type="body" idx="1"/>
-          </p:nvPr>
-        </p:nvSpPr>
-        <p:spPr bwMode="auto">
-          <a:noFill/>
-          <a:extLst>
-            <a:ext uri="{909E8E84-426E-40DD-AFC4-6F175D3DCCD1}">
-              <a14:hiddenFill xmlns:a14="http://schemas.microsoft.com/office/drawing/2010/main">
-                <a:solidFill>
-                  <a:srgbClr val="FFFFFF"/>
-                </a:solidFill>
-              </a14:hiddenFill>
-            </a:ext>
-            <a:ext uri="{91240B29-F687-4F45-9708-019B960494DF}">
-              <a14:hiddenLine xmlns:a14="http://schemas.microsoft.com/office/drawing/2010/main" w="9525">
-                <a:solidFill>
-                  <a:srgbClr val="000000"/>
-                </a:solidFill>
-                <a:miter lim="800000"/>
-                <a:headEnd/>
-                <a:tailEnd/>
-              </a14:hiddenLine>
-            </a:ext>
-          </a:extLst>
-        </p:spPr>
-        <p:txBody>
-          <a:bodyPr/>
-          <a:lstStyle/>
-          <a:p>
-            <a:pPr eaLnBrk="1" hangingPunct="1">
-              <a:spcBef>
-                <a:spcPct val="0"/>
-              </a:spcBef>
-            </a:pPr>
-            <a:endParaRPr lang="en-US"/>
-          </a:p>
-        </p:txBody>
-      </p:sp>
-      <p:sp>
-        <p:nvSpPr>
-          <p:cNvPr id="4100" name="Slide Number Placeholder 3"/>
-          <p:cNvSpPr>
-            <a:spLocks noGrp="1"/>
-          </p:cNvSpPr>
-          <p:nvPr>
-            <p:ph type="sldNum" sz="quarter" idx="5"/>
-          </p:nvPr>
-        </p:nvSpPr>
-        <p:spPr bwMode="auto">
-          <a:ln>
-            <a:miter lim="800000"/>
-            <a:headEnd/>
-            <a:tailEnd/>
-          </a:ln>
-        </p:spPr>
-        <p:txBody>
-          <a:bodyPr/>
-          <a:lstStyle>
-            <a:lvl1pPr eaLnBrk="0" hangingPunct="0">
-              <a:defRPr>
-                <a:solidFill>
-                  <a:schemeClr val="tx1"/>
-                </a:solidFill>
-                <a:latin typeface="Arial" charset="0"/>
-                <a:cs typeface="Arial" charset="0"/>
-              </a:defRPr>
-            </a:lvl1pPr>
-            <a:lvl2pPr marL="742950" indent="-285750" eaLnBrk="0" hangingPunct="0">
-              <a:defRPr>
-                <a:solidFill>
-                  <a:schemeClr val="tx1"/>
-                </a:solidFill>
-                <a:latin typeface="Arial" charset="0"/>
-                <a:cs typeface="Arial" charset="0"/>
-              </a:defRPr>
-            </a:lvl2pPr>
-            <a:lvl3pPr marL="1143000" indent="-228600" eaLnBrk="0" hangingPunct="0">
-              <a:defRPr>
-                <a:solidFill>
-                  <a:schemeClr val="tx1"/>
-                </a:solidFill>
-                <a:latin typeface="Arial" charset="0"/>
-                <a:cs typeface="Arial" charset="0"/>
-              </a:defRPr>
-            </a:lvl3pPr>
-            <a:lvl4pPr marL="1600200" indent="-228600" eaLnBrk="0" hangingPunct="0">
-              <a:defRPr>
-                <a:solidFill>
-                  <a:schemeClr val="tx1"/>
-                </a:solidFill>
-                <a:latin typeface="Arial" charset="0"/>
-                <a:cs typeface="Arial" charset="0"/>
-              </a:defRPr>
-            </a:lvl4pPr>
-            <a:lvl5pPr marL="2057400" indent="-228600" eaLnBrk="0" hangingPunct="0">
-              <a:defRPr>
-                <a:solidFill>
-                  <a:schemeClr val="tx1"/>
-                </a:solidFill>
-                <a:latin typeface="Arial" charset="0"/>
-                <a:cs typeface="Arial" charset="0"/>
-              </a:defRPr>
-            </a:lvl5pPr>
-            <a:lvl6pPr marL="2514600" indent="-228600" eaLnBrk="0" fontAlgn="base" hangingPunct="0">
-              <a:spcBef>
-                <a:spcPct val="0"/>
-              </a:spcBef>
-              <a:spcAft>
-                <a:spcPct val="0"/>
-              </a:spcAft>
-              <a:defRPr>
-                <a:solidFill>
-                  <a:schemeClr val="tx1"/>
-                </a:solidFill>
-                <a:latin typeface="Arial" charset="0"/>
-                <a:cs typeface="Arial" charset="0"/>
-              </a:defRPr>
-            </a:lvl6pPr>
-            <a:lvl7pPr marL="2971800" indent="-228600" eaLnBrk="0" fontAlgn="base" hangingPunct="0">
-              <a:spcBef>
-                <a:spcPct val="0"/>
-              </a:spcBef>
-              <a:spcAft>
-                <a:spcPct val="0"/>
-              </a:spcAft>
-              <a:defRPr>
-                <a:solidFill>
-                  <a:schemeClr val="tx1"/>
-                </a:solidFill>
-                <a:latin typeface="Arial" charset="0"/>
-                <a:cs typeface="Arial" charset="0"/>
-              </a:defRPr>
-            </a:lvl7pPr>
-            <a:lvl8pPr marL="3429000" indent="-228600" eaLnBrk="0" fontAlgn="base" hangingPunct="0">
-              <a:spcBef>
-                <a:spcPct val="0"/>
-              </a:spcBef>
-              <a:spcAft>
-                <a:spcPct val="0"/>
-              </a:spcAft>
-              <a:defRPr>
-                <a:solidFill>
-                  <a:schemeClr val="tx1"/>
-                </a:solidFill>
-                <a:latin typeface="Arial" charset="0"/>
-                <a:cs typeface="Arial" charset="0"/>
-              </a:defRPr>
-            </a:lvl8pPr>
-            <a:lvl9pPr marL="3886200" indent="-228600" eaLnBrk="0" fontAlgn="base" hangingPunct="0">
-              <a:spcBef>
-                <a:spcPct val="0"/>
-              </a:spcBef>
-              <a:spcAft>
-                <a:spcPct val="0"/>
-              </a:spcAft>
-              <a:defRPr>
-                <a:solidFill>
-                  <a:schemeClr val="tx1"/>
-                </a:solidFill>
-                <a:latin typeface="Arial" charset="0"/>
-                <a:cs typeface="Arial" charset="0"/>
-              </a:defRPr>
-            </a:lvl9pPr>
-          </a:lstStyle>
-          <a:p>
-            <a:pPr marL="0" marR="0" lvl="0" indent="0" algn="r" defTabSz="914400" rtl="0" eaLnBrk="1" fontAlgn="auto" latinLnBrk="1" hangingPunct="1">
-              <a:lnSpc>
-                <a:spcPct val="100000"/>
-              </a:lnSpc>
-              <a:spcBef>
-                <a:spcPts val="0"/>
-              </a:spcBef>
-              <a:spcAft>
-                <a:spcPts val="0"/>
-              </a:spcAft>
-              <a:buClrTx/>
-              <a:buSzTx/>
-              <a:buFontTx/>
-              <a:buNone/>
-              <a:tabLst/>
-              <a:defRPr/>
-            </a:pPr>
-            <a:fld id="{E7649BAD-CB0D-4523-BB4C-E510FB45DBB8}" type="slidenum">
-              <a:rPr kumimoji="0" lang="en-AU" altLang="ko-KR" sz="1200" b="0" i="0" u="none" strike="noStrike" kern="1200" cap="none" spc="0" normalizeH="0" baseline="0" noProof="0">
-                <a:ln>
-                  <a:noFill/>
-                </a:ln>
-                <a:solidFill>
-                  <a:prstClr val="black"/>
-                </a:solidFill>
-                <a:effectLst/>
-                <a:uLnTx/>
-                <a:uFillTx/>
-                <a:latin typeface="Calibri" pitchFamily="34" charset="0"/>
-                <a:ea typeface="맑은 고딕" panose="020B0503020000020004" pitchFamily="50" charset="-127"/>
-                <a:cs typeface="Arial" charset="0"/>
-              </a:rPr>
-              <a:pPr marL="0" marR="0" lvl="0" indent="0" algn="r" defTabSz="914400" rtl="0" eaLnBrk="1" fontAlgn="auto" latinLnBrk="1" hangingPunct="1">
-                <a:lnSpc>
-                  <a:spcPct val="100000"/>
-                </a:lnSpc>
-                <a:spcBef>
-                  <a:spcPts val="0"/>
-                </a:spcBef>
-                <a:spcAft>
-                  <a:spcPts val="0"/>
-                </a:spcAft>
-                <a:buClrTx/>
-                <a:buSzTx/>
-                <a:buFontTx/>
-                <a:buNone/>
-                <a:tabLst/>
-                <a:defRPr/>
-              </a:pPr>
-              <a:t>8</a:t>
-            </a:fld>
-            <a:endParaRPr kumimoji="0" lang="en-AU" altLang="ko-KR" sz="1200" b="0" i="0" u="none" strike="noStrike" kern="1200" cap="none" spc="0" normalizeH="0" baseline="0" noProof="0">
-              <a:ln>
-                <a:noFill/>
-              </a:ln>
-              <a:solidFill>
-                <a:prstClr val="black"/>
-              </a:solidFill>
-              <a:effectLst/>
-              <a:uLnTx/>
-              <a:uFillTx/>
-              <a:latin typeface="Calibri" pitchFamily="34" charset="0"/>
-              <a:ea typeface="맑은 고딕" panose="020B0503020000020004" pitchFamily="50" charset="-127"/>
-              <a:cs typeface="Arial" charset="0"/>
-            </a:endParaRPr>
-          </a:p>
-        </p:txBody>
-      </p:sp>
-    </p:spTree>
-    <p:extLst>
-      <p:ext uri="{BB962C8B-B14F-4D97-AF65-F5344CB8AC3E}">
-        <p14:creationId xmlns:p14="http://schemas.microsoft.com/office/powerpoint/2010/main" val="4042935839"/>
-      </p:ext>
-    </p:extLst>
-  </p:cSld>
-  <p:clrMapOvr>
-    <a:masterClrMapping/>
-  </p:clrMapOvr>
-</p:notes>
-</file>
-
-<file path=ppt/notesSlides/notesSlide9.xml><?xml version="1.0" encoding="utf-8"?>
-<p:notes xmlns:a="http://schemas.openxmlformats.org/drawingml/2006/main" xmlns:r="http://schemas.openxmlformats.org/officeDocument/2006/relationships" xmlns:p="http://schemas.openxmlformats.org/presentationml/2006/main">
-  <p:cSld>
-    <p:spTree>
-      <p:nvGrpSpPr>
-        <p:cNvPr id="1" name=""/>
-        <p:cNvGrpSpPr/>
-        <p:nvPr/>
-      </p:nvGrpSpPr>
-      <p:grpSpPr>
-        <a:xfrm>
-          <a:off x="0" y="0"/>
-          <a:ext cx="0" cy="0"/>
-          <a:chOff x="0" y="0"/>
-          <a:chExt cx="0" cy="0"/>
-        </a:xfrm>
-      </p:grpSpPr>
-      <p:sp>
-        <p:nvSpPr>
-          <p:cNvPr id="4098" name="Slide Image Placeholder 1"/>
-          <p:cNvSpPr>
-            <a:spLocks noGrp="1" noRot="1" noChangeAspect="1" noTextEdit="1"/>
-          </p:cNvSpPr>
-          <p:nvPr>
-            <p:ph type="sldImg"/>
-          </p:nvPr>
-        </p:nvSpPr>
-        <p:spPr bwMode="auto">
-          <a:xfrm>
-            <a:off x="381000" y="685800"/>
-            <a:ext cx="6096000" cy="3429000"/>
-          </a:xfrm>
-          <a:noFill/>
-          <a:ln>
-            <a:solidFill>
-              <a:srgbClr val="000000"/>
-            </a:solidFill>
-            <a:miter lim="800000"/>
-            <a:headEnd/>
-            <a:tailEnd/>
-          </a:ln>
-          <a:extLst>
-            <a:ext uri="{909E8E84-426E-40DD-AFC4-6F175D3DCCD1}">
-              <a14:hiddenFill xmlns:a14="http://schemas.microsoft.com/office/drawing/2010/main">
-                <a:solidFill>
-                  <a:srgbClr val="FFFFFF"/>
-                </a:solidFill>
-              </a14:hiddenFill>
-            </a:ext>
-          </a:extLst>
-        </p:spPr>
-      </p:sp>
-      <p:sp>
-        <p:nvSpPr>
-          <p:cNvPr id="4099" name="Notes Placeholder 2"/>
-          <p:cNvSpPr>
-            <a:spLocks noGrp="1"/>
-          </p:cNvSpPr>
-          <p:nvPr>
-            <p:ph type="body" idx="1"/>
-          </p:nvPr>
-        </p:nvSpPr>
-        <p:spPr bwMode="auto">
-          <a:noFill/>
-          <a:extLst>
-            <a:ext uri="{909E8E84-426E-40DD-AFC4-6F175D3DCCD1}">
-              <a14:hiddenFill xmlns:a14="http://schemas.microsoft.com/office/drawing/2010/main">
-                <a:solidFill>
-                  <a:srgbClr val="FFFFFF"/>
-                </a:solidFill>
-              </a14:hiddenFill>
-            </a:ext>
-            <a:ext uri="{91240B29-F687-4F45-9708-019B960494DF}">
-              <a14:hiddenLine xmlns:a14="http://schemas.microsoft.com/office/drawing/2010/main" w="9525">
-                <a:solidFill>
-                  <a:srgbClr val="000000"/>
-                </a:solidFill>
-                <a:miter lim="800000"/>
-                <a:headEnd/>
-                <a:tailEnd/>
-              </a14:hiddenLine>
-            </a:ext>
-          </a:extLst>
-        </p:spPr>
-        <p:txBody>
-          <a:bodyPr/>
-          <a:lstStyle/>
-          <a:p>
-            <a:pPr eaLnBrk="1" hangingPunct="1">
-              <a:spcBef>
-                <a:spcPct val="0"/>
-              </a:spcBef>
-            </a:pPr>
-            <a:endParaRPr lang="en-US"/>
-          </a:p>
-        </p:txBody>
-      </p:sp>
-      <p:sp>
-        <p:nvSpPr>
-          <p:cNvPr id="4100" name="Slide Number Placeholder 3"/>
-          <p:cNvSpPr>
-            <a:spLocks noGrp="1"/>
-          </p:cNvSpPr>
-          <p:nvPr>
-            <p:ph type="sldNum" sz="quarter" idx="5"/>
-          </p:nvPr>
-        </p:nvSpPr>
-        <p:spPr bwMode="auto">
-          <a:ln>
-            <a:miter lim="800000"/>
-            <a:headEnd/>
-            <a:tailEnd/>
-          </a:ln>
-        </p:spPr>
-        <p:txBody>
-          <a:bodyPr/>
-          <a:lstStyle>
-            <a:lvl1pPr eaLnBrk="0" hangingPunct="0">
-              <a:defRPr>
-                <a:solidFill>
-                  <a:schemeClr val="tx1"/>
-                </a:solidFill>
-                <a:latin typeface="Arial" charset="0"/>
-                <a:cs typeface="Arial" charset="0"/>
-              </a:defRPr>
-            </a:lvl1pPr>
-            <a:lvl2pPr marL="742950" indent="-285750" eaLnBrk="0" hangingPunct="0">
-              <a:defRPr>
-                <a:solidFill>
-                  <a:schemeClr val="tx1"/>
-                </a:solidFill>
-                <a:latin typeface="Arial" charset="0"/>
-                <a:cs typeface="Arial" charset="0"/>
-              </a:defRPr>
-            </a:lvl2pPr>
-            <a:lvl3pPr marL="1143000" indent="-228600" eaLnBrk="0" hangingPunct="0">
-              <a:defRPr>
-                <a:solidFill>
-                  <a:schemeClr val="tx1"/>
-                </a:solidFill>
-                <a:latin typeface="Arial" charset="0"/>
-                <a:cs typeface="Arial" charset="0"/>
-              </a:defRPr>
-            </a:lvl3pPr>
-            <a:lvl4pPr marL="1600200" indent="-228600" eaLnBrk="0" hangingPunct="0">
-              <a:defRPr>
-                <a:solidFill>
-                  <a:schemeClr val="tx1"/>
-                </a:solidFill>
-                <a:latin typeface="Arial" charset="0"/>
-                <a:cs typeface="Arial" charset="0"/>
-              </a:defRPr>
-            </a:lvl4pPr>
-            <a:lvl5pPr marL="2057400" indent="-228600" eaLnBrk="0" hangingPunct="0">
-              <a:defRPr>
-                <a:solidFill>
-                  <a:schemeClr val="tx1"/>
-                </a:solidFill>
-                <a:latin typeface="Arial" charset="0"/>
-                <a:cs typeface="Arial" charset="0"/>
-              </a:defRPr>
-            </a:lvl5pPr>
-            <a:lvl6pPr marL="2514600" indent="-228600" eaLnBrk="0" fontAlgn="base" hangingPunct="0">
-              <a:spcBef>
-                <a:spcPct val="0"/>
-              </a:spcBef>
-              <a:spcAft>
-                <a:spcPct val="0"/>
-              </a:spcAft>
-              <a:defRPr>
-                <a:solidFill>
-                  <a:schemeClr val="tx1"/>
-                </a:solidFill>
-                <a:latin typeface="Arial" charset="0"/>
-                <a:cs typeface="Arial" charset="0"/>
-              </a:defRPr>
-            </a:lvl6pPr>
-            <a:lvl7pPr marL="2971800" indent="-228600" eaLnBrk="0" fontAlgn="base" hangingPunct="0">
-              <a:spcBef>
-                <a:spcPct val="0"/>
-              </a:spcBef>
-              <a:spcAft>
-                <a:spcPct val="0"/>
-              </a:spcAft>
-              <a:defRPr>
-                <a:solidFill>
-                  <a:schemeClr val="tx1"/>
-                </a:solidFill>
-                <a:latin typeface="Arial" charset="0"/>
-                <a:cs typeface="Arial" charset="0"/>
-              </a:defRPr>
-            </a:lvl7pPr>
-            <a:lvl8pPr marL="3429000" indent="-228600" eaLnBrk="0" fontAlgn="base" hangingPunct="0">
-              <a:spcBef>
-                <a:spcPct val="0"/>
-              </a:spcBef>
-              <a:spcAft>
-                <a:spcPct val="0"/>
-              </a:spcAft>
-              <a:defRPr>
-                <a:solidFill>
-                  <a:schemeClr val="tx1"/>
-                </a:solidFill>
-                <a:latin typeface="Arial" charset="0"/>
-                <a:cs typeface="Arial" charset="0"/>
-              </a:defRPr>
-            </a:lvl8pPr>
-            <a:lvl9pPr marL="3886200" indent="-228600" eaLnBrk="0" fontAlgn="base" hangingPunct="0">
-              <a:spcBef>
-                <a:spcPct val="0"/>
-              </a:spcBef>
-              <a:spcAft>
-                <a:spcPct val="0"/>
-              </a:spcAft>
-              <a:defRPr>
-                <a:solidFill>
-                  <a:schemeClr val="tx1"/>
-                </a:solidFill>
-                <a:latin typeface="Arial" charset="0"/>
-                <a:cs typeface="Arial" charset="0"/>
-              </a:defRPr>
-            </a:lvl9pPr>
-          </a:lstStyle>
-          <a:p>
-            <a:pPr marL="0" marR="0" lvl="0" indent="0" algn="r" defTabSz="914400" rtl="0" eaLnBrk="1" fontAlgn="auto" latinLnBrk="1" hangingPunct="1">
-              <a:lnSpc>
-                <a:spcPct val="100000"/>
-              </a:lnSpc>
-              <a:spcBef>
-                <a:spcPts val="0"/>
-              </a:spcBef>
-              <a:spcAft>
-                <a:spcPts val="0"/>
-              </a:spcAft>
-              <a:buClrTx/>
-              <a:buSzTx/>
-              <a:buFontTx/>
-              <a:buNone/>
-              <a:tabLst/>
-              <a:defRPr/>
-            </a:pPr>
-            <a:fld id="{E7649BAD-CB0D-4523-BB4C-E510FB45DBB8}" type="slidenum">
-              <a:rPr kumimoji="0" lang="en-AU" altLang="ko-KR" sz="1200" b="0" i="0" u="none" strike="noStrike" kern="1200" cap="none" spc="0" normalizeH="0" baseline="0" noProof="0">
-                <a:ln>
-                  <a:noFill/>
-                </a:ln>
-                <a:solidFill>
-                  <a:prstClr val="black"/>
-                </a:solidFill>
-                <a:effectLst/>
-                <a:uLnTx/>
-                <a:uFillTx/>
-                <a:latin typeface="Calibri" pitchFamily="34" charset="0"/>
-                <a:ea typeface="맑은 고딕" panose="020B0503020000020004" pitchFamily="50" charset="-127"/>
-                <a:cs typeface="Arial" charset="0"/>
-              </a:rPr>
-              <a:pPr marL="0" marR="0" lvl="0" indent="0" algn="r" defTabSz="914400" rtl="0" eaLnBrk="1" fontAlgn="auto" latinLnBrk="1" hangingPunct="1">
-                <a:lnSpc>
-                  <a:spcPct val="100000"/>
-                </a:lnSpc>
-                <a:spcBef>
-                  <a:spcPts val="0"/>
-                </a:spcBef>
-                <a:spcAft>
-                  <a:spcPts val="0"/>
-                </a:spcAft>
-                <a:buClrTx/>
-                <a:buSzTx/>
-                <a:buFontTx/>
-                <a:buNone/>
-                <a:tabLst/>
-                <a:defRPr/>
-              </a:pPr>
-              <a:t>9</a:t>
-            </a:fld>
-            <a:endParaRPr kumimoji="0" lang="en-AU" altLang="ko-KR" sz="1200" b="0" i="0" u="none" strike="noStrike" kern="1200" cap="none" spc="0" normalizeH="0" baseline="0" noProof="0">
-              <a:ln>
-                <a:noFill/>
-              </a:ln>
-              <a:solidFill>
-                <a:prstClr val="black"/>
-              </a:solidFill>
-              <a:effectLst/>
-              <a:uLnTx/>
-              <a:uFillTx/>
-              <a:latin typeface="Calibri" pitchFamily="34" charset="0"/>
-              <a:ea typeface="맑은 고딕" panose="020B0503020000020004" pitchFamily="50" charset="-127"/>
-              <a:cs typeface="Arial" charset="0"/>
-            </a:endParaRPr>
-          </a:p>
-        </p:txBody>
-      </p:sp>
-    </p:spTree>
-    <p:extLst>
-      <p:ext uri="{BB962C8B-B14F-4D97-AF65-F5344CB8AC3E}">
-        <p14:creationId xmlns:p14="http://schemas.microsoft.com/office/powerpoint/2010/main" val="2217913820"/>
+        <p14:creationId xmlns:p14="http://schemas.microsoft.com/office/powerpoint/2010/main" val="268489872"/>
       </p:ext>
     </p:extLst>
   </p:cSld>
@@ -5115,10 +3284,10 @@
           </a:lstStyle>
           <a:p>
             <a:r>
-              <a:rPr lang="en-US"/>
+              <a:rPr lang="en-US" dirty="0"/>
               <a:t>Click to edit Master title style</a:t>
             </a:r>
-            <a:endParaRPr lang="en-AU"/>
+            <a:endParaRPr lang="en-AU" dirty="0"/>
           </a:p>
         </p:txBody>
       </p:sp>
@@ -5876,7 +4045,7 @@
         <p:spPr>
           <a:xfrm>
             <a:off x="1800225" y="7038280"/>
-            <a:ext cx="11515845" cy="2308324"/>
+            <a:ext cx="6010813" cy="2308324"/>
           </a:xfrm>
           <a:prstGeom prst="rect">
             <a:avLst/>
@@ -5909,7 +4078,7 @@
                 <a:latin typeface="Franklin Gothic Demi Cond" pitchFamily="34" charset="0"/>
                 <a:ea typeface="Asia견고딕" pitchFamily="2" charset="-127"/>
               </a:rPr>
-              <a:t>An empty street, an empty house</a:t>
+              <a:t>YOUR TEXT HERE</a:t>
             </a:r>
           </a:p>
           <a:p>
@@ -5929,23 +4098,8 @@
                 <a:latin typeface="Franklin Gothic Demi Cond" pitchFamily="34" charset="0"/>
                 <a:ea typeface="Asia견고딕" pitchFamily="2" charset="-127"/>
               </a:rPr>
-              <a:t>A hole inside my heart</a:t>
-            </a:r>
-            <a:endParaRPr lang="ko-KR" altLang="en-US" sz="7200" dirty="0">
-              <a:solidFill>
-                <a:srgbClr val="EBEBEB"/>
-              </a:solidFill>
-              <a:effectLst>
-                <a:glow rad="127000">
-                  <a:schemeClr val="tx1">
-                    <a:lumMod val="75000"/>
-                    <a:lumOff val="25000"/>
-                  </a:schemeClr>
-                </a:glow>
-              </a:effectLst>
-              <a:latin typeface="Franklin Gothic Demi Cond" pitchFamily="34" charset="0"/>
-              <a:ea typeface="Asia견고딕" pitchFamily="2" charset="-127"/>
-            </a:endParaRPr>
+              <a:t>YOUR TEXT HERE</a:t>
+            </a:r>
           </a:p>
         </p:txBody>
       </p:sp>
@@ -5953,128 +4107,6 @@
     <p:extLst>
       <p:ext uri="{BB962C8B-B14F-4D97-AF65-F5344CB8AC3E}">
         <p14:creationId xmlns:p14="http://schemas.microsoft.com/office/powerpoint/2010/main" val="2333660198"/>
-      </p:ext>
-    </p:extLst>
-  </p:cSld>
-  <p:clrMapOvr>
-    <a:masterClrMapping/>
-  </p:clrMapOvr>
-</p:sld>
-</file>
-
-<file path=ppt/slides/slide10.xml><?xml version="1.0" encoding="utf-8"?>
-<p:sld xmlns:a="http://schemas.openxmlformats.org/drawingml/2006/main" xmlns:r="http://schemas.openxmlformats.org/officeDocument/2006/relationships" xmlns:p="http://schemas.openxmlformats.org/presentationml/2006/main">
-  <p:cSld>
-    <p:bg>
-      <p:bgPr>
-        <a:solidFill>
-          <a:schemeClr val="tx1"/>
-        </a:solidFill>
-        <a:effectLst/>
-      </p:bgPr>
-    </p:bg>
-    <p:spTree>
-      <p:nvGrpSpPr>
-        <p:cNvPr id="1" name=""/>
-        <p:cNvGrpSpPr/>
-        <p:nvPr/>
-      </p:nvGrpSpPr>
-      <p:grpSpPr>
-        <a:xfrm>
-          <a:off x="0" y="0"/>
-          <a:ext cx="0" cy="0"/>
-          <a:chOff x="0" y="0"/>
-          <a:chExt cx="0" cy="0"/>
-        </a:xfrm>
-      </p:grpSpPr>
-      <p:sp>
-        <p:nvSpPr>
-          <p:cNvPr id="2" name="TextBox 1"/>
-          <p:cNvSpPr txBox="1"/>
-          <p:nvPr/>
-        </p:nvSpPr>
-        <p:spPr>
-          <a:xfrm>
-            <a:off x="1800000" y="7038000"/>
-            <a:ext cx="10041531" cy="2308324"/>
-          </a:xfrm>
-          <a:prstGeom prst="rect">
-            <a:avLst/>
-          </a:prstGeom>
-          <a:noFill/>
-          <a:scene3d>
-            <a:camera prst="perspectiveFront"/>
-            <a:lightRig rig="threePt" dir="t"/>
-          </a:scene3d>
-        </p:spPr>
-        <p:txBody>
-          <a:bodyPr wrap="none" rtlCol="0">
-            <a:spAutoFit/>
-          </a:bodyPr>
-          <a:lstStyle/>
-          <a:p>
-            <a:pPr lvl="0"/>
-            <a:r>
-              <a:rPr lang="en-US" altLang="ko-KR" sz="7200" dirty="0">
-                <a:solidFill>
-                  <a:srgbClr val="EBEBEB"/>
-                </a:solidFill>
-                <a:effectLst>
-                  <a:glow rad="127000">
-                    <a:prstClr val="black">
-                      <a:lumMod val="75000"/>
-                      <a:lumOff val="25000"/>
-                    </a:prstClr>
-                  </a:glow>
-                </a:effectLst>
-                <a:latin typeface="Franklin Gothic Demi Cond" pitchFamily="34" charset="0"/>
-                <a:ea typeface="Asia견고딕" pitchFamily="2" charset="-127"/>
-              </a:rPr>
-              <a:t>I try to read, I go to work</a:t>
-            </a:r>
-          </a:p>
-          <a:p>
-            <a:pPr lvl="0"/>
-            <a:r>
-              <a:rPr lang="en-US" altLang="ko-KR" sz="7200" dirty="0">
-                <a:solidFill>
-                  <a:srgbClr val="EBEBEB"/>
-                </a:solidFill>
-                <a:effectLst>
-                  <a:glow rad="127000">
-                    <a:prstClr val="black">
-                      <a:lumMod val="75000"/>
-                      <a:lumOff val="25000"/>
-                    </a:prstClr>
-                  </a:glow>
-                </a:effectLst>
-                <a:latin typeface="Franklin Gothic Demi Cond" pitchFamily="34" charset="0"/>
-                <a:ea typeface="Asia견고딕" pitchFamily="2" charset="-127"/>
-              </a:rPr>
-              <a:t>I'm laughing with my friends</a:t>
-            </a:r>
-            <a:endParaRPr lang="ko-KR" altLang="en-US" sz="7200" dirty="0">
-              <a:solidFill>
-                <a:srgbClr val="EBEBEB"/>
-              </a:solidFill>
-              <a:effectLst>
-                <a:glow rad="127000">
-                  <a:prstClr val="black">
-                    <a:lumMod val="75000"/>
-                    <a:lumOff val="25000"/>
-                  </a:prstClr>
-                </a:glow>
-              </a:effectLst>
-              <a:latin typeface="Franklin Gothic Demi Cond" pitchFamily="34" charset="0"/>
-              <a:ea typeface="Asia견고딕" pitchFamily="2" charset="-127"/>
-            </a:endParaRPr>
-          </a:p>
-        </p:txBody>
-      </p:sp>
-    </p:spTree>
-    <p:extLst>
-      <p:ext uri="{BB962C8B-B14F-4D97-AF65-F5344CB8AC3E}">
-        <p14:creationId xmlns:p14="http://schemas.microsoft.com/office/powerpoint/2010/main" val="3986836369"/>
       </p:ext>
     </p:extLst>
   </p:cSld>
@@ -6117,8 +4149,76 @@
         </p:nvSpPr>
         <p:spPr>
           <a:xfrm>
-            <a:off x="1800000" y="7038000"/>
-            <a:ext cx="10444911" cy="2308324"/>
+            <a:off x="1828900" y="7882068"/>
+            <a:ext cx="186308" cy="1436557"/>
+          </a:xfrm>
+          <a:prstGeom prst="rect">
+            <a:avLst/>
+          </a:prstGeom>
+          <a:solidFill>
+            <a:srgbClr val="C00000"/>
+          </a:solidFill>
+          <a:scene3d>
+            <a:camera prst="perspectiveFront"/>
+            <a:lightRig rig="threePt" dir="t"/>
+          </a:scene3d>
+        </p:spPr>
+        <p:txBody>
+          <a:bodyPr wrap="square" rtlCol="0">
+            <a:spAutoFit/>
+          </a:bodyPr>
+          <a:lstStyle/>
+          <a:p>
+            <a:pPr marL="0" marR="0" lvl="0" indent="0" algn="l" defTabSz="914400" rtl="0" eaLnBrk="1" fontAlgn="auto" latinLnBrk="1" hangingPunct="1">
+              <a:lnSpc>
+                <a:spcPct val="100000"/>
+              </a:lnSpc>
+              <a:spcBef>
+                <a:spcPts val="0"/>
+              </a:spcBef>
+              <a:spcAft>
+                <a:spcPts val="0"/>
+              </a:spcAft>
+              <a:buClrTx/>
+              <a:buSzTx/>
+              <a:buFontTx/>
+              <a:buNone/>
+              <a:tabLst/>
+              <a:defRPr/>
+            </a:pPr>
+            <a:endParaRPr kumimoji="0" lang="ko-KR" altLang="en-US" sz="4800" b="0" i="0" u="none" strike="noStrike" kern="1200" cap="none" spc="0" normalizeH="0" baseline="0" noProof="0" dirty="0">
+              <a:ln>
+                <a:noFill/>
+              </a:ln>
+              <a:solidFill>
+                <a:srgbClr val="EBEBEB"/>
+              </a:solidFill>
+              <a:effectLst/>
+              <a:uLnTx/>
+              <a:uFillTx/>
+              <a:latin typeface="Franklin Gothic Demi Cond" pitchFamily="34" charset="0"/>
+              <a:ea typeface="Asia견고딕" pitchFamily="2" charset="-127"/>
+              <a:cs typeface="+mn-cs"/>
+            </a:endParaRPr>
+          </a:p>
+        </p:txBody>
+      </p:sp>
+      <p:sp>
+        <p:nvSpPr>
+          <p:cNvPr id="15" name="TextBox 14">
+            <a:extLst>
+              <a:ext uri="{FF2B5EF4-FFF2-40B4-BE49-F238E27FC236}">
+                <a16:creationId xmlns:a16="http://schemas.microsoft.com/office/drawing/2014/main" id="{27B80BAB-8B65-4B89-889A-3EE41B535B00}"/>
+              </a:ext>
+            </a:extLst>
+          </p:cNvPr>
+          <p:cNvSpPr txBox="1"/>
+          <p:nvPr/>
+        </p:nvSpPr>
+        <p:spPr>
+          <a:xfrm>
+            <a:off x="2159224" y="7877071"/>
+            <a:ext cx="7542321" cy="1446550"/>
           </a:xfrm>
           <a:prstGeom prst="rect">
             <a:avLst/>
@@ -6135,60 +4235,69 @@
           </a:bodyPr>
           <a:lstStyle/>
           <a:p>
-            <a:pPr lvl="0"/>
-            <a:r>
-              <a:rPr lang="en-US" altLang="ko-KR" sz="7200" dirty="0">
-                <a:solidFill>
-                  <a:srgbClr val="EBEBEB"/>
-                </a:solidFill>
-                <a:effectLst>
-                  <a:glow rad="127000">
-                    <a:prstClr val="black">
-                      <a:lumMod val="75000"/>
-                      <a:lumOff val="25000"/>
-                    </a:prstClr>
-                  </a:glow>
-                </a:effectLst>
+            <a:pPr marL="0" marR="0" lvl="0" indent="0" algn="l" defTabSz="914400" rtl="0" eaLnBrk="1" fontAlgn="auto" latinLnBrk="1" hangingPunct="1">
+              <a:lnSpc>
+                <a:spcPct val="100000"/>
+              </a:lnSpc>
+              <a:spcBef>
+                <a:spcPts val="0"/>
+              </a:spcBef>
+              <a:spcAft>
+                <a:spcPts val="0"/>
+              </a:spcAft>
+              <a:buClrTx/>
+              <a:buSzTx/>
+              <a:buFontTx/>
+              <a:buNone/>
+              <a:tabLst/>
+              <a:defRPr/>
+            </a:pPr>
+            <a:r>
+              <a:rPr kumimoji="0" lang="en-US" altLang="ko-KR" sz="8000" b="0" i="0" u="none" strike="noStrike" kern="1200" cap="none" spc="0" normalizeH="0" baseline="0" noProof="0" dirty="0">
+                <a:ln>
+                  <a:noFill/>
+                </a:ln>
+                <a:solidFill>
+                  <a:schemeClr val="bg1"/>
+                </a:solidFill>
+                <a:effectLst/>
+                <a:uLnTx/>
+                <a:uFillTx/>
+                <a:latin typeface="Arial Narrow" panose="020B0606020202030204" pitchFamily="34" charset="0"/>
+                <a:ea typeface="Asia견고딕" pitchFamily="2" charset="-127"/>
+              </a:rPr>
+              <a:t>YOUR TEXT</a:t>
+            </a:r>
+            <a:r>
+              <a:rPr kumimoji="0" lang="en-US" altLang="ko-KR" sz="8800" b="0" i="0" u="none" strike="noStrike" kern="1200" cap="none" spc="0" normalizeH="0" baseline="0" noProof="0" dirty="0">
+                <a:ln>
+                  <a:noFill/>
+                </a:ln>
+                <a:solidFill>
+                  <a:schemeClr val="bg1"/>
+                </a:solidFill>
+                <a:effectLst/>
+                <a:uLnTx/>
+                <a:uFillTx/>
                 <a:latin typeface="Franklin Gothic Demi Cond" pitchFamily="34" charset="0"/>
                 <a:ea typeface="Asia견고딕" pitchFamily="2" charset="-127"/>
+                <a:cs typeface="+mn-cs"/>
               </a:rPr>
-              <a:t>I'm all alone,</a:t>
-            </a:r>
-          </a:p>
-          <a:p>
-            <a:pPr lvl="0"/>
-            <a:r>
-              <a:rPr lang="en-US" altLang="ko-KR" sz="7200" dirty="0">
-                <a:solidFill>
-                  <a:srgbClr val="EBEBEB"/>
-                </a:solidFill>
-                <a:effectLst>
-                  <a:glow rad="127000">
-                    <a:prstClr val="black">
-                      <a:lumMod val="75000"/>
-                      <a:lumOff val="25000"/>
-                    </a:prstClr>
-                  </a:glow>
-                </a:effectLst>
-                <a:latin typeface="Franklin Gothic Demi Cond" pitchFamily="34" charset="0"/>
-                <a:ea typeface="Asia견고딕" pitchFamily="2" charset="-127"/>
-              </a:rPr>
-              <a:t>the rooms are getting smaller</a:t>
-            </a:r>
-            <a:endParaRPr lang="ko-KR" altLang="en-US" sz="7200" dirty="0">
+              <a:t> HERE</a:t>
+            </a:r>
+            <a:endParaRPr kumimoji="0" lang="ko-KR" altLang="en-US" sz="8800" b="0" i="0" u="none" strike="noStrike" kern="1200" cap="none" spc="0" normalizeH="0" baseline="0" noProof="0" dirty="0">
+              <a:ln>
+                <a:noFill/>
+              </a:ln>
               <a:solidFill>
-                <a:srgbClr val="EBEBEB"/>
+                <a:schemeClr val="bg1"/>
               </a:solidFill>
-              <a:effectLst>
-                <a:glow rad="127000">
-                  <a:prstClr val="black">
-                    <a:lumMod val="75000"/>
-                    <a:lumOff val="25000"/>
-                  </a:prstClr>
-                </a:glow>
-              </a:effectLst>
+              <a:effectLst/>
+              <a:uLnTx/>
+              <a:uFillTx/>
               <a:latin typeface="Franklin Gothic Demi Cond" pitchFamily="34" charset="0"/>
               <a:ea typeface="Asia견고딕" pitchFamily="2" charset="-127"/>
+              <a:cs typeface="+mn-cs"/>
             </a:endParaRPr>
           </a:p>
         </p:txBody>
@@ -6196,7 +4305,7 @@
     </p:spTree>
     <p:extLst>
       <p:ext uri="{BB962C8B-B14F-4D97-AF65-F5344CB8AC3E}">
-        <p14:creationId xmlns:p14="http://schemas.microsoft.com/office/powerpoint/2010/main" val="2847840229"/>
+        <p14:creationId xmlns:p14="http://schemas.microsoft.com/office/powerpoint/2010/main" val="3144973720"/>
       </p:ext>
     </p:extLst>
   </p:cSld>
@@ -6233,19 +4342,27 @@
       </p:grpSpPr>
       <p:sp>
         <p:nvSpPr>
-          <p:cNvPr id="2" name="TextBox 1"/>
+          <p:cNvPr id="15" name="TextBox 14">
+            <a:extLst>
+              <a:ext uri="{FF2B5EF4-FFF2-40B4-BE49-F238E27FC236}">
+                <a16:creationId xmlns:a16="http://schemas.microsoft.com/office/drawing/2014/main" id="{27B80BAB-8B65-4B89-889A-3EE41B535B00}"/>
+              </a:ext>
+            </a:extLst>
+          </p:cNvPr>
           <p:cNvSpPr txBox="1"/>
           <p:nvPr/>
         </p:nvSpPr>
         <p:spPr>
           <a:xfrm>
-            <a:off x="1800000" y="7038000"/>
-            <a:ext cx="9575506" cy="2308324"/>
+            <a:off x="1826593" y="7876388"/>
+            <a:ext cx="7305333" cy="1446550"/>
           </a:xfrm>
           <a:prstGeom prst="rect">
             <a:avLst/>
           </a:prstGeom>
-          <a:noFill/>
+          <a:solidFill>
+            <a:schemeClr val="bg1"/>
+          </a:solidFill>
           <a:scene3d>
             <a:camera prst="perspectiveFront"/>
             <a:lightRig rig="threePt" dir="t"/>
@@ -6259,56 +4376,15 @@
           <a:p>
             <a:pPr lvl="0"/>
             <a:r>
-              <a:rPr lang="en-US" altLang="ko-KR" sz="7200" dirty="0">
-                <a:solidFill>
-                  <a:srgbClr val="EBEBEB"/>
-                </a:solidFill>
-                <a:effectLst>
-                  <a:glow rad="127000">
-                    <a:prstClr val="black">
-                      <a:lumMod val="75000"/>
-                      <a:lumOff val="25000"/>
-                    </a:prstClr>
-                  </a:glow>
-                </a:effectLst>
+              <a:rPr lang="en-US" altLang="ko-KR" sz="8800" dirty="0">
+                <a:effectLst/>
                 <a:latin typeface="Franklin Gothic Demi Cond" pitchFamily="34" charset="0"/>
                 <a:ea typeface="Asia견고딕" pitchFamily="2" charset="-127"/>
               </a:rPr>
-              <a:t>I wonder how, I wonder why</a:t>
-            </a:r>
-          </a:p>
-          <a:p>
-            <a:pPr lvl="0"/>
-            <a:r>
-              <a:rPr lang="en-US" altLang="ko-KR" sz="7200" dirty="0">
-                <a:solidFill>
-                  <a:srgbClr val="EBEBEB"/>
-                </a:solidFill>
-                <a:effectLst>
-                  <a:glow rad="127000">
-                    <a:prstClr val="black">
-                      <a:lumMod val="75000"/>
-                      <a:lumOff val="25000"/>
-                    </a:prstClr>
-                  </a:glow>
-                </a:effectLst>
-                <a:latin typeface="Franklin Gothic Demi Cond" pitchFamily="34" charset="0"/>
-                <a:ea typeface="Asia견고딕" pitchFamily="2" charset="-127"/>
-              </a:rPr>
-              <a:t>I wonder where they are</a:t>
-            </a:r>
-            <a:endParaRPr lang="ko-KR" altLang="en-US" sz="7200" dirty="0">
-              <a:solidFill>
-                <a:srgbClr val="EBEBEB"/>
-              </a:solidFill>
-              <a:effectLst>
-                <a:glow rad="127000">
-                  <a:prstClr val="black">
-                    <a:lumMod val="75000"/>
-                    <a:lumOff val="25000"/>
-                  </a:prstClr>
-                </a:glow>
-              </a:effectLst>
+              <a:t>YOUR TEXT HERE</a:t>
+            </a:r>
+            <a:endParaRPr lang="ko-KR" altLang="en-US" sz="8800" dirty="0">
+              <a:effectLst/>
               <a:latin typeface="Franklin Gothic Demi Cond" pitchFamily="34" charset="0"/>
               <a:ea typeface="Asia견고딕" pitchFamily="2" charset="-127"/>
             </a:endParaRPr>
@@ -6318,7 +4394,7 @@
     </p:spTree>
     <p:extLst>
       <p:ext uri="{BB962C8B-B14F-4D97-AF65-F5344CB8AC3E}">
-        <p14:creationId xmlns:p14="http://schemas.microsoft.com/office/powerpoint/2010/main" val="605012174"/>
+        <p14:creationId xmlns:p14="http://schemas.microsoft.com/office/powerpoint/2010/main" val="3976723271"/>
       </p:ext>
     </p:extLst>
   </p:cSld>
@@ -6355,14 +4431,980 @@
       </p:grpSpPr>
       <p:sp>
         <p:nvSpPr>
+          <p:cNvPr id="15" name="TextBox 14">
+            <a:extLst>
+              <a:ext uri="{FF2B5EF4-FFF2-40B4-BE49-F238E27FC236}">
+                <a16:creationId xmlns:a16="http://schemas.microsoft.com/office/drawing/2014/main" id="{27B80BAB-8B65-4B89-889A-3EE41B535B00}"/>
+              </a:ext>
+            </a:extLst>
+          </p:cNvPr>
+          <p:cNvSpPr txBox="1"/>
+          <p:nvPr/>
+        </p:nvSpPr>
+        <p:spPr>
+          <a:xfrm>
+            <a:off x="5327576" y="7876388"/>
+            <a:ext cx="7305333" cy="1446550"/>
+          </a:xfrm>
+          <a:prstGeom prst="rect">
+            <a:avLst/>
+          </a:prstGeom>
+          <a:solidFill>
+            <a:schemeClr val="bg1"/>
+          </a:solidFill>
+          <a:scene3d>
+            <a:camera prst="perspectiveFront"/>
+            <a:lightRig rig="threePt" dir="t"/>
+          </a:scene3d>
+        </p:spPr>
+        <p:txBody>
+          <a:bodyPr wrap="none" rtlCol="0">
+            <a:spAutoFit/>
+          </a:bodyPr>
+          <a:lstStyle/>
+          <a:p>
+            <a:pPr marL="0" marR="0" lvl="0" indent="0" algn="l" defTabSz="914400" rtl="0" eaLnBrk="1" fontAlgn="auto" latinLnBrk="1" hangingPunct="1">
+              <a:lnSpc>
+                <a:spcPct val="100000"/>
+              </a:lnSpc>
+              <a:spcBef>
+                <a:spcPts val="0"/>
+              </a:spcBef>
+              <a:spcAft>
+                <a:spcPts val="0"/>
+              </a:spcAft>
+              <a:buClrTx/>
+              <a:buSzTx/>
+              <a:buFontTx/>
+              <a:buNone/>
+              <a:tabLst/>
+              <a:defRPr/>
+            </a:pPr>
+            <a:r>
+              <a:rPr kumimoji="0" lang="en-US" altLang="ko-KR" sz="8800" b="0" i="0" u="none" strike="noStrike" kern="1200" cap="none" spc="0" normalizeH="0" baseline="0" noProof="0" dirty="0">
+                <a:ln>
+                  <a:noFill/>
+                </a:ln>
+                <a:solidFill>
+                  <a:prstClr val="black"/>
+                </a:solidFill>
+                <a:effectLst/>
+                <a:uLnTx/>
+                <a:uFillTx/>
+                <a:latin typeface="Franklin Gothic Demi Cond" pitchFamily="34" charset="0"/>
+                <a:ea typeface="Asia견고딕" pitchFamily="2" charset="-127"/>
+              </a:rPr>
+              <a:t>YOUR TEXT HERE</a:t>
+            </a:r>
+            <a:endParaRPr kumimoji="0" lang="ko-KR" altLang="en-US" sz="8800" b="0" i="0" u="none" strike="noStrike" kern="1200" cap="none" spc="0" normalizeH="0" baseline="0" noProof="0" dirty="0">
+              <a:ln>
+                <a:noFill/>
+              </a:ln>
+              <a:solidFill>
+                <a:prstClr val="black"/>
+              </a:solidFill>
+              <a:effectLst/>
+              <a:uLnTx/>
+              <a:uFillTx/>
+              <a:latin typeface="Franklin Gothic Demi Cond" pitchFamily="34" charset="0"/>
+              <a:ea typeface="Asia견고딕" pitchFamily="2" charset="-127"/>
+            </a:endParaRPr>
+          </a:p>
+        </p:txBody>
+      </p:sp>
+      <p:sp>
+        <p:nvSpPr>
           <p:cNvPr id="2" name="TextBox 1"/>
           <p:cNvSpPr txBox="1"/>
           <p:nvPr/>
         </p:nvSpPr>
         <p:spPr>
           <a:xfrm>
-            <a:off x="1800000" y="7038000"/>
-            <a:ext cx="9565760" cy="2308324"/>
+            <a:off x="7100367" y="7231732"/>
+            <a:ext cx="4063420" cy="830997"/>
+          </a:xfrm>
+          <a:prstGeom prst="rect">
+            <a:avLst/>
+          </a:prstGeom>
+          <a:solidFill>
+            <a:schemeClr val="tx1">
+              <a:lumMod val="85000"/>
+              <a:lumOff val="15000"/>
+            </a:schemeClr>
+          </a:solidFill>
+          <a:scene3d>
+            <a:camera prst="perspectiveFront"/>
+            <a:lightRig rig="threePt" dir="t"/>
+          </a:scene3d>
+        </p:spPr>
+        <p:txBody>
+          <a:bodyPr wrap="none" rtlCol="0">
+            <a:spAutoFit/>
+          </a:bodyPr>
+          <a:lstStyle/>
+          <a:p>
+            <a:pPr marL="0" marR="0" lvl="0" indent="0" algn="l" defTabSz="914400" rtl="0" eaLnBrk="1" fontAlgn="auto" latinLnBrk="1" hangingPunct="1">
+              <a:lnSpc>
+                <a:spcPct val="100000"/>
+              </a:lnSpc>
+              <a:spcBef>
+                <a:spcPts val="0"/>
+              </a:spcBef>
+              <a:spcAft>
+                <a:spcPts val="0"/>
+              </a:spcAft>
+              <a:buClrTx/>
+              <a:buSzTx/>
+              <a:buFontTx/>
+              <a:buNone/>
+              <a:tabLst/>
+              <a:defRPr/>
+            </a:pPr>
+            <a:r>
+              <a:rPr kumimoji="0" lang="en-US" altLang="ko-KR" sz="4800" b="0" i="0" u="none" strike="noStrike" kern="1200" cap="none" spc="0" normalizeH="0" baseline="0" noProof="0" dirty="0">
+                <a:ln>
+                  <a:noFill/>
+                </a:ln>
+                <a:solidFill>
+                  <a:srgbClr val="EBEBEB"/>
+                </a:solidFill>
+                <a:effectLst/>
+                <a:uLnTx/>
+                <a:uFillTx/>
+                <a:latin typeface="Franklin Gothic Demi Cond" pitchFamily="34" charset="0"/>
+                <a:ea typeface="Asia견고딕" pitchFamily="2" charset="-127"/>
+                <a:cs typeface="+mn-cs"/>
+              </a:rPr>
+              <a:t>YOUR TEXT HERE</a:t>
+            </a:r>
+            <a:endParaRPr kumimoji="0" lang="ko-KR" altLang="en-US" sz="4800" b="0" i="0" u="none" strike="noStrike" kern="1200" cap="none" spc="0" normalizeH="0" baseline="0" noProof="0" dirty="0">
+              <a:ln>
+                <a:noFill/>
+              </a:ln>
+              <a:solidFill>
+                <a:srgbClr val="EBEBEB"/>
+              </a:solidFill>
+              <a:effectLst/>
+              <a:uLnTx/>
+              <a:uFillTx/>
+              <a:latin typeface="Franklin Gothic Demi Cond" pitchFamily="34" charset="0"/>
+              <a:ea typeface="Asia견고딕" pitchFamily="2" charset="-127"/>
+              <a:cs typeface="+mn-cs"/>
+            </a:endParaRPr>
+          </a:p>
+        </p:txBody>
+      </p:sp>
+    </p:spTree>
+    <p:extLst>
+      <p:ext uri="{BB962C8B-B14F-4D97-AF65-F5344CB8AC3E}">
+        <p14:creationId xmlns:p14="http://schemas.microsoft.com/office/powerpoint/2010/main" val="2628808136"/>
+      </p:ext>
+    </p:extLst>
+  </p:cSld>
+  <p:clrMapOvr>
+    <a:masterClrMapping/>
+  </p:clrMapOvr>
+</p:sld>
+</file>
+
+<file path=ppt/slides/slide5.xml><?xml version="1.0" encoding="utf-8"?>
+<p:sld xmlns:a="http://schemas.openxmlformats.org/drawingml/2006/main" xmlns:r="http://schemas.openxmlformats.org/officeDocument/2006/relationships" xmlns:p="http://schemas.openxmlformats.org/presentationml/2006/main">
+  <p:cSld>
+    <p:spTree>
+      <p:nvGrpSpPr>
+        <p:cNvPr id="1" name=""/>
+        <p:cNvGrpSpPr/>
+        <p:nvPr/>
+      </p:nvGrpSpPr>
+      <p:grpSpPr>
+        <a:xfrm>
+          <a:off x="0" y="0"/>
+          <a:ext cx="0" cy="0"/>
+          <a:chOff x="0" y="0"/>
+          <a:chExt cx="0" cy="0"/>
+        </a:xfrm>
+      </p:grpSpPr>
+      <p:sp>
+        <p:nvSpPr>
+          <p:cNvPr id="4" name="사각형: 둥근 모서리 3">
+            <a:extLst>
+              <a:ext uri="{FF2B5EF4-FFF2-40B4-BE49-F238E27FC236}">
+                <a16:creationId xmlns:a16="http://schemas.microsoft.com/office/drawing/2014/main" id="{73FF3434-77D8-4FF1-85A7-DCC27C0F1BF0}"/>
+              </a:ext>
+            </a:extLst>
+          </p:cNvPr>
+          <p:cNvSpPr/>
+          <p:nvPr/>
+        </p:nvSpPr>
+        <p:spPr>
+          <a:xfrm>
+            <a:off x="1583160" y="751012"/>
+            <a:ext cx="15121680" cy="8784976"/>
+          </a:xfrm>
+          <a:prstGeom prst="roundRect">
+            <a:avLst>
+              <a:gd name="adj" fmla="val 7397"/>
+            </a:avLst>
+          </a:prstGeom>
+          <a:gradFill flip="none" rotWithShape="1">
+            <a:gsLst>
+              <a:gs pos="0">
+                <a:srgbClr val="0070C0">
+                  <a:alpha val="40000"/>
+                </a:srgbClr>
+              </a:gs>
+              <a:gs pos="50000">
+                <a:srgbClr val="002060">
+                  <a:alpha val="40000"/>
+                </a:srgbClr>
+              </a:gs>
+              <a:gs pos="100000">
+                <a:srgbClr val="7030A0">
+                  <a:alpha val="40000"/>
+                </a:srgbClr>
+              </a:gs>
+            </a:gsLst>
+            <a:lin ang="18900000" scaled="1"/>
+            <a:tileRect/>
+          </a:gradFill>
+          <a:ln w="25400" cap="flat" cmpd="sng" algn="ctr">
+            <a:noFill/>
+            <a:prstDash val="solid"/>
+          </a:ln>
+          <a:effectLst/>
+          <a:scene3d>
+            <a:camera prst="obliqueTopLeft"/>
+            <a:lightRig rig="threePt" dir="t"/>
+          </a:scene3d>
+          <a:extLst/>
+        </p:spPr>
+        <p:style>
+          <a:lnRef idx="2">
+            <a:schemeClr val="accent1">
+              <a:shade val="50000"/>
+            </a:schemeClr>
+          </a:lnRef>
+          <a:fillRef idx="1">
+            <a:schemeClr val="accent1"/>
+          </a:fillRef>
+          <a:effectRef idx="0">
+            <a:schemeClr val="accent1"/>
+          </a:effectRef>
+          <a:fontRef idx="minor">
+            <a:schemeClr val="lt1"/>
+          </a:fontRef>
+        </p:style>
+        <p:txBody>
+          <a:bodyPr rtlCol="0" anchor="ctr"/>
+          <a:lstStyle/>
+          <a:p>
+            <a:pPr algn="ctr"/>
+            <a:endParaRPr lang="ko-KR" altLang="en-US"/>
+          </a:p>
+        </p:txBody>
+      </p:sp>
+      <p:sp>
+        <p:nvSpPr>
+          <p:cNvPr id="65" name="직사각형 64">
+            <a:extLst>
+              <a:ext uri="{FF2B5EF4-FFF2-40B4-BE49-F238E27FC236}">
+                <a16:creationId xmlns:a16="http://schemas.microsoft.com/office/drawing/2014/main" id="{346CE9B9-E38F-4CDE-BBA6-94E3023F1377}"/>
+              </a:ext>
+            </a:extLst>
+          </p:cNvPr>
+          <p:cNvSpPr/>
+          <p:nvPr/>
+        </p:nvSpPr>
+        <p:spPr>
+          <a:xfrm>
+            <a:off x="6623438" y="1759124"/>
+            <a:ext cx="5041124" cy="1015663"/>
+          </a:xfrm>
+          <a:prstGeom prst="rect">
+            <a:avLst/>
+          </a:prstGeom>
+          <a:scene3d>
+            <a:camera prst="obliqueTopLeft"/>
+            <a:lightRig rig="threePt" dir="t"/>
+          </a:scene3d>
+        </p:spPr>
+        <p:txBody>
+          <a:bodyPr wrap="none">
+            <a:spAutoFit/>
+          </a:bodyPr>
+          <a:lstStyle/>
+          <a:p>
+            <a:pPr lvl="0"/>
+            <a:r>
+              <a:rPr lang="en-US" altLang="ko-KR" sz="6000" dirty="0">
+                <a:solidFill>
+                  <a:schemeClr val="bg1"/>
+                </a:solidFill>
+                <a:latin typeface="Franklin Gothic Demi Cond" pitchFamily="34" charset="0"/>
+                <a:ea typeface="Asia견고딕" pitchFamily="2" charset="-127"/>
+              </a:rPr>
+              <a:t>YOUR TEXT HERE</a:t>
+            </a:r>
+            <a:endParaRPr lang="ko-KR" altLang="en-US" sz="6000" dirty="0">
+              <a:solidFill>
+                <a:schemeClr val="bg1"/>
+              </a:solidFill>
+              <a:latin typeface="Franklin Gothic Demi Cond" pitchFamily="34" charset="0"/>
+              <a:ea typeface="Asia견고딕" pitchFamily="2" charset="-127"/>
+            </a:endParaRPr>
+          </a:p>
+        </p:txBody>
+      </p:sp>
+      <p:sp>
+        <p:nvSpPr>
+          <p:cNvPr id="76" name="직사각형 75">
+            <a:extLst>
+              <a:ext uri="{FF2B5EF4-FFF2-40B4-BE49-F238E27FC236}">
+                <a16:creationId xmlns:a16="http://schemas.microsoft.com/office/drawing/2014/main" id="{73572212-EECA-4B5B-A3C6-40931093429E}"/>
+              </a:ext>
+            </a:extLst>
+          </p:cNvPr>
+          <p:cNvSpPr/>
+          <p:nvPr/>
+        </p:nvSpPr>
+        <p:spPr>
+          <a:xfrm>
+            <a:off x="2735288" y="3487316"/>
+            <a:ext cx="3096938" cy="646331"/>
+          </a:xfrm>
+          <a:prstGeom prst="rect">
+            <a:avLst/>
+          </a:prstGeom>
+          <a:scene3d>
+            <a:camera prst="obliqueTopLeft"/>
+            <a:lightRig rig="threePt" dir="t"/>
+          </a:scene3d>
+        </p:spPr>
+        <p:txBody>
+          <a:bodyPr wrap="none">
+            <a:spAutoFit/>
+          </a:bodyPr>
+          <a:lstStyle/>
+          <a:p>
+            <a:pPr lvl="0"/>
+            <a:r>
+              <a:rPr lang="en-US" altLang="ko-KR" sz="3600" dirty="0">
+                <a:solidFill>
+                  <a:schemeClr val="bg1"/>
+                </a:solidFill>
+                <a:latin typeface="Franklin Gothic Demi Cond" pitchFamily="34" charset="0"/>
+                <a:ea typeface="Asia견고딕" pitchFamily="2" charset="-127"/>
+              </a:rPr>
+              <a:t>YOUR TEXT HERE</a:t>
+            </a:r>
+            <a:endParaRPr lang="ko-KR" altLang="en-US" sz="3600" dirty="0">
+              <a:solidFill>
+                <a:schemeClr val="bg1"/>
+              </a:solidFill>
+              <a:latin typeface="Franklin Gothic Demi Cond" pitchFamily="34" charset="0"/>
+              <a:ea typeface="Asia견고딕" pitchFamily="2" charset="-127"/>
+            </a:endParaRPr>
+          </a:p>
+        </p:txBody>
+      </p:sp>
+      <p:sp>
+        <p:nvSpPr>
+          <p:cNvPr id="77" name="직사각형 76">
+            <a:extLst>
+              <a:ext uri="{FF2B5EF4-FFF2-40B4-BE49-F238E27FC236}">
+                <a16:creationId xmlns:a16="http://schemas.microsoft.com/office/drawing/2014/main" id="{8764FF6F-AFEC-4417-A16C-8C2B0B5D8C6C}"/>
+              </a:ext>
+            </a:extLst>
+          </p:cNvPr>
+          <p:cNvSpPr/>
+          <p:nvPr/>
+        </p:nvSpPr>
+        <p:spPr>
+          <a:xfrm>
+            <a:off x="2735288" y="4351412"/>
+            <a:ext cx="3096938" cy="646331"/>
+          </a:xfrm>
+          <a:prstGeom prst="rect">
+            <a:avLst/>
+          </a:prstGeom>
+          <a:scene3d>
+            <a:camera prst="obliqueTopLeft"/>
+            <a:lightRig rig="threePt" dir="t"/>
+          </a:scene3d>
+        </p:spPr>
+        <p:txBody>
+          <a:bodyPr wrap="none">
+            <a:spAutoFit/>
+          </a:bodyPr>
+          <a:lstStyle/>
+          <a:p>
+            <a:pPr lvl="0"/>
+            <a:r>
+              <a:rPr lang="en-US" altLang="ko-KR" sz="3600" dirty="0">
+                <a:solidFill>
+                  <a:schemeClr val="bg1"/>
+                </a:solidFill>
+                <a:latin typeface="Franklin Gothic Demi Cond" pitchFamily="34" charset="0"/>
+                <a:ea typeface="Asia견고딕" pitchFamily="2" charset="-127"/>
+              </a:rPr>
+              <a:t>YOUR TEXT HERE</a:t>
+            </a:r>
+            <a:endParaRPr lang="ko-KR" altLang="en-US" sz="3600" dirty="0">
+              <a:solidFill>
+                <a:schemeClr val="bg1"/>
+              </a:solidFill>
+              <a:latin typeface="Franklin Gothic Demi Cond" pitchFamily="34" charset="0"/>
+              <a:ea typeface="Asia견고딕" pitchFamily="2" charset="-127"/>
+            </a:endParaRPr>
+          </a:p>
+        </p:txBody>
+      </p:sp>
+      <p:sp>
+        <p:nvSpPr>
+          <p:cNvPr id="80" name="직사각형 79">
+            <a:extLst>
+              <a:ext uri="{FF2B5EF4-FFF2-40B4-BE49-F238E27FC236}">
+                <a16:creationId xmlns:a16="http://schemas.microsoft.com/office/drawing/2014/main" id="{0C01068E-561A-481D-BC81-98D84C920528}"/>
+              </a:ext>
+            </a:extLst>
+          </p:cNvPr>
+          <p:cNvSpPr/>
+          <p:nvPr/>
+        </p:nvSpPr>
+        <p:spPr>
+          <a:xfrm>
+            <a:off x="2735288" y="5215508"/>
+            <a:ext cx="3096938" cy="646331"/>
+          </a:xfrm>
+          <a:prstGeom prst="rect">
+            <a:avLst/>
+          </a:prstGeom>
+          <a:scene3d>
+            <a:camera prst="obliqueTopLeft"/>
+            <a:lightRig rig="threePt" dir="t"/>
+          </a:scene3d>
+        </p:spPr>
+        <p:txBody>
+          <a:bodyPr wrap="none">
+            <a:spAutoFit/>
+          </a:bodyPr>
+          <a:lstStyle/>
+          <a:p>
+            <a:pPr lvl="0"/>
+            <a:r>
+              <a:rPr lang="en-US" altLang="ko-KR" sz="3600" dirty="0">
+                <a:solidFill>
+                  <a:schemeClr val="bg1"/>
+                </a:solidFill>
+                <a:latin typeface="Franklin Gothic Demi Cond" pitchFamily="34" charset="0"/>
+                <a:ea typeface="Asia견고딕" pitchFamily="2" charset="-127"/>
+              </a:rPr>
+              <a:t>YOUR TEXT HERE</a:t>
+            </a:r>
+            <a:endParaRPr lang="ko-KR" altLang="en-US" sz="3600" dirty="0">
+              <a:solidFill>
+                <a:schemeClr val="bg1"/>
+              </a:solidFill>
+              <a:latin typeface="Franklin Gothic Demi Cond" pitchFamily="34" charset="0"/>
+              <a:ea typeface="Asia견고딕" pitchFamily="2" charset="-127"/>
+            </a:endParaRPr>
+          </a:p>
+        </p:txBody>
+      </p:sp>
+      <p:sp>
+        <p:nvSpPr>
+          <p:cNvPr id="83" name="직사각형 82">
+            <a:extLst>
+              <a:ext uri="{FF2B5EF4-FFF2-40B4-BE49-F238E27FC236}">
+                <a16:creationId xmlns:a16="http://schemas.microsoft.com/office/drawing/2014/main" id="{1A292680-F232-4767-8840-AB103B451C9A}"/>
+              </a:ext>
+            </a:extLst>
+          </p:cNvPr>
+          <p:cNvSpPr/>
+          <p:nvPr/>
+        </p:nvSpPr>
+        <p:spPr>
+          <a:xfrm>
+            <a:off x="2735288" y="6054993"/>
+            <a:ext cx="3096938" cy="646331"/>
+          </a:xfrm>
+          <a:prstGeom prst="rect">
+            <a:avLst/>
+          </a:prstGeom>
+          <a:scene3d>
+            <a:camera prst="obliqueTopLeft"/>
+            <a:lightRig rig="threePt" dir="t"/>
+          </a:scene3d>
+        </p:spPr>
+        <p:txBody>
+          <a:bodyPr wrap="none">
+            <a:spAutoFit/>
+          </a:bodyPr>
+          <a:lstStyle/>
+          <a:p>
+            <a:pPr lvl="0"/>
+            <a:r>
+              <a:rPr lang="en-US" altLang="ko-KR" sz="3600" dirty="0">
+                <a:solidFill>
+                  <a:schemeClr val="bg1"/>
+                </a:solidFill>
+                <a:latin typeface="Franklin Gothic Demi Cond" pitchFamily="34" charset="0"/>
+                <a:ea typeface="Asia견고딕" pitchFamily="2" charset="-127"/>
+              </a:rPr>
+              <a:t>YOUR TEXT HERE</a:t>
+            </a:r>
+            <a:endParaRPr lang="ko-KR" altLang="en-US" sz="3600" dirty="0">
+              <a:solidFill>
+                <a:schemeClr val="bg1"/>
+              </a:solidFill>
+              <a:latin typeface="Franklin Gothic Demi Cond" pitchFamily="34" charset="0"/>
+              <a:ea typeface="Asia견고딕" pitchFamily="2" charset="-127"/>
+            </a:endParaRPr>
+          </a:p>
+        </p:txBody>
+      </p:sp>
+      <p:sp>
+        <p:nvSpPr>
+          <p:cNvPr id="84" name="직사각형 83">
+            <a:extLst>
+              <a:ext uri="{FF2B5EF4-FFF2-40B4-BE49-F238E27FC236}">
+                <a16:creationId xmlns:a16="http://schemas.microsoft.com/office/drawing/2014/main" id="{77C9533C-AA35-434B-A29D-FAB39311A601}"/>
+              </a:ext>
+            </a:extLst>
+          </p:cNvPr>
+          <p:cNvSpPr/>
+          <p:nvPr/>
+        </p:nvSpPr>
+        <p:spPr>
+          <a:xfrm>
+            <a:off x="2735288" y="6894478"/>
+            <a:ext cx="3096938" cy="646331"/>
+          </a:xfrm>
+          <a:prstGeom prst="rect">
+            <a:avLst/>
+          </a:prstGeom>
+          <a:scene3d>
+            <a:camera prst="obliqueTopLeft"/>
+            <a:lightRig rig="threePt" dir="t"/>
+          </a:scene3d>
+        </p:spPr>
+        <p:txBody>
+          <a:bodyPr wrap="none">
+            <a:spAutoFit/>
+          </a:bodyPr>
+          <a:lstStyle/>
+          <a:p>
+            <a:pPr lvl="0"/>
+            <a:r>
+              <a:rPr lang="en-US" altLang="ko-KR" sz="3600" dirty="0">
+                <a:solidFill>
+                  <a:schemeClr val="bg1"/>
+                </a:solidFill>
+                <a:latin typeface="Franklin Gothic Demi Cond" pitchFamily="34" charset="0"/>
+                <a:ea typeface="Asia견고딕" pitchFamily="2" charset="-127"/>
+              </a:rPr>
+              <a:t>YOUR TEXT HERE</a:t>
+            </a:r>
+            <a:endParaRPr lang="ko-KR" altLang="en-US" sz="3600" dirty="0">
+              <a:solidFill>
+                <a:schemeClr val="bg1"/>
+              </a:solidFill>
+              <a:latin typeface="Franklin Gothic Demi Cond" pitchFamily="34" charset="0"/>
+              <a:ea typeface="Asia견고딕" pitchFamily="2" charset="-127"/>
+            </a:endParaRPr>
+          </a:p>
+        </p:txBody>
+      </p:sp>
+    </p:spTree>
+    <p:extLst>
+      <p:ext uri="{BB962C8B-B14F-4D97-AF65-F5344CB8AC3E}">
+        <p14:creationId xmlns:p14="http://schemas.microsoft.com/office/powerpoint/2010/main" val="564363213"/>
+      </p:ext>
+    </p:extLst>
+  </p:cSld>
+  <p:clrMapOvr>
+    <a:masterClrMapping/>
+  </p:clrMapOvr>
+</p:sld>
+</file>
+
+<file path=ppt/slides/slide6.xml><?xml version="1.0" encoding="utf-8"?>
+<p:sld xmlns:a="http://schemas.openxmlformats.org/drawingml/2006/main" xmlns:r="http://schemas.openxmlformats.org/officeDocument/2006/relationships" xmlns:p="http://schemas.openxmlformats.org/presentationml/2006/main">
+  <p:cSld>
+    <p:spTree>
+      <p:nvGrpSpPr>
+        <p:cNvPr id="1" name=""/>
+        <p:cNvGrpSpPr/>
+        <p:nvPr/>
+      </p:nvGrpSpPr>
+      <p:grpSpPr>
+        <a:xfrm>
+          <a:off x="0" y="0"/>
+          <a:ext cx="0" cy="0"/>
+          <a:chOff x="0" y="0"/>
+          <a:chExt cx="0" cy="0"/>
+        </a:xfrm>
+      </p:grpSpPr>
+      <p:sp>
+        <p:nvSpPr>
+          <p:cNvPr id="4" name="직사각형 3">
+            <a:extLst>
+              <a:ext uri="{FF2B5EF4-FFF2-40B4-BE49-F238E27FC236}">
+                <a16:creationId xmlns:a16="http://schemas.microsoft.com/office/drawing/2014/main" id="{D5A64B69-2679-4832-9701-189B31EF7966}"/>
+              </a:ext>
+            </a:extLst>
+          </p:cNvPr>
+          <p:cNvSpPr/>
+          <p:nvPr/>
+        </p:nvSpPr>
+        <p:spPr>
+          <a:xfrm>
+            <a:off x="5593102" y="2828950"/>
+            <a:ext cx="3837900" cy="3528392"/>
+          </a:xfrm>
+          <a:prstGeom prst="rect">
+            <a:avLst/>
+          </a:prstGeom>
+          <a:solidFill>
+            <a:srgbClr val="7030A0">
+              <a:alpha val="65000"/>
+            </a:srgbClr>
+          </a:solidFill>
+          <a:ln w="25400" cap="flat" cmpd="sng" algn="ctr">
+            <a:solidFill>
+              <a:srgbClr val="7030A0"/>
+            </a:solidFill>
+            <a:prstDash val="solid"/>
+          </a:ln>
+          <a:effectLst/>
+          <a:scene3d>
+            <a:camera prst="obliqueTopLeft"/>
+            <a:lightRig rig="threePt" dir="t"/>
+          </a:scene3d>
+          <a:extLst/>
+        </p:spPr>
+        <p:style>
+          <a:lnRef idx="2">
+            <a:schemeClr val="accent1">
+              <a:shade val="50000"/>
+            </a:schemeClr>
+          </a:lnRef>
+          <a:fillRef idx="1">
+            <a:schemeClr val="accent1"/>
+          </a:fillRef>
+          <a:effectRef idx="0">
+            <a:schemeClr val="accent1"/>
+          </a:effectRef>
+          <a:fontRef idx="minor">
+            <a:schemeClr val="lt1"/>
+          </a:fontRef>
+        </p:style>
+        <p:txBody>
+          <a:bodyPr rtlCol="0" anchor="ctr"/>
+          <a:lstStyle/>
+          <a:p>
+            <a:pPr algn="ctr"/>
+            <a:endParaRPr lang="ko-KR" altLang="en-US"/>
+          </a:p>
+        </p:txBody>
+      </p:sp>
+      <p:sp>
+        <p:nvSpPr>
+          <p:cNvPr id="7" name="다이아몬드 6">
+            <a:extLst>
+              <a:ext uri="{FF2B5EF4-FFF2-40B4-BE49-F238E27FC236}">
+                <a16:creationId xmlns:a16="http://schemas.microsoft.com/office/drawing/2014/main" id="{0B182576-DEAD-4622-A93A-A98994646C1E}"/>
+              </a:ext>
+            </a:extLst>
+          </p:cNvPr>
+          <p:cNvSpPr/>
+          <p:nvPr/>
+        </p:nvSpPr>
+        <p:spPr>
+          <a:xfrm>
+            <a:off x="10320364" y="4018545"/>
+            <a:ext cx="5258316" cy="4948002"/>
+          </a:xfrm>
+          <a:prstGeom prst="diamond">
+            <a:avLst/>
+          </a:prstGeom>
+          <a:solidFill>
+            <a:srgbClr val="0070C0">
+              <a:alpha val="65000"/>
+            </a:srgbClr>
+          </a:solidFill>
+          <a:ln w="25400" cap="flat" cmpd="sng" algn="ctr">
+            <a:solidFill>
+              <a:srgbClr val="0070C0"/>
+            </a:solidFill>
+            <a:prstDash val="solid"/>
+          </a:ln>
+          <a:effectLst/>
+          <a:scene3d>
+            <a:camera prst="obliqueTopLeft"/>
+            <a:lightRig rig="threePt" dir="t"/>
+          </a:scene3d>
+          <a:extLst/>
+        </p:spPr>
+        <p:style>
+          <a:lnRef idx="2">
+            <a:schemeClr val="accent1">
+              <a:shade val="50000"/>
+            </a:schemeClr>
+          </a:lnRef>
+          <a:fillRef idx="1">
+            <a:schemeClr val="accent1"/>
+          </a:fillRef>
+          <a:effectRef idx="0">
+            <a:schemeClr val="accent1"/>
+          </a:effectRef>
+          <a:fontRef idx="minor">
+            <a:schemeClr val="lt1"/>
+          </a:fontRef>
+        </p:style>
+        <p:txBody>
+          <a:bodyPr rtlCol="0" anchor="ctr"/>
+          <a:lstStyle/>
+          <a:p>
+            <a:pPr algn="ctr"/>
+            <a:endParaRPr lang="ko-KR" altLang="en-US"/>
+          </a:p>
+        </p:txBody>
+      </p:sp>
+      <p:sp>
+        <p:nvSpPr>
+          <p:cNvPr id="26" name="타원 25">
+            <a:extLst>
+              <a:ext uri="{FF2B5EF4-FFF2-40B4-BE49-F238E27FC236}">
+                <a16:creationId xmlns:a16="http://schemas.microsoft.com/office/drawing/2014/main" id="{6E1E490B-7096-4FB4-B4AA-7781FB793CFF}"/>
+              </a:ext>
+            </a:extLst>
+          </p:cNvPr>
+          <p:cNvSpPr/>
+          <p:nvPr/>
+        </p:nvSpPr>
+        <p:spPr>
+          <a:xfrm>
+            <a:off x="2663280" y="1399084"/>
+            <a:ext cx="3384376" cy="3384376"/>
+          </a:xfrm>
+          <a:prstGeom prst="ellipse">
+            <a:avLst/>
+          </a:prstGeom>
+          <a:solidFill>
+            <a:schemeClr val="accent2">
+              <a:lumMod val="75000"/>
+              <a:alpha val="65000"/>
+            </a:schemeClr>
+          </a:solidFill>
+          <a:ln w="25400" cap="flat" cmpd="sng" algn="ctr">
+            <a:solidFill>
+              <a:srgbClr val="C00000"/>
+            </a:solidFill>
+            <a:prstDash val="solid"/>
+          </a:ln>
+          <a:effectLst/>
+          <a:scene3d>
+            <a:camera prst="obliqueTopLeft"/>
+            <a:lightRig rig="threePt" dir="t"/>
+          </a:scene3d>
+          <a:extLst/>
+        </p:spPr>
+        <p:style>
+          <a:lnRef idx="2">
+            <a:schemeClr val="accent1">
+              <a:shade val="50000"/>
+            </a:schemeClr>
+          </a:lnRef>
+          <a:fillRef idx="1">
+            <a:schemeClr val="accent1"/>
+          </a:fillRef>
+          <a:effectRef idx="0">
+            <a:schemeClr val="accent1"/>
+          </a:effectRef>
+          <a:fontRef idx="minor">
+            <a:schemeClr val="lt1"/>
+          </a:fontRef>
+        </p:style>
+        <p:txBody>
+          <a:bodyPr rtlCol="0" anchor="ctr"/>
+          <a:lstStyle/>
+          <a:p>
+            <a:pPr algn="ctr"/>
+            <a:endParaRPr lang="ko-KR" altLang="en-US"/>
+          </a:p>
+        </p:txBody>
+      </p:sp>
+      <p:sp>
+        <p:nvSpPr>
+          <p:cNvPr id="99" name="이등변 삼각형 98">
+            <a:extLst>
+              <a:ext uri="{FF2B5EF4-FFF2-40B4-BE49-F238E27FC236}">
+                <a16:creationId xmlns:a16="http://schemas.microsoft.com/office/drawing/2014/main" id="{8456F1D3-AF55-4117-B520-F5AE3B68CA1A}"/>
+              </a:ext>
+            </a:extLst>
+          </p:cNvPr>
+          <p:cNvSpPr/>
+          <p:nvPr/>
+        </p:nvSpPr>
+        <p:spPr>
+          <a:xfrm>
+            <a:off x="7769840" y="3826787"/>
+            <a:ext cx="4092935" cy="3528392"/>
+          </a:xfrm>
+          <a:prstGeom prst="triangle">
+            <a:avLst/>
+          </a:prstGeom>
+          <a:solidFill>
+            <a:srgbClr val="00642D">
+              <a:alpha val="54902"/>
+            </a:srgbClr>
+          </a:solidFill>
+          <a:ln w="25400" cap="flat" cmpd="sng" algn="ctr">
+            <a:solidFill>
+              <a:srgbClr val="003618"/>
+            </a:solidFill>
+            <a:prstDash val="solid"/>
+          </a:ln>
+          <a:effectLst/>
+          <a:extLst/>
+        </p:spPr>
+        <p:style>
+          <a:lnRef idx="2">
+            <a:schemeClr val="accent1">
+              <a:shade val="50000"/>
+            </a:schemeClr>
+          </a:lnRef>
+          <a:fillRef idx="1">
+            <a:schemeClr val="accent1"/>
+          </a:fillRef>
+          <a:effectRef idx="0">
+            <a:schemeClr val="accent1"/>
+          </a:effectRef>
+          <a:fontRef idx="minor">
+            <a:schemeClr val="lt1"/>
+          </a:fontRef>
+        </p:style>
+        <p:txBody>
+          <a:bodyPr rtlCol="0" anchor="ctr"/>
+          <a:lstStyle/>
+          <a:p>
+            <a:pPr algn="ctr"/>
+            <a:endParaRPr lang="ko-KR" altLang="en-US"/>
+          </a:p>
+        </p:txBody>
+      </p:sp>
+    </p:spTree>
+    <p:extLst>
+      <p:ext uri="{BB962C8B-B14F-4D97-AF65-F5344CB8AC3E}">
+        <p14:creationId xmlns:p14="http://schemas.microsoft.com/office/powerpoint/2010/main" val="1299989333"/>
+      </p:ext>
+    </p:extLst>
+  </p:cSld>
+  <p:clrMapOvr>
+    <a:masterClrMapping/>
+  </p:clrMapOvr>
+</p:sld>
+</file>
+
+<file path=ppt/slides/slide7.xml><?xml version="1.0" encoding="utf-8"?>
+<p:sld xmlns:a="http://schemas.openxmlformats.org/drawingml/2006/main" xmlns:r="http://schemas.openxmlformats.org/officeDocument/2006/relationships" xmlns:p="http://schemas.openxmlformats.org/presentationml/2006/main">
+  <p:cSld>
+    <p:spTree>
+      <p:nvGrpSpPr>
+        <p:cNvPr id="1" name=""/>
+        <p:cNvGrpSpPr/>
+        <p:nvPr/>
+      </p:nvGrpSpPr>
+      <p:grpSpPr>
+        <a:xfrm>
+          <a:off x="0" y="0"/>
+          <a:ext cx="0" cy="0"/>
+          <a:chOff x="0" y="0"/>
+          <a:chExt cx="0" cy="0"/>
+        </a:xfrm>
+      </p:grpSpPr>
+      <p:graphicFrame>
+        <p:nvGraphicFramePr>
+          <p:cNvPr id="4" name="개체 3">
+            <a:extLst>
+              <a:ext uri="{FF2B5EF4-FFF2-40B4-BE49-F238E27FC236}">
+                <a16:creationId xmlns:a16="http://schemas.microsoft.com/office/drawing/2014/main" id="{5E818818-EA0A-4958-A22F-15D3F099DA54}"/>
+              </a:ext>
+            </a:extLst>
+          </p:cNvPr>
+          <p:cNvGraphicFramePr>
+            <a:graphicFrameLocks noChangeAspect="1"/>
+          </p:cNvGraphicFramePr>
+          <p:nvPr>
+            <p:extLst>
+              <p:ext uri="{D42A27DB-BD31-4B8C-83A1-F6EECF244321}">
+                <p14:modId xmlns:p14="http://schemas.microsoft.com/office/powerpoint/2010/main" val="1902235080"/>
+              </p:ext>
+            </p:extLst>
+          </p:nvPr>
+        </p:nvGraphicFramePr>
+        <p:xfrm>
+          <a:off x="0" y="0"/>
+          <a:ext cx="18288000" cy="10303670"/>
+        </p:xfrm>
+        <a:graphic>
+          <a:graphicData uri="http://schemas.openxmlformats.org/presentationml/2006/ole">
+            <mc:AlternateContent xmlns:mc="http://schemas.openxmlformats.org/markup-compatibility/2006">
+              <mc:Choice xmlns:v="urn:schemas-microsoft-com:vml" Requires="v">
+                <p:oleObj spid="_x0000_s1043" name="Image" r:id="rId3" imgW="24380640" imgH="13714200" progId="Photoshop.Image.19">
+                  <p:embed/>
+                </p:oleObj>
+              </mc:Choice>
+              <mc:Fallback>
+                <p:oleObj name="Image" r:id="rId3" imgW="24380640" imgH="13714200" progId="Photoshop.Image.19">
+                  <p:embed/>
+                  <p:pic>
+                    <p:nvPicPr>
+                      <p:cNvPr id="0" name=""/>
+                      <p:cNvPicPr/>
+                      <p:nvPr/>
+                    </p:nvPicPr>
+                    <p:blipFill>
+                      <a:blip r:embed="rId4">
+                        <a:alphaModFix amt="65000"/>
+                      </a:blip>
+                      <a:stretch>
+                        <a:fillRect/>
+                      </a:stretch>
+                    </p:blipFill>
+                    <p:spPr>
+                      <a:xfrm>
+                        <a:off x="0" y="0"/>
+                        <a:ext cx="18288000" cy="10303670"/>
+                      </a:xfrm>
+                      <a:prstGeom prst="rect">
+                        <a:avLst/>
+                      </a:prstGeom>
+                    </p:spPr>
+                  </p:pic>
+                </p:oleObj>
+              </mc:Fallback>
+            </mc:AlternateContent>
+          </a:graphicData>
+        </a:graphic>
+      </p:graphicFrame>
+      <p:sp>
+        <p:nvSpPr>
+          <p:cNvPr id="17" name="TextBox 16">
+            <a:extLst>
+              <a:ext uri="{FF2B5EF4-FFF2-40B4-BE49-F238E27FC236}">
+                <a16:creationId xmlns:a16="http://schemas.microsoft.com/office/drawing/2014/main" id="{993D7C1D-E9C5-40D5-8536-2EBF3B4B6C97}"/>
+              </a:ext>
+            </a:extLst>
+          </p:cNvPr>
+          <p:cNvSpPr txBox="1"/>
+          <p:nvPr/>
+        </p:nvSpPr>
+        <p:spPr>
+          <a:xfrm>
+            <a:off x="5491333" y="4420225"/>
+            <a:ext cx="7305333" cy="1446550"/>
           </a:xfrm>
           <a:prstGeom prst="rect">
             <a:avLst/>
@@ -6381,56 +5423,21 @@
           <a:p>
             <a:pPr lvl="0"/>
             <a:r>
-              <a:rPr lang="en-US" altLang="ko-KR" sz="7200" dirty="0">
-                <a:solidFill>
-                  <a:srgbClr val="EBEBEB"/>
-                </a:solidFill>
-                <a:effectLst>
-                  <a:glow rad="127000">
-                    <a:prstClr val="black">
-                      <a:lumMod val="75000"/>
-                      <a:lumOff val="25000"/>
-                    </a:prstClr>
-                  </a:glow>
-                </a:effectLst>
+              <a:rPr lang="en-US" altLang="ko-KR" sz="8800" dirty="0">
+                <a:solidFill>
+                  <a:schemeClr val="bg1"/>
+                </a:solidFill>
+                <a:effectLst/>
                 <a:latin typeface="Franklin Gothic Demi Cond" pitchFamily="34" charset="0"/>
                 <a:ea typeface="Asia견고딕" pitchFamily="2" charset="-127"/>
               </a:rPr>
-              <a:t>The days we had, the songs</a:t>
-            </a:r>
-          </a:p>
-          <a:p>
-            <a:pPr lvl="0"/>
-            <a:r>
-              <a:rPr lang="en-US" altLang="ko-KR" sz="7200" dirty="0">
-                <a:solidFill>
-                  <a:srgbClr val="EBEBEB"/>
-                </a:solidFill>
-                <a:effectLst>
-                  <a:glow rad="127000">
-                    <a:prstClr val="black">
-                      <a:lumMod val="75000"/>
-                      <a:lumOff val="25000"/>
-                    </a:prstClr>
-                  </a:glow>
-                </a:effectLst>
-                <a:latin typeface="Franklin Gothic Demi Cond" pitchFamily="34" charset="0"/>
-                <a:ea typeface="Asia견고딕" pitchFamily="2" charset="-127"/>
-              </a:rPr>
-              <a:t>we sang together Oh yeah</a:t>
-            </a:r>
-            <a:endParaRPr lang="ko-KR" altLang="en-US" sz="7200" dirty="0">
+              <a:t>YOUR TEXT HERE</a:t>
+            </a:r>
+            <a:endParaRPr lang="ko-KR" altLang="en-US" sz="8800" dirty="0">
               <a:solidFill>
-                <a:srgbClr val="EBEBEB"/>
+                <a:schemeClr val="bg1"/>
               </a:solidFill>
-              <a:effectLst>
-                <a:glow rad="127000">
-                  <a:prstClr val="black">
-                    <a:lumMod val="75000"/>
-                    <a:lumOff val="25000"/>
-                  </a:prstClr>
-                </a:glow>
-              </a:effectLst>
+              <a:effectLst/>
               <a:latin typeface="Franklin Gothic Demi Cond" pitchFamily="34" charset="0"/>
               <a:ea typeface="Asia견고딕" pitchFamily="2" charset="-127"/>
             </a:endParaRPr>
@@ -6440,7 +5447,7 @@
     </p:spTree>
     <p:extLst>
       <p:ext uri="{BB962C8B-B14F-4D97-AF65-F5344CB8AC3E}">
-        <p14:creationId xmlns:p14="http://schemas.microsoft.com/office/powerpoint/2010/main" val="3976723271"/>
+        <p14:creationId xmlns:p14="http://schemas.microsoft.com/office/powerpoint/2010/main" val="58882818"/>
       </p:ext>
     </p:extLst>
   </p:cSld>
@@ -6450,17 +5457,9 @@
 </p:sld>
 </file>
 
-<file path=ppt/slides/slide5.xml><?xml version="1.0" encoding="utf-8"?>
-<p:sld xmlns:a="http://schemas.openxmlformats.org/drawingml/2006/main" xmlns:r="http://schemas.openxmlformats.org/officeDocument/2006/relationships" xmlns:p="http://schemas.openxmlformats.org/presentationml/2006/main">
+<file path=ppt/slides/slide8.xml><?xml version="1.0" encoding="utf-8"?>
+<p:sld xmlns:a="http://schemas.openxmlformats.org/drawingml/2006/main" xmlns:r="http://schemas.openxmlformats.org/officeDocument/2006/relationships" xmlns:p="http://schemas.openxmlformats.org/presentationml/2006/main" show="0">
   <p:cSld>
-    <p:bg>
-      <p:bgPr>
-        <a:solidFill>
-          <a:schemeClr val="tx1"/>
-        </a:solidFill>
-        <a:effectLst/>
-      </p:bgPr>
-    </p:bg>
     <p:spTree>
       <p:nvGrpSpPr>
         <p:cNvPr id="1" name=""/>
@@ -6477,14 +5476,193 @@
       </p:grpSpPr>
       <p:sp>
         <p:nvSpPr>
-          <p:cNvPr id="2" name="TextBox 1"/>
+          <p:cNvPr id="3" name="TextBox 2">
+            <a:extLst>
+              <a:ext uri="{FF2B5EF4-FFF2-40B4-BE49-F238E27FC236}">
+                <a16:creationId xmlns:a16="http://schemas.microsoft.com/office/drawing/2014/main" id="{B7A45DEE-FC35-4811-8351-F3C4477D1C39}"/>
+              </a:ext>
+            </a:extLst>
+          </p:cNvPr>
           <p:cNvSpPr txBox="1"/>
           <p:nvPr/>
         </p:nvSpPr>
         <p:spPr>
           <a:xfrm>
-            <a:off x="1800000" y="7038000"/>
-            <a:ext cx="13700802" cy="2308324"/>
+            <a:off x="6764630" y="4728001"/>
+            <a:ext cx="4758739" cy="830997"/>
+          </a:xfrm>
+          <a:prstGeom prst="rect">
+            <a:avLst/>
+          </a:prstGeom>
+          <a:solidFill>
+            <a:schemeClr val="tx1">
+              <a:lumMod val="85000"/>
+              <a:lumOff val="15000"/>
+            </a:schemeClr>
+          </a:solidFill>
+          <a:scene3d>
+            <a:camera prst="perspectiveFront"/>
+            <a:lightRig rig="threePt" dir="t"/>
+          </a:scene3d>
+        </p:spPr>
+        <p:txBody>
+          <a:bodyPr wrap="none" rtlCol="0">
+            <a:spAutoFit/>
+          </a:bodyPr>
+          <a:lstStyle/>
+          <a:p>
+            <a:pPr marL="0" marR="0" lvl="0" indent="0" algn="l" defTabSz="914400" rtl="0" eaLnBrk="1" fontAlgn="auto" latinLnBrk="1" hangingPunct="1">
+              <a:lnSpc>
+                <a:spcPct val="100000"/>
+              </a:lnSpc>
+              <a:spcBef>
+                <a:spcPts val="0"/>
+              </a:spcBef>
+              <a:spcAft>
+                <a:spcPts val="0"/>
+              </a:spcAft>
+              <a:buClrTx/>
+              <a:buSzTx/>
+              <a:buFontTx/>
+              <a:buNone/>
+              <a:tabLst/>
+              <a:defRPr/>
+            </a:pPr>
+            <a:r>
+              <a:rPr kumimoji="0" lang="en-US" altLang="ko-KR" sz="4800" b="0" i="0" u="none" strike="noStrike" kern="1200" cap="none" spc="0" normalizeH="0" baseline="0" noProof="0" dirty="0">
+                <a:ln>
+                  <a:noFill/>
+                </a:ln>
+                <a:solidFill>
+                  <a:srgbClr val="EBEBEB"/>
+                </a:solidFill>
+                <a:effectLst/>
+                <a:uLnTx/>
+                <a:uFillTx/>
+                <a:latin typeface="Franklin Gothic Demi Cond" pitchFamily="34" charset="0"/>
+                <a:ea typeface="Asia견고딕" pitchFamily="2" charset="-127"/>
+                <a:cs typeface="+mn-cs"/>
+              </a:rPr>
+              <a:t>HIDDEN SLIDE TEST</a:t>
+            </a:r>
+            <a:endParaRPr kumimoji="0" lang="ko-KR" altLang="en-US" sz="4800" b="0" i="0" u="none" strike="noStrike" kern="1200" cap="none" spc="0" normalizeH="0" baseline="0" noProof="0" dirty="0">
+              <a:ln>
+                <a:noFill/>
+              </a:ln>
+              <a:solidFill>
+                <a:srgbClr val="EBEBEB"/>
+              </a:solidFill>
+              <a:effectLst/>
+              <a:uLnTx/>
+              <a:uFillTx/>
+              <a:latin typeface="Franklin Gothic Demi Cond" pitchFamily="34" charset="0"/>
+              <a:ea typeface="Asia견고딕" pitchFamily="2" charset="-127"/>
+              <a:cs typeface="+mn-cs"/>
+            </a:endParaRPr>
+          </a:p>
+        </p:txBody>
+      </p:sp>
+    </p:spTree>
+    <p:extLst>
+      <p:ext uri="{BB962C8B-B14F-4D97-AF65-F5344CB8AC3E}">
+        <p14:creationId xmlns:p14="http://schemas.microsoft.com/office/powerpoint/2010/main" val="1025929777"/>
+      </p:ext>
+    </p:extLst>
+  </p:cSld>
+  <p:clrMapOvr>
+    <a:masterClrMapping/>
+  </p:clrMapOvr>
+</p:sld>
+</file>
+
+<file path=ppt/slides/slide9.xml><?xml version="1.0" encoding="utf-8"?>
+<p:sld xmlns:a="http://schemas.openxmlformats.org/drawingml/2006/main" xmlns:r="http://schemas.openxmlformats.org/officeDocument/2006/relationships" xmlns:p="http://schemas.openxmlformats.org/presentationml/2006/main">
+  <p:cSld>
+    <p:spTree>
+      <p:nvGrpSpPr>
+        <p:cNvPr id="1" name=""/>
+        <p:cNvGrpSpPr/>
+        <p:nvPr/>
+      </p:nvGrpSpPr>
+      <p:grpSpPr>
+        <a:xfrm>
+          <a:off x="0" y="0"/>
+          <a:ext cx="0" cy="0"/>
+          <a:chOff x="0" y="0"/>
+          <a:chExt cx="0" cy="0"/>
+        </a:xfrm>
+      </p:grpSpPr>
+      <p:sp>
+        <p:nvSpPr>
+          <p:cNvPr id="2" name="직사각형 1">
+            <a:extLst>
+              <a:ext uri="{FF2B5EF4-FFF2-40B4-BE49-F238E27FC236}">
+                <a16:creationId xmlns:a16="http://schemas.microsoft.com/office/drawing/2014/main" id="{4B243646-AE74-4F32-89B4-44F988F4C801}"/>
+              </a:ext>
+            </a:extLst>
+          </p:cNvPr>
+          <p:cNvSpPr/>
+          <p:nvPr/>
+        </p:nvSpPr>
+        <p:spPr>
+          <a:xfrm>
+            <a:off x="0" y="0"/>
+            <a:ext cx="18288000" cy="10287000"/>
+          </a:xfrm>
+          <a:prstGeom prst="rect">
+            <a:avLst/>
+          </a:prstGeom>
+          <a:solidFill>
+            <a:srgbClr val="002060"/>
+          </a:solidFill>
+          <a:ln w="25400" cap="flat" cmpd="sng" algn="ctr">
+            <a:noFill/>
+            <a:prstDash val="solid"/>
+          </a:ln>
+          <a:effectLst/>
+          <a:extLst/>
+        </p:spPr>
+        <p:style>
+          <a:lnRef idx="2">
+            <a:schemeClr val="accent1">
+              <a:shade val="50000"/>
+            </a:schemeClr>
+          </a:lnRef>
+          <a:fillRef idx="1">
+            <a:schemeClr val="accent1"/>
+          </a:fillRef>
+          <a:effectRef idx="0">
+            <a:schemeClr val="accent1"/>
+          </a:effectRef>
+          <a:fontRef idx="minor">
+            <a:schemeClr val="lt1"/>
+          </a:fontRef>
+        </p:style>
+        <p:txBody>
+          <a:bodyPr rtlCol="0" anchor="ctr"/>
+          <a:lstStyle/>
+          <a:p>
+            <a:pPr algn="ctr"/>
+            <a:endParaRPr lang="ko-KR" altLang="en-US"/>
+          </a:p>
+        </p:txBody>
+      </p:sp>
+      <p:sp>
+        <p:nvSpPr>
+          <p:cNvPr id="17" name="TextBox 16">
+            <a:extLst>
+              <a:ext uri="{FF2B5EF4-FFF2-40B4-BE49-F238E27FC236}">
+                <a16:creationId xmlns:a16="http://schemas.microsoft.com/office/drawing/2014/main" id="{993D7C1D-E9C5-40D5-8536-2EBF3B4B6C97}"/>
+              </a:ext>
+            </a:extLst>
+          </p:cNvPr>
+          <p:cNvSpPr txBox="1"/>
+          <p:nvPr/>
+        </p:nvSpPr>
+        <p:spPr>
+          <a:xfrm>
+            <a:off x="5491333" y="4420225"/>
+            <a:ext cx="7305333" cy="1446550"/>
           </a:xfrm>
           <a:prstGeom prst="rect">
             <a:avLst/>
@@ -6501,60 +5679,53 @@
           </a:bodyPr>
           <a:lstStyle/>
           <a:p>
-            <a:pPr lvl="0"/>
-            <a:r>
-              <a:rPr lang="en-US" altLang="ko-KR" sz="7200" dirty="0">
-                <a:solidFill>
-                  <a:srgbClr val="EBEBEB"/>
-                </a:solidFill>
-                <a:effectLst>
-                  <a:glow rad="127000">
-                    <a:prstClr val="black">
-                      <a:lumMod val="75000"/>
-                      <a:lumOff val="25000"/>
-                    </a:prstClr>
-                  </a:glow>
-                </a:effectLst>
+            <a:pPr marL="0" marR="0" lvl="0" indent="0" algn="l" defTabSz="914400" rtl="0" eaLnBrk="1" fontAlgn="auto" latinLnBrk="1" hangingPunct="1">
+              <a:lnSpc>
+                <a:spcPct val="100000"/>
+              </a:lnSpc>
+              <a:spcBef>
+                <a:spcPts val="0"/>
+              </a:spcBef>
+              <a:spcAft>
+                <a:spcPts val="0"/>
+              </a:spcAft>
+              <a:buClrTx/>
+              <a:buSzTx/>
+              <a:buFontTx/>
+              <a:buNone/>
+              <a:tabLst/>
+              <a:defRPr/>
+            </a:pPr>
+            <a:r>
+              <a:rPr kumimoji="0" lang="en-US" altLang="ko-KR" sz="8800" b="0" i="0" u="none" strike="noStrike" kern="1200" cap="none" spc="0" normalizeH="0" baseline="0" noProof="0" dirty="0">
+                <a:ln>
+                  <a:noFill/>
+                </a:ln>
+                <a:solidFill>
+                  <a:prstClr val="white"/>
+                </a:solidFill>
+                <a:effectLst/>
+                <a:uLnTx/>
+                <a:uFillTx/>
                 <a:latin typeface="Franklin Gothic Demi Cond" pitchFamily="34" charset="0"/>
                 <a:ea typeface="Asia견고딕" pitchFamily="2" charset="-127"/>
+                <a:cs typeface="+mn-cs"/>
               </a:rPr>
-              <a:t>And oh, my love I'm holding on forever</a:t>
-            </a:r>
-          </a:p>
-          <a:p>
-            <a:pPr lvl="0"/>
-            <a:r>
-              <a:rPr lang="en-US" altLang="ko-KR" sz="7200" dirty="0">
-                <a:solidFill>
-                  <a:srgbClr val="EBEBEB"/>
-                </a:solidFill>
-                <a:effectLst>
-                  <a:glow rad="127000">
-                    <a:prstClr val="black">
-                      <a:lumMod val="75000"/>
-                      <a:lumOff val="25000"/>
-                    </a:prstClr>
-                  </a:glow>
-                </a:effectLst>
-                <a:latin typeface="Franklin Gothic Demi Cond" pitchFamily="34" charset="0"/>
-                <a:ea typeface="Asia견고딕" pitchFamily="2" charset="-127"/>
-              </a:rPr>
-              <a:t>Reaching for the love that seems so far</a:t>
-            </a:r>
-            <a:endParaRPr lang="ko-KR" altLang="en-US" sz="7200" dirty="0">
+              <a:t>YOUR TEXT HERE</a:t>
+            </a:r>
+            <a:endParaRPr kumimoji="0" lang="ko-KR" altLang="en-US" sz="8800" b="0" i="0" u="none" strike="noStrike" kern="1200" cap="none" spc="0" normalizeH="0" baseline="0" noProof="0" dirty="0">
+              <a:ln>
+                <a:noFill/>
+              </a:ln>
               <a:solidFill>
-                <a:srgbClr val="EBEBEB"/>
+                <a:prstClr val="white"/>
               </a:solidFill>
-              <a:effectLst>
-                <a:glow rad="127000">
-                  <a:prstClr val="black">
-                    <a:lumMod val="75000"/>
-                    <a:lumOff val="25000"/>
-                  </a:prstClr>
-                </a:glow>
-              </a:effectLst>
+              <a:effectLst/>
+              <a:uLnTx/>
+              <a:uFillTx/>
               <a:latin typeface="Franklin Gothic Demi Cond" pitchFamily="34" charset="0"/>
               <a:ea typeface="Asia견고딕" pitchFamily="2" charset="-127"/>
+              <a:cs typeface="+mn-cs"/>
             </a:endParaRPr>
           </a:p>
         </p:txBody>
@@ -6562,495 +5733,7 @@
     </p:spTree>
     <p:extLst>
       <p:ext uri="{BB962C8B-B14F-4D97-AF65-F5344CB8AC3E}">
-        <p14:creationId xmlns:p14="http://schemas.microsoft.com/office/powerpoint/2010/main" val="938371237"/>
-      </p:ext>
-    </p:extLst>
-  </p:cSld>
-  <p:clrMapOvr>
-    <a:masterClrMapping/>
-  </p:clrMapOvr>
-</p:sld>
-</file>
-
-<file path=ppt/slides/slide6.xml><?xml version="1.0" encoding="utf-8"?>
-<p:sld xmlns:a="http://schemas.openxmlformats.org/drawingml/2006/main" xmlns:r="http://schemas.openxmlformats.org/officeDocument/2006/relationships" xmlns:p="http://schemas.openxmlformats.org/presentationml/2006/main">
-  <p:cSld>
-    <p:bg>
-      <p:bgPr>
-        <a:solidFill>
-          <a:schemeClr val="tx1"/>
-        </a:solidFill>
-        <a:effectLst/>
-      </p:bgPr>
-    </p:bg>
-    <p:spTree>
-      <p:nvGrpSpPr>
-        <p:cNvPr id="1" name=""/>
-        <p:cNvGrpSpPr/>
-        <p:nvPr/>
-      </p:nvGrpSpPr>
-      <p:grpSpPr>
-        <a:xfrm>
-          <a:off x="0" y="0"/>
-          <a:ext cx="0" cy="0"/>
-          <a:chOff x="0" y="0"/>
-          <a:chExt cx="0" cy="0"/>
-        </a:xfrm>
-      </p:grpSpPr>
-      <p:sp>
-        <p:nvSpPr>
-          <p:cNvPr id="2" name="TextBox 1"/>
-          <p:cNvSpPr txBox="1"/>
-          <p:nvPr/>
-        </p:nvSpPr>
-        <p:spPr>
-          <a:xfrm>
-            <a:off x="1800000" y="7038000"/>
-            <a:ext cx="13748636" cy="2308324"/>
-          </a:xfrm>
-          <a:prstGeom prst="rect">
-            <a:avLst/>
-          </a:prstGeom>
-          <a:noFill/>
-          <a:scene3d>
-            <a:camera prst="perspectiveFront"/>
-            <a:lightRig rig="threePt" dir="t"/>
-          </a:scene3d>
-        </p:spPr>
-        <p:txBody>
-          <a:bodyPr wrap="none" rtlCol="0">
-            <a:spAutoFit/>
-          </a:bodyPr>
-          <a:lstStyle/>
-          <a:p>
-            <a:pPr lvl="0"/>
-            <a:r>
-              <a:rPr lang="en-US" altLang="ko-KR" sz="7200" dirty="0">
-                <a:solidFill>
-                  <a:srgbClr val="EBEBEB"/>
-                </a:solidFill>
-                <a:effectLst>
-                  <a:glow rad="127000">
-                    <a:prstClr val="black">
-                      <a:lumMod val="75000"/>
-                      <a:lumOff val="25000"/>
-                    </a:prstClr>
-                  </a:glow>
-                </a:effectLst>
-                <a:latin typeface="Franklin Gothic Demi Cond" pitchFamily="34" charset="0"/>
-                <a:ea typeface="Asia견고딕" pitchFamily="2" charset="-127"/>
-              </a:rPr>
-              <a:t>So I say a little prayer</a:t>
-            </a:r>
-          </a:p>
-          <a:p>
-            <a:pPr lvl="0"/>
-            <a:r>
-              <a:rPr lang="en-US" altLang="ko-KR" sz="7200" dirty="0">
-                <a:solidFill>
-                  <a:srgbClr val="EBEBEB"/>
-                </a:solidFill>
-                <a:effectLst>
-                  <a:glow rad="127000">
-                    <a:prstClr val="black">
-                      <a:lumMod val="75000"/>
-                      <a:lumOff val="25000"/>
-                    </a:prstClr>
-                  </a:glow>
-                </a:effectLst>
-                <a:latin typeface="Franklin Gothic Demi Cond" pitchFamily="34" charset="0"/>
-                <a:ea typeface="Asia견고딕" pitchFamily="2" charset="-127"/>
-              </a:rPr>
-              <a:t>And hope my dreams will take me there</a:t>
-            </a:r>
-            <a:endParaRPr lang="ko-KR" altLang="en-US" sz="7200" dirty="0">
-              <a:solidFill>
-                <a:srgbClr val="EBEBEB"/>
-              </a:solidFill>
-              <a:effectLst>
-                <a:glow rad="127000">
-                  <a:prstClr val="black">
-                    <a:lumMod val="75000"/>
-                    <a:lumOff val="25000"/>
-                  </a:prstClr>
-                </a:glow>
-              </a:effectLst>
-              <a:latin typeface="Franklin Gothic Demi Cond" pitchFamily="34" charset="0"/>
-              <a:ea typeface="Asia견고딕" pitchFamily="2" charset="-127"/>
-            </a:endParaRPr>
-          </a:p>
-        </p:txBody>
-      </p:sp>
-    </p:spTree>
-    <p:extLst>
-      <p:ext uri="{BB962C8B-B14F-4D97-AF65-F5344CB8AC3E}">
-        <p14:creationId xmlns:p14="http://schemas.microsoft.com/office/powerpoint/2010/main" val="3145802224"/>
-      </p:ext>
-    </p:extLst>
-  </p:cSld>
-  <p:clrMapOvr>
-    <a:masterClrMapping/>
-  </p:clrMapOvr>
-</p:sld>
-</file>
-
-<file path=ppt/slides/slide7.xml><?xml version="1.0" encoding="utf-8"?>
-<p:sld xmlns:a="http://schemas.openxmlformats.org/drawingml/2006/main" xmlns:r="http://schemas.openxmlformats.org/officeDocument/2006/relationships" xmlns:p="http://schemas.openxmlformats.org/presentationml/2006/main">
-  <p:cSld>
-    <p:bg>
-      <p:bgPr>
-        <a:solidFill>
-          <a:schemeClr val="tx1"/>
-        </a:solidFill>
-        <a:effectLst/>
-      </p:bgPr>
-    </p:bg>
-    <p:spTree>
-      <p:nvGrpSpPr>
-        <p:cNvPr id="1" name=""/>
-        <p:cNvGrpSpPr/>
-        <p:nvPr/>
-      </p:nvGrpSpPr>
-      <p:grpSpPr>
-        <a:xfrm>
-          <a:off x="0" y="0"/>
-          <a:ext cx="0" cy="0"/>
-          <a:chOff x="0" y="0"/>
-          <a:chExt cx="0" cy="0"/>
-        </a:xfrm>
-      </p:grpSpPr>
-      <p:sp>
-        <p:nvSpPr>
-          <p:cNvPr id="2" name="TextBox 1"/>
-          <p:cNvSpPr txBox="1"/>
-          <p:nvPr/>
-        </p:nvSpPr>
-        <p:spPr>
-          <a:xfrm>
-            <a:off x="1800000" y="7038000"/>
-            <a:ext cx="10662727" cy="2308324"/>
-          </a:xfrm>
-          <a:prstGeom prst="rect">
-            <a:avLst/>
-          </a:prstGeom>
-          <a:noFill/>
-          <a:scene3d>
-            <a:camera prst="perspectiveFront"/>
-            <a:lightRig rig="threePt" dir="t"/>
-          </a:scene3d>
-        </p:spPr>
-        <p:txBody>
-          <a:bodyPr wrap="none" rtlCol="0">
-            <a:spAutoFit/>
-          </a:bodyPr>
-          <a:lstStyle/>
-          <a:p>
-            <a:pPr lvl="0"/>
-            <a:r>
-              <a:rPr lang="en-US" altLang="ko-KR" sz="7200" dirty="0">
-                <a:solidFill>
-                  <a:srgbClr val="EBEBEB"/>
-                </a:solidFill>
-                <a:effectLst>
-                  <a:glow rad="127000">
-                    <a:prstClr val="black">
-                      <a:lumMod val="75000"/>
-                      <a:lumOff val="25000"/>
-                    </a:prstClr>
-                  </a:glow>
-                </a:effectLst>
-                <a:latin typeface="Franklin Gothic Demi Cond" pitchFamily="34" charset="0"/>
-                <a:ea typeface="Asia견고딕" pitchFamily="2" charset="-127"/>
-              </a:rPr>
-              <a:t>Where the skies are blue</a:t>
-            </a:r>
-          </a:p>
-          <a:p>
-            <a:pPr lvl="0"/>
-            <a:r>
-              <a:rPr lang="en-US" altLang="ko-KR" sz="7200" dirty="0">
-                <a:solidFill>
-                  <a:srgbClr val="EBEBEB"/>
-                </a:solidFill>
-                <a:effectLst>
-                  <a:glow rad="127000">
-                    <a:prstClr val="black">
-                      <a:lumMod val="75000"/>
-                      <a:lumOff val="25000"/>
-                    </a:prstClr>
-                  </a:glow>
-                </a:effectLst>
-                <a:latin typeface="Franklin Gothic Demi Cond" pitchFamily="34" charset="0"/>
-                <a:ea typeface="Asia견고딕" pitchFamily="2" charset="-127"/>
-              </a:rPr>
-              <a:t>To see you once again, my love</a:t>
-            </a:r>
-            <a:endParaRPr lang="ko-KR" altLang="en-US" sz="7200" dirty="0">
-              <a:solidFill>
-                <a:srgbClr val="EBEBEB"/>
-              </a:solidFill>
-              <a:effectLst>
-                <a:glow rad="127000">
-                  <a:prstClr val="black">
-                    <a:lumMod val="75000"/>
-                    <a:lumOff val="25000"/>
-                  </a:prstClr>
-                </a:glow>
-              </a:effectLst>
-              <a:latin typeface="Franklin Gothic Demi Cond" pitchFamily="34" charset="0"/>
-              <a:ea typeface="Asia견고딕" pitchFamily="2" charset="-127"/>
-            </a:endParaRPr>
-          </a:p>
-        </p:txBody>
-      </p:sp>
-    </p:spTree>
-    <p:extLst>
-      <p:ext uri="{BB962C8B-B14F-4D97-AF65-F5344CB8AC3E}">
-        <p14:creationId xmlns:p14="http://schemas.microsoft.com/office/powerpoint/2010/main" val="326056625"/>
-      </p:ext>
-    </p:extLst>
-  </p:cSld>
-  <p:clrMapOvr>
-    <a:masterClrMapping/>
-  </p:clrMapOvr>
-</p:sld>
-</file>
-
-<file path=ppt/slides/slide8.xml><?xml version="1.0" encoding="utf-8"?>
-<p:sld xmlns:a="http://schemas.openxmlformats.org/drawingml/2006/main" xmlns:r="http://schemas.openxmlformats.org/officeDocument/2006/relationships" xmlns:p="http://schemas.openxmlformats.org/presentationml/2006/main">
-  <p:cSld>
-    <p:bg>
-      <p:bgPr>
-        <a:solidFill>
-          <a:schemeClr val="tx1"/>
-        </a:solidFill>
-        <a:effectLst/>
-      </p:bgPr>
-    </p:bg>
-    <p:spTree>
-      <p:nvGrpSpPr>
-        <p:cNvPr id="1" name=""/>
-        <p:cNvGrpSpPr/>
-        <p:nvPr/>
-      </p:nvGrpSpPr>
-      <p:grpSpPr>
-        <a:xfrm>
-          <a:off x="0" y="0"/>
-          <a:ext cx="0" cy="0"/>
-          <a:chOff x="0" y="0"/>
-          <a:chExt cx="0" cy="0"/>
-        </a:xfrm>
-      </p:grpSpPr>
-      <p:sp>
-        <p:nvSpPr>
-          <p:cNvPr id="2" name="TextBox 1"/>
-          <p:cNvSpPr txBox="1"/>
-          <p:nvPr/>
-        </p:nvSpPr>
-        <p:spPr>
-          <a:xfrm>
-            <a:off x="1800000" y="7038000"/>
-            <a:ext cx="10425483" cy="2308324"/>
-          </a:xfrm>
-          <a:prstGeom prst="rect">
-            <a:avLst/>
-          </a:prstGeom>
-          <a:noFill/>
-          <a:scene3d>
-            <a:camera prst="perspectiveFront"/>
-            <a:lightRig rig="threePt" dir="t"/>
-          </a:scene3d>
-        </p:spPr>
-        <p:txBody>
-          <a:bodyPr wrap="none" rtlCol="0">
-            <a:spAutoFit/>
-          </a:bodyPr>
-          <a:lstStyle/>
-          <a:p>
-            <a:pPr lvl="0"/>
-            <a:r>
-              <a:rPr lang="en-US" altLang="ko-KR" sz="7200" dirty="0">
-                <a:solidFill>
-                  <a:srgbClr val="EBEBEB"/>
-                </a:solidFill>
-                <a:effectLst>
-                  <a:glow rad="127000">
-                    <a:prstClr val="black">
-                      <a:lumMod val="75000"/>
-                      <a:lumOff val="25000"/>
-                    </a:prstClr>
-                  </a:glow>
-                </a:effectLst>
-                <a:latin typeface="Franklin Gothic Demi Cond" pitchFamily="34" charset="0"/>
-                <a:ea typeface="Asia견고딕" pitchFamily="2" charset="-127"/>
-              </a:rPr>
-              <a:t>Overseas from coast to coast</a:t>
-            </a:r>
-          </a:p>
-          <a:p>
-            <a:pPr lvl="0"/>
-            <a:r>
-              <a:rPr lang="en-US" altLang="ko-KR" sz="7200" dirty="0">
-                <a:solidFill>
-                  <a:srgbClr val="EBEBEB"/>
-                </a:solidFill>
-                <a:effectLst>
-                  <a:glow rad="127000">
-                    <a:prstClr val="black">
-                      <a:lumMod val="75000"/>
-                      <a:lumOff val="25000"/>
-                    </a:prstClr>
-                  </a:glow>
-                </a:effectLst>
-                <a:latin typeface="Franklin Gothic Demi Cond" pitchFamily="34" charset="0"/>
-                <a:ea typeface="Asia견고딕" pitchFamily="2" charset="-127"/>
-              </a:rPr>
-              <a:t>To find a place I love the most</a:t>
-            </a:r>
-            <a:endParaRPr lang="ko-KR" altLang="en-US" sz="7200" dirty="0">
-              <a:solidFill>
-                <a:srgbClr val="EBEBEB"/>
-              </a:solidFill>
-              <a:effectLst>
-                <a:glow rad="127000">
-                  <a:prstClr val="black">
-                    <a:lumMod val="75000"/>
-                    <a:lumOff val="25000"/>
-                  </a:prstClr>
-                </a:glow>
-              </a:effectLst>
-              <a:latin typeface="Franklin Gothic Demi Cond" pitchFamily="34" charset="0"/>
-              <a:ea typeface="Asia견고딕" pitchFamily="2" charset="-127"/>
-            </a:endParaRPr>
-          </a:p>
-        </p:txBody>
-      </p:sp>
-    </p:spTree>
-    <p:extLst>
-      <p:ext uri="{BB962C8B-B14F-4D97-AF65-F5344CB8AC3E}">
-        <p14:creationId xmlns:p14="http://schemas.microsoft.com/office/powerpoint/2010/main" val="3110538793"/>
-      </p:ext>
-    </p:extLst>
-  </p:cSld>
-  <p:clrMapOvr>
-    <a:masterClrMapping/>
-  </p:clrMapOvr>
-</p:sld>
-</file>
-
-<file path=ppt/slides/slide9.xml><?xml version="1.0" encoding="utf-8"?>
-<p:sld xmlns:a="http://schemas.openxmlformats.org/drawingml/2006/main" xmlns:r="http://schemas.openxmlformats.org/officeDocument/2006/relationships" xmlns:p="http://schemas.openxmlformats.org/presentationml/2006/main">
-  <p:cSld>
-    <p:bg>
-      <p:bgPr>
-        <a:solidFill>
-          <a:schemeClr val="tx1"/>
-        </a:solidFill>
-        <a:effectLst/>
-      </p:bgPr>
-    </p:bg>
-    <p:spTree>
-      <p:nvGrpSpPr>
-        <p:cNvPr id="1" name=""/>
-        <p:cNvGrpSpPr/>
-        <p:nvPr/>
-      </p:nvGrpSpPr>
-      <p:grpSpPr>
-        <a:xfrm>
-          <a:off x="0" y="0"/>
-          <a:ext cx="0" cy="0"/>
-          <a:chOff x="0" y="0"/>
-          <a:chExt cx="0" cy="0"/>
-        </a:xfrm>
-      </p:grpSpPr>
-      <p:sp>
-        <p:nvSpPr>
-          <p:cNvPr id="2" name="TextBox 1"/>
-          <p:cNvSpPr txBox="1"/>
-          <p:nvPr/>
-        </p:nvSpPr>
-        <p:spPr>
-          <a:xfrm>
-            <a:off x="1800000" y="7038000"/>
-            <a:ext cx="10662727" cy="2308324"/>
-          </a:xfrm>
-          <a:prstGeom prst="rect">
-            <a:avLst/>
-          </a:prstGeom>
-          <a:noFill/>
-          <a:scene3d>
-            <a:camera prst="perspectiveFront"/>
-            <a:lightRig rig="threePt" dir="t"/>
-          </a:scene3d>
-        </p:spPr>
-        <p:txBody>
-          <a:bodyPr wrap="none" rtlCol="0">
-            <a:spAutoFit/>
-          </a:bodyPr>
-          <a:lstStyle/>
-          <a:p>
-            <a:pPr lvl="0"/>
-            <a:r>
-              <a:rPr lang="en-US" altLang="ko-KR" sz="7200" dirty="0">
-                <a:solidFill>
-                  <a:srgbClr val="EBEBEB"/>
-                </a:solidFill>
-                <a:effectLst>
-                  <a:glow rad="127000">
-                    <a:prstClr val="black">
-                      <a:lumMod val="75000"/>
-                      <a:lumOff val="25000"/>
-                    </a:prstClr>
-                  </a:glow>
-                </a:effectLst>
-                <a:latin typeface="Franklin Gothic Demi Cond" pitchFamily="34" charset="0"/>
-                <a:ea typeface="Asia견고딕" pitchFamily="2" charset="-127"/>
-              </a:rPr>
-              <a:t>Where the fields are green</a:t>
-            </a:r>
-          </a:p>
-          <a:p>
-            <a:pPr lvl="0"/>
-            <a:r>
-              <a:rPr lang="en-US" altLang="ko-KR" sz="7200" dirty="0">
-                <a:solidFill>
-                  <a:srgbClr val="EBEBEB"/>
-                </a:solidFill>
-                <a:effectLst>
-                  <a:glow rad="127000">
-                    <a:prstClr val="black">
-                      <a:lumMod val="75000"/>
-                      <a:lumOff val="25000"/>
-                    </a:prstClr>
-                  </a:glow>
-                </a:effectLst>
-                <a:latin typeface="Franklin Gothic Demi Cond" pitchFamily="34" charset="0"/>
-                <a:ea typeface="Asia견고딕" pitchFamily="2" charset="-127"/>
-              </a:rPr>
-              <a:t>To see you once again, my love</a:t>
-            </a:r>
-            <a:endParaRPr lang="ko-KR" altLang="en-US" sz="7200" dirty="0">
-              <a:solidFill>
-                <a:srgbClr val="EBEBEB"/>
-              </a:solidFill>
-              <a:effectLst>
-                <a:glow rad="127000">
-                  <a:prstClr val="black">
-                    <a:lumMod val="75000"/>
-                    <a:lumOff val="25000"/>
-                  </a:prstClr>
-                </a:glow>
-              </a:effectLst>
-              <a:latin typeface="Franklin Gothic Demi Cond" pitchFamily="34" charset="0"/>
-              <a:ea typeface="Asia견고딕" pitchFamily="2" charset="-127"/>
-            </a:endParaRPr>
-          </a:p>
-        </p:txBody>
-      </p:sp>
-    </p:spTree>
-    <p:extLst>
-      <p:ext uri="{BB962C8B-B14F-4D97-AF65-F5344CB8AC3E}">
-        <p14:creationId xmlns:p14="http://schemas.microsoft.com/office/powerpoint/2010/main" val="959513898"/>
+        <p14:creationId xmlns:p14="http://schemas.microsoft.com/office/powerpoint/2010/main" val="4228851822"/>
       </p:ext>
     </p:extLst>
   </p:cSld>

</xml_diff>

<commit_message>
[FIX] 7th slide not set to 1080p correctly
</commit_message>
<xml_diff>
--- a/resources/sample.pptx
+++ b/resources/sample.pptx
@@ -240,7 +240,7 @@
             <a:pPr latinLnBrk="1"/>
             <a:fld id="{A8ADFD5B-A66C-449C-B6E8-FB716D07777D}" type="datetimeFigureOut">
               <a:pPr latinLnBrk="1"/>
-              <a:t>2019-04-27</a:t>
+              <a:t>2019-08-15</a:t>
             </a:fld>
             <a:endParaRPr lang="ko-KR"/>
           </a:p>
@@ -4676,7 +4676,6 @@
             <a:camera prst="obliqueTopLeft"/>
             <a:lightRig rig="threePt" dir="t"/>
           </a:scene3d>
-          <a:extLst/>
         </p:spPr>
         <p:style>
           <a:lnRef idx="2">
@@ -5081,7 +5080,6 @@
             <a:camera prst="obliqueTopLeft"/>
             <a:lightRig rig="threePt" dir="t"/>
           </a:scene3d>
-          <a:extLst/>
         </p:spPr>
         <p:style>
           <a:lnRef idx="2">
@@ -5144,7 +5142,6 @@
             <a:camera prst="obliqueTopLeft"/>
             <a:lightRig rig="threePt" dir="t"/>
           </a:scene3d>
-          <a:extLst/>
         </p:spPr>
         <p:style>
           <a:lnRef idx="2">
@@ -5208,7 +5205,6 @@
             <a:camera prst="obliqueTopLeft"/>
             <a:lightRig rig="threePt" dir="t"/>
           </a:scene3d>
-          <a:extLst/>
         </p:spPr>
         <p:style>
           <a:lnRef idx="2">
@@ -5267,7 +5263,6 @@
             <a:prstDash val="solid"/>
           </a:ln>
           <a:effectLst/>
-          <a:extLst/>
         </p:spPr>
         <p:style>
           <a:lnRef idx="2">
@@ -5334,25 +5329,25 @@
             </a:extLst>
           </p:cNvPr>
           <p:cNvGraphicFramePr>
-            <a:graphicFrameLocks noChangeAspect="1"/>
+            <a:graphicFrameLocks/>
           </p:cNvGraphicFramePr>
           <p:nvPr>
             <p:extLst>
               <p:ext uri="{D42A27DB-BD31-4B8C-83A1-F6EECF244321}">
-                <p14:modId xmlns:p14="http://schemas.microsoft.com/office/powerpoint/2010/main" val="1902235080"/>
+                <p14:modId xmlns:p14="http://schemas.microsoft.com/office/powerpoint/2010/main" val="1787574018"/>
               </p:ext>
             </p:extLst>
           </p:nvPr>
         </p:nvGraphicFramePr>
         <p:xfrm>
           <a:off x="0" y="0"/>
-          <a:ext cx="18288000" cy="10303670"/>
+          <a:ext cx="18288000" cy="10287000"/>
         </p:xfrm>
         <a:graphic>
           <a:graphicData uri="http://schemas.openxmlformats.org/presentationml/2006/ole">
             <mc:AlternateContent xmlns:mc="http://schemas.openxmlformats.org/markup-compatibility/2006">
               <mc:Choice xmlns:v="urn:schemas-microsoft-com:vml" Requires="v">
-                <p:oleObj spid="_x0000_s1043" name="Image" r:id="rId3" imgW="24380640" imgH="13714200" progId="Photoshop.Image.19">
+                <p:oleObj spid="_x0000_s1046" name="Image" r:id="rId3" imgW="24380640" imgH="13714200" progId="Photoshop.Image.19">
                   <p:embed/>
                 </p:oleObj>
               </mc:Choice>
@@ -5362,7 +5357,7 @@
                   <p:pic>
                     <p:nvPicPr>
                       <p:cNvPr id="0" name=""/>
-                      <p:cNvPicPr/>
+                      <p:cNvPicPr preferRelativeResize="0"/>
                       <p:nvPr/>
                     </p:nvPicPr>
                     <p:blipFill>
@@ -5376,7 +5371,7 @@
                     <p:spPr>
                       <a:xfrm>
                         <a:off x="0" y="0"/>
-                        <a:ext cx="18288000" cy="10303670"/>
+                        <a:ext cx="18288000" cy="10287000"/>
                       </a:xfrm>
                       <a:prstGeom prst="rect">
                         <a:avLst/>
@@ -5620,7 +5615,6 @@
             <a:prstDash val="solid"/>
           </a:ln>
           <a:effectLst/>
-          <a:extLst/>
         </p:spPr>
         <p:style>
           <a:lnRef idx="2">

</xml_diff>

<commit_message>
[FIX] version bumped to 20191013
</commit_message>
<xml_diff>
--- a/resources/sample.pptx
+++ b/resources/sample.pptx
@@ -5,7 +5,7 @@
     <p:sldMasterId id="2147483659" r:id="rId1"/>
   </p:sldMasterIdLst>
   <p:notesMasterIdLst>
-    <p:notesMasterId r:id="rId11"/>
+    <p:notesMasterId r:id="rId13"/>
   </p:notesMasterIdLst>
   <p:sldIdLst>
     <p:sldId id="265" r:id="rId2"/>
@@ -16,7 +16,9 @@
     <p:sldId id="276" r:id="rId7"/>
     <p:sldId id="281" r:id="rId8"/>
     <p:sldId id="275" r:id="rId9"/>
-    <p:sldId id="282" r:id="rId10"/>
+    <p:sldId id="283" r:id="rId10"/>
+    <p:sldId id="284" r:id="rId11"/>
+    <p:sldId id="282" r:id="rId12"/>
   </p:sldIdLst>
   <p:sldSz cx="18288000" cy="10287000"/>
   <p:notesSz cx="6858000" cy="9144000"/>
@@ -240,7 +242,7 @@
             <a:pPr latinLnBrk="1"/>
             <a:fld id="{A8ADFD5B-A66C-449C-B6E8-FB716D07777D}" type="datetimeFigureOut">
               <a:pPr latinLnBrk="1"/>
-              <a:t>2019-08-15</a:t>
+              <a:t>2019-10-12</a:t>
             </a:fld>
             <a:endParaRPr lang="ko-KR"/>
           </a:p>
@@ -1675,6 +1677,616 @@
     <p:extLst>
       <p:ext uri="{BB962C8B-B14F-4D97-AF65-F5344CB8AC3E}">
         <p14:creationId xmlns:p14="http://schemas.microsoft.com/office/powerpoint/2010/main" val="268489872"/>
+      </p:ext>
+    </p:extLst>
+  </p:cSld>
+  <p:clrMapOvr>
+    <a:masterClrMapping/>
+  </p:clrMapOvr>
+</p:notes>
+</file>
+
+<file path=ppt/notesSlides/notesSlide5.xml><?xml version="1.0" encoding="utf-8"?>
+<p:notes xmlns:a="http://schemas.openxmlformats.org/drawingml/2006/main" xmlns:r="http://schemas.openxmlformats.org/officeDocument/2006/relationships" xmlns:p="http://schemas.openxmlformats.org/presentationml/2006/main">
+  <p:cSld>
+    <p:spTree>
+      <p:nvGrpSpPr>
+        <p:cNvPr id="1" name=""/>
+        <p:cNvGrpSpPr/>
+        <p:nvPr/>
+      </p:nvGrpSpPr>
+      <p:grpSpPr>
+        <a:xfrm>
+          <a:off x="0" y="0"/>
+          <a:ext cx="0" cy="0"/>
+          <a:chOff x="0" y="0"/>
+          <a:chExt cx="0" cy="0"/>
+        </a:xfrm>
+      </p:grpSpPr>
+      <p:sp>
+        <p:nvSpPr>
+          <p:cNvPr id="4098" name="Slide Image Placeholder 1"/>
+          <p:cNvSpPr>
+            <a:spLocks noGrp="1" noRot="1" noChangeAspect="1" noTextEdit="1"/>
+          </p:cNvSpPr>
+          <p:nvPr>
+            <p:ph type="sldImg"/>
+          </p:nvPr>
+        </p:nvSpPr>
+        <p:spPr bwMode="auto">
+          <a:xfrm>
+            <a:off x="381000" y="685800"/>
+            <a:ext cx="6096000" cy="3429000"/>
+          </a:xfrm>
+          <a:noFill/>
+          <a:ln>
+            <a:solidFill>
+              <a:srgbClr val="000000"/>
+            </a:solidFill>
+            <a:miter lim="800000"/>
+            <a:headEnd/>
+            <a:tailEnd/>
+          </a:ln>
+          <a:extLst>
+            <a:ext uri="{909E8E84-426E-40DD-AFC4-6F175D3DCCD1}">
+              <a14:hiddenFill xmlns:a14="http://schemas.microsoft.com/office/drawing/2010/main">
+                <a:solidFill>
+                  <a:srgbClr val="FFFFFF"/>
+                </a:solidFill>
+              </a14:hiddenFill>
+            </a:ext>
+          </a:extLst>
+        </p:spPr>
+      </p:sp>
+      <p:sp>
+        <p:nvSpPr>
+          <p:cNvPr id="4099" name="Notes Placeholder 2"/>
+          <p:cNvSpPr>
+            <a:spLocks noGrp="1"/>
+          </p:cNvSpPr>
+          <p:nvPr>
+            <p:ph type="body" idx="1"/>
+          </p:nvPr>
+        </p:nvSpPr>
+        <p:spPr bwMode="auto">
+          <a:noFill/>
+          <a:extLst>
+            <a:ext uri="{909E8E84-426E-40DD-AFC4-6F175D3DCCD1}">
+              <a14:hiddenFill xmlns:a14="http://schemas.microsoft.com/office/drawing/2010/main">
+                <a:solidFill>
+                  <a:srgbClr val="FFFFFF"/>
+                </a:solidFill>
+              </a14:hiddenFill>
+            </a:ext>
+            <a:ext uri="{91240B29-F687-4F45-9708-019B960494DF}">
+              <a14:hiddenLine xmlns:a14="http://schemas.microsoft.com/office/drawing/2010/main" w="9525">
+                <a:solidFill>
+                  <a:srgbClr val="000000"/>
+                </a:solidFill>
+                <a:miter lim="800000"/>
+                <a:headEnd/>
+                <a:tailEnd/>
+              </a14:hiddenLine>
+            </a:ext>
+          </a:extLst>
+        </p:spPr>
+        <p:txBody>
+          <a:bodyPr/>
+          <a:lstStyle/>
+          <a:p>
+            <a:pPr eaLnBrk="1" hangingPunct="1">
+              <a:spcBef>
+                <a:spcPct val="0"/>
+              </a:spcBef>
+            </a:pPr>
+            <a:endParaRPr lang="en-US"/>
+          </a:p>
+        </p:txBody>
+      </p:sp>
+      <p:sp>
+        <p:nvSpPr>
+          <p:cNvPr id="4100" name="Slide Number Placeholder 3"/>
+          <p:cNvSpPr>
+            <a:spLocks noGrp="1"/>
+          </p:cNvSpPr>
+          <p:nvPr>
+            <p:ph type="sldNum" sz="quarter" idx="5"/>
+          </p:nvPr>
+        </p:nvSpPr>
+        <p:spPr bwMode="auto">
+          <a:ln>
+            <a:miter lim="800000"/>
+            <a:headEnd/>
+            <a:tailEnd/>
+          </a:ln>
+        </p:spPr>
+        <p:txBody>
+          <a:bodyPr/>
+          <a:lstStyle>
+            <a:lvl1pPr eaLnBrk="0" hangingPunct="0">
+              <a:defRPr>
+                <a:solidFill>
+                  <a:schemeClr val="tx1"/>
+                </a:solidFill>
+                <a:latin typeface="Arial" charset="0"/>
+                <a:cs typeface="Arial" charset="0"/>
+              </a:defRPr>
+            </a:lvl1pPr>
+            <a:lvl2pPr marL="742950" indent="-285750" eaLnBrk="0" hangingPunct="0">
+              <a:defRPr>
+                <a:solidFill>
+                  <a:schemeClr val="tx1"/>
+                </a:solidFill>
+                <a:latin typeface="Arial" charset="0"/>
+                <a:cs typeface="Arial" charset="0"/>
+              </a:defRPr>
+            </a:lvl2pPr>
+            <a:lvl3pPr marL="1143000" indent="-228600" eaLnBrk="0" hangingPunct="0">
+              <a:defRPr>
+                <a:solidFill>
+                  <a:schemeClr val="tx1"/>
+                </a:solidFill>
+                <a:latin typeface="Arial" charset="0"/>
+                <a:cs typeface="Arial" charset="0"/>
+              </a:defRPr>
+            </a:lvl3pPr>
+            <a:lvl4pPr marL="1600200" indent="-228600" eaLnBrk="0" hangingPunct="0">
+              <a:defRPr>
+                <a:solidFill>
+                  <a:schemeClr val="tx1"/>
+                </a:solidFill>
+                <a:latin typeface="Arial" charset="0"/>
+                <a:cs typeface="Arial" charset="0"/>
+              </a:defRPr>
+            </a:lvl4pPr>
+            <a:lvl5pPr marL="2057400" indent="-228600" eaLnBrk="0" hangingPunct="0">
+              <a:defRPr>
+                <a:solidFill>
+                  <a:schemeClr val="tx1"/>
+                </a:solidFill>
+                <a:latin typeface="Arial" charset="0"/>
+                <a:cs typeface="Arial" charset="0"/>
+              </a:defRPr>
+            </a:lvl5pPr>
+            <a:lvl6pPr marL="2514600" indent="-228600" eaLnBrk="0" fontAlgn="base" hangingPunct="0">
+              <a:spcBef>
+                <a:spcPct val="0"/>
+              </a:spcBef>
+              <a:spcAft>
+                <a:spcPct val="0"/>
+              </a:spcAft>
+              <a:defRPr>
+                <a:solidFill>
+                  <a:schemeClr val="tx1"/>
+                </a:solidFill>
+                <a:latin typeface="Arial" charset="0"/>
+                <a:cs typeface="Arial" charset="0"/>
+              </a:defRPr>
+            </a:lvl6pPr>
+            <a:lvl7pPr marL="2971800" indent="-228600" eaLnBrk="0" fontAlgn="base" hangingPunct="0">
+              <a:spcBef>
+                <a:spcPct val="0"/>
+              </a:spcBef>
+              <a:spcAft>
+                <a:spcPct val="0"/>
+              </a:spcAft>
+              <a:defRPr>
+                <a:solidFill>
+                  <a:schemeClr val="tx1"/>
+                </a:solidFill>
+                <a:latin typeface="Arial" charset="0"/>
+                <a:cs typeface="Arial" charset="0"/>
+              </a:defRPr>
+            </a:lvl7pPr>
+            <a:lvl8pPr marL="3429000" indent="-228600" eaLnBrk="0" fontAlgn="base" hangingPunct="0">
+              <a:spcBef>
+                <a:spcPct val="0"/>
+              </a:spcBef>
+              <a:spcAft>
+                <a:spcPct val="0"/>
+              </a:spcAft>
+              <a:defRPr>
+                <a:solidFill>
+                  <a:schemeClr val="tx1"/>
+                </a:solidFill>
+                <a:latin typeface="Arial" charset="0"/>
+                <a:cs typeface="Arial" charset="0"/>
+              </a:defRPr>
+            </a:lvl8pPr>
+            <a:lvl9pPr marL="3886200" indent="-228600" eaLnBrk="0" fontAlgn="base" hangingPunct="0">
+              <a:spcBef>
+                <a:spcPct val="0"/>
+              </a:spcBef>
+              <a:spcAft>
+                <a:spcPct val="0"/>
+              </a:spcAft>
+              <a:defRPr>
+                <a:solidFill>
+                  <a:schemeClr val="tx1"/>
+                </a:solidFill>
+                <a:latin typeface="Arial" charset="0"/>
+                <a:cs typeface="Arial" charset="0"/>
+              </a:defRPr>
+            </a:lvl9pPr>
+          </a:lstStyle>
+          <a:p>
+            <a:pPr marL="0" marR="0" lvl="0" indent="0" algn="r" defTabSz="914400" rtl="0" eaLnBrk="1" fontAlgn="auto" latinLnBrk="1" hangingPunct="1">
+              <a:lnSpc>
+                <a:spcPct val="100000"/>
+              </a:lnSpc>
+              <a:spcBef>
+                <a:spcPts val="0"/>
+              </a:spcBef>
+              <a:spcAft>
+                <a:spcPts val="0"/>
+              </a:spcAft>
+              <a:buClrTx/>
+              <a:buSzTx/>
+              <a:buFontTx/>
+              <a:buNone/>
+              <a:tabLst/>
+              <a:defRPr/>
+            </a:pPr>
+            <a:fld id="{E7649BAD-CB0D-4523-BB4C-E510FB45DBB8}" type="slidenum">
+              <a:rPr kumimoji="0" lang="en-AU" altLang="ko-KR" sz="1200" b="0" i="0" u="none" strike="noStrike" kern="1200" cap="none" spc="0" normalizeH="0" baseline="0" noProof="0">
+                <a:ln>
+                  <a:noFill/>
+                </a:ln>
+                <a:solidFill>
+                  <a:prstClr val="black"/>
+                </a:solidFill>
+                <a:effectLst/>
+                <a:uLnTx/>
+                <a:uFillTx/>
+                <a:latin typeface="Calibri" pitchFamily="34" charset="0"/>
+                <a:ea typeface="맑은 고딕" panose="020B0503020000020004" pitchFamily="50" charset="-127"/>
+                <a:cs typeface="Arial" charset="0"/>
+              </a:rPr>
+              <a:pPr marL="0" marR="0" lvl="0" indent="0" algn="r" defTabSz="914400" rtl="0" eaLnBrk="1" fontAlgn="auto" latinLnBrk="1" hangingPunct="1">
+                <a:lnSpc>
+                  <a:spcPct val="100000"/>
+                </a:lnSpc>
+                <a:spcBef>
+                  <a:spcPts val="0"/>
+                </a:spcBef>
+                <a:spcAft>
+                  <a:spcPts val="0"/>
+                </a:spcAft>
+                <a:buClrTx/>
+                <a:buSzTx/>
+                <a:buFontTx/>
+                <a:buNone/>
+                <a:tabLst/>
+                <a:defRPr/>
+              </a:pPr>
+              <a:t>9</a:t>
+            </a:fld>
+            <a:endParaRPr kumimoji="0" lang="en-AU" altLang="ko-KR" sz="1200" b="0" i="0" u="none" strike="noStrike" kern="1200" cap="none" spc="0" normalizeH="0" baseline="0" noProof="0">
+              <a:ln>
+                <a:noFill/>
+              </a:ln>
+              <a:solidFill>
+                <a:prstClr val="black"/>
+              </a:solidFill>
+              <a:effectLst/>
+              <a:uLnTx/>
+              <a:uFillTx/>
+              <a:latin typeface="Calibri" pitchFamily="34" charset="0"/>
+              <a:ea typeface="맑은 고딕" panose="020B0503020000020004" pitchFamily="50" charset="-127"/>
+              <a:cs typeface="Arial" charset="0"/>
+            </a:endParaRPr>
+          </a:p>
+        </p:txBody>
+      </p:sp>
+    </p:spTree>
+    <p:extLst>
+      <p:ext uri="{BB962C8B-B14F-4D97-AF65-F5344CB8AC3E}">
+        <p14:creationId xmlns:p14="http://schemas.microsoft.com/office/powerpoint/2010/main" val="966944824"/>
+      </p:ext>
+    </p:extLst>
+  </p:cSld>
+  <p:clrMapOvr>
+    <a:masterClrMapping/>
+  </p:clrMapOvr>
+</p:notes>
+</file>
+
+<file path=ppt/notesSlides/notesSlide6.xml><?xml version="1.0" encoding="utf-8"?>
+<p:notes xmlns:a="http://schemas.openxmlformats.org/drawingml/2006/main" xmlns:r="http://schemas.openxmlformats.org/officeDocument/2006/relationships" xmlns:p="http://schemas.openxmlformats.org/presentationml/2006/main">
+  <p:cSld>
+    <p:spTree>
+      <p:nvGrpSpPr>
+        <p:cNvPr id="1" name=""/>
+        <p:cNvGrpSpPr/>
+        <p:nvPr/>
+      </p:nvGrpSpPr>
+      <p:grpSpPr>
+        <a:xfrm>
+          <a:off x="0" y="0"/>
+          <a:ext cx="0" cy="0"/>
+          <a:chOff x="0" y="0"/>
+          <a:chExt cx="0" cy="0"/>
+        </a:xfrm>
+      </p:grpSpPr>
+      <p:sp>
+        <p:nvSpPr>
+          <p:cNvPr id="4098" name="Slide Image Placeholder 1"/>
+          <p:cNvSpPr>
+            <a:spLocks noGrp="1" noRot="1" noChangeAspect="1" noTextEdit="1"/>
+          </p:cNvSpPr>
+          <p:nvPr>
+            <p:ph type="sldImg"/>
+          </p:nvPr>
+        </p:nvSpPr>
+        <p:spPr bwMode="auto">
+          <a:xfrm>
+            <a:off x="381000" y="685800"/>
+            <a:ext cx="6096000" cy="3429000"/>
+          </a:xfrm>
+          <a:noFill/>
+          <a:ln>
+            <a:solidFill>
+              <a:srgbClr val="000000"/>
+            </a:solidFill>
+            <a:miter lim="800000"/>
+            <a:headEnd/>
+            <a:tailEnd/>
+          </a:ln>
+          <a:extLst>
+            <a:ext uri="{909E8E84-426E-40DD-AFC4-6F175D3DCCD1}">
+              <a14:hiddenFill xmlns:a14="http://schemas.microsoft.com/office/drawing/2010/main">
+                <a:solidFill>
+                  <a:srgbClr val="FFFFFF"/>
+                </a:solidFill>
+              </a14:hiddenFill>
+            </a:ext>
+          </a:extLst>
+        </p:spPr>
+      </p:sp>
+      <p:sp>
+        <p:nvSpPr>
+          <p:cNvPr id="4099" name="Notes Placeholder 2"/>
+          <p:cNvSpPr>
+            <a:spLocks noGrp="1"/>
+          </p:cNvSpPr>
+          <p:nvPr>
+            <p:ph type="body" idx="1"/>
+          </p:nvPr>
+        </p:nvSpPr>
+        <p:spPr bwMode="auto">
+          <a:noFill/>
+          <a:extLst>
+            <a:ext uri="{909E8E84-426E-40DD-AFC4-6F175D3DCCD1}">
+              <a14:hiddenFill xmlns:a14="http://schemas.microsoft.com/office/drawing/2010/main">
+                <a:solidFill>
+                  <a:srgbClr val="FFFFFF"/>
+                </a:solidFill>
+              </a14:hiddenFill>
+            </a:ext>
+            <a:ext uri="{91240B29-F687-4F45-9708-019B960494DF}">
+              <a14:hiddenLine xmlns:a14="http://schemas.microsoft.com/office/drawing/2010/main" w="9525">
+                <a:solidFill>
+                  <a:srgbClr val="000000"/>
+                </a:solidFill>
+                <a:miter lim="800000"/>
+                <a:headEnd/>
+                <a:tailEnd/>
+              </a14:hiddenLine>
+            </a:ext>
+          </a:extLst>
+        </p:spPr>
+        <p:txBody>
+          <a:bodyPr/>
+          <a:lstStyle/>
+          <a:p>
+            <a:pPr eaLnBrk="1" hangingPunct="1">
+              <a:spcBef>
+                <a:spcPct val="0"/>
+              </a:spcBef>
+            </a:pPr>
+            <a:endParaRPr lang="en-US"/>
+          </a:p>
+        </p:txBody>
+      </p:sp>
+      <p:sp>
+        <p:nvSpPr>
+          <p:cNvPr id="4100" name="Slide Number Placeholder 3"/>
+          <p:cNvSpPr>
+            <a:spLocks noGrp="1"/>
+          </p:cNvSpPr>
+          <p:nvPr>
+            <p:ph type="sldNum" sz="quarter" idx="5"/>
+          </p:nvPr>
+        </p:nvSpPr>
+        <p:spPr bwMode="auto">
+          <a:ln>
+            <a:miter lim="800000"/>
+            <a:headEnd/>
+            <a:tailEnd/>
+          </a:ln>
+        </p:spPr>
+        <p:txBody>
+          <a:bodyPr/>
+          <a:lstStyle>
+            <a:lvl1pPr eaLnBrk="0" hangingPunct="0">
+              <a:defRPr>
+                <a:solidFill>
+                  <a:schemeClr val="tx1"/>
+                </a:solidFill>
+                <a:latin typeface="Arial" charset="0"/>
+                <a:cs typeface="Arial" charset="0"/>
+              </a:defRPr>
+            </a:lvl1pPr>
+            <a:lvl2pPr marL="742950" indent="-285750" eaLnBrk="0" hangingPunct="0">
+              <a:defRPr>
+                <a:solidFill>
+                  <a:schemeClr val="tx1"/>
+                </a:solidFill>
+                <a:latin typeface="Arial" charset="0"/>
+                <a:cs typeface="Arial" charset="0"/>
+              </a:defRPr>
+            </a:lvl2pPr>
+            <a:lvl3pPr marL="1143000" indent="-228600" eaLnBrk="0" hangingPunct="0">
+              <a:defRPr>
+                <a:solidFill>
+                  <a:schemeClr val="tx1"/>
+                </a:solidFill>
+                <a:latin typeface="Arial" charset="0"/>
+                <a:cs typeface="Arial" charset="0"/>
+              </a:defRPr>
+            </a:lvl3pPr>
+            <a:lvl4pPr marL="1600200" indent="-228600" eaLnBrk="0" hangingPunct="0">
+              <a:defRPr>
+                <a:solidFill>
+                  <a:schemeClr val="tx1"/>
+                </a:solidFill>
+                <a:latin typeface="Arial" charset="0"/>
+                <a:cs typeface="Arial" charset="0"/>
+              </a:defRPr>
+            </a:lvl4pPr>
+            <a:lvl5pPr marL="2057400" indent="-228600" eaLnBrk="0" hangingPunct="0">
+              <a:defRPr>
+                <a:solidFill>
+                  <a:schemeClr val="tx1"/>
+                </a:solidFill>
+                <a:latin typeface="Arial" charset="0"/>
+                <a:cs typeface="Arial" charset="0"/>
+              </a:defRPr>
+            </a:lvl5pPr>
+            <a:lvl6pPr marL="2514600" indent="-228600" eaLnBrk="0" fontAlgn="base" hangingPunct="0">
+              <a:spcBef>
+                <a:spcPct val="0"/>
+              </a:spcBef>
+              <a:spcAft>
+                <a:spcPct val="0"/>
+              </a:spcAft>
+              <a:defRPr>
+                <a:solidFill>
+                  <a:schemeClr val="tx1"/>
+                </a:solidFill>
+                <a:latin typeface="Arial" charset="0"/>
+                <a:cs typeface="Arial" charset="0"/>
+              </a:defRPr>
+            </a:lvl6pPr>
+            <a:lvl7pPr marL="2971800" indent="-228600" eaLnBrk="0" fontAlgn="base" hangingPunct="0">
+              <a:spcBef>
+                <a:spcPct val="0"/>
+              </a:spcBef>
+              <a:spcAft>
+                <a:spcPct val="0"/>
+              </a:spcAft>
+              <a:defRPr>
+                <a:solidFill>
+                  <a:schemeClr val="tx1"/>
+                </a:solidFill>
+                <a:latin typeface="Arial" charset="0"/>
+                <a:cs typeface="Arial" charset="0"/>
+              </a:defRPr>
+            </a:lvl7pPr>
+            <a:lvl8pPr marL="3429000" indent="-228600" eaLnBrk="0" fontAlgn="base" hangingPunct="0">
+              <a:spcBef>
+                <a:spcPct val="0"/>
+              </a:spcBef>
+              <a:spcAft>
+                <a:spcPct val="0"/>
+              </a:spcAft>
+              <a:defRPr>
+                <a:solidFill>
+                  <a:schemeClr val="tx1"/>
+                </a:solidFill>
+                <a:latin typeface="Arial" charset="0"/>
+                <a:cs typeface="Arial" charset="0"/>
+              </a:defRPr>
+            </a:lvl8pPr>
+            <a:lvl9pPr marL="3886200" indent="-228600" eaLnBrk="0" fontAlgn="base" hangingPunct="0">
+              <a:spcBef>
+                <a:spcPct val="0"/>
+              </a:spcBef>
+              <a:spcAft>
+                <a:spcPct val="0"/>
+              </a:spcAft>
+              <a:defRPr>
+                <a:solidFill>
+                  <a:schemeClr val="tx1"/>
+                </a:solidFill>
+                <a:latin typeface="Arial" charset="0"/>
+                <a:cs typeface="Arial" charset="0"/>
+              </a:defRPr>
+            </a:lvl9pPr>
+          </a:lstStyle>
+          <a:p>
+            <a:pPr marL="0" marR="0" lvl="0" indent="0" algn="r" defTabSz="914400" rtl="0" eaLnBrk="1" fontAlgn="auto" latinLnBrk="1" hangingPunct="1">
+              <a:lnSpc>
+                <a:spcPct val="100000"/>
+              </a:lnSpc>
+              <a:spcBef>
+                <a:spcPts val="0"/>
+              </a:spcBef>
+              <a:spcAft>
+                <a:spcPts val="0"/>
+              </a:spcAft>
+              <a:buClrTx/>
+              <a:buSzTx/>
+              <a:buFontTx/>
+              <a:buNone/>
+              <a:tabLst/>
+              <a:defRPr/>
+            </a:pPr>
+            <a:fld id="{E7649BAD-CB0D-4523-BB4C-E510FB45DBB8}" type="slidenum">
+              <a:rPr kumimoji="0" lang="en-AU" altLang="ko-KR" sz="1200" b="0" i="0" u="none" strike="noStrike" kern="1200" cap="none" spc="0" normalizeH="0" baseline="0" noProof="0">
+                <a:ln>
+                  <a:noFill/>
+                </a:ln>
+                <a:solidFill>
+                  <a:prstClr val="black"/>
+                </a:solidFill>
+                <a:effectLst/>
+                <a:uLnTx/>
+                <a:uFillTx/>
+                <a:latin typeface="Calibri" pitchFamily="34" charset="0"/>
+                <a:ea typeface="맑은 고딕" panose="020B0503020000020004" pitchFamily="50" charset="-127"/>
+                <a:cs typeface="Arial" charset="0"/>
+              </a:rPr>
+              <a:pPr marL="0" marR="0" lvl="0" indent="0" algn="r" defTabSz="914400" rtl="0" eaLnBrk="1" fontAlgn="auto" latinLnBrk="1" hangingPunct="1">
+                <a:lnSpc>
+                  <a:spcPct val="100000"/>
+                </a:lnSpc>
+                <a:spcBef>
+                  <a:spcPts val="0"/>
+                </a:spcBef>
+                <a:spcAft>
+                  <a:spcPts val="0"/>
+                </a:spcAft>
+                <a:buClrTx/>
+                <a:buSzTx/>
+                <a:buFontTx/>
+                <a:buNone/>
+                <a:tabLst/>
+                <a:defRPr/>
+              </a:pPr>
+              <a:t>10</a:t>
+            </a:fld>
+            <a:endParaRPr kumimoji="0" lang="en-AU" altLang="ko-KR" sz="1200" b="0" i="0" u="none" strike="noStrike" kern="1200" cap="none" spc="0" normalizeH="0" baseline="0" noProof="0">
+              <a:ln>
+                <a:noFill/>
+              </a:ln>
+              <a:solidFill>
+                <a:prstClr val="black"/>
+              </a:solidFill>
+              <a:effectLst/>
+              <a:uLnTx/>
+              <a:uFillTx/>
+              <a:latin typeface="Calibri" pitchFamily="34" charset="0"/>
+              <a:ea typeface="맑은 고딕" panose="020B0503020000020004" pitchFamily="50" charset="-127"/>
+              <a:cs typeface="Arial" charset="0"/>
+            </a:endParaRPr>
+          </a:p>
+        </p:txBody>
+      </p:sp>
+    </p:spTree>
+    <p:extLst>
+      <p:ext uri="{BB962C8B-B14F-4D97-AF65-F5344CB8AC3E}">
+        <p14:creationId xmlns:p14="http://schemas.microsoft.com/office/powerpoint/2010/main" val="3004059885"/>
       </p:ext>
     </p:extLst>
   </p:cSld>
@@ -4116,6 +4728,343 @@
 </p:sld>
 </file>
 
+<file path=ppt/slides/slide10.xml><?xml version="1.0" encoding="utf-8"?>
+<p:sld xmlns:a="http://schemas.openxmlformats.org/drawingml/2006/main" xmlns:r="http://schemas.openxmlformats.org/officeDocument/2006/relationships" xmlns:p="http://schemas.openxmlformats.org/presentationml/2006/main">
+  <p:cSld>
+    <p:spTree>
+      <p:nvGrpSpPr>
+        <p:cNvPr id="1" name=""/>
+        <p:cNvGrpSpPr/>
+        <p:nvPr/>
+      </p:nvGrpSpPr>
+      <p:grpSpPr>
+        <a:xfrm>
+          <a:off x="0" y="0"/>
+          <a:ext cx="0" cy="0"/>
+          <a:chOff x="0" y="0"/>
+          <a:chExt cx="0" cy="0"/>
+        </a:xfrm>
+      </p:grpSpPr>
+      <p:sp>
+        <p:nvSpPr>
+          <p:cNvPr id="2" name="TextBox 1"/>
+          <p:cNvSpPr txBox="1"/>
+          <p:nvPr/>
+        </p:nvSpPr>
+        <p:spPr>
+          <a:xfrm>
+            <a:off x="1800225" y="7038280"/>
+            <a:ext cx="7152920" cy="2308324"/>
+          </a:xfrm>
+          <a:prstGeom prst="rect">
+            <a:avLst/>
+          </a:prstGeom>
+          <a:noFill/>
+          <a:scene3d>
+            <a:camera prst="perspectiveFront"/>
+            <a:lightRig rig="threePt" dir="t"/>
+          </a:scene3d>
+        </p:spPr>
+        <p:txBody>
+          <a:bodyPr wrap="none" rtlCol="0">
+            <a:spAutoFit/>
+          </a:bodyPr>
+          <a:lstStyle/>
+          <a:p>
+            <a:pPr marL="0" marR="0" lvl="0" indent="0" algn="l" defTabSz="914400" rtl="0" eaLnBrk="1" fontAlgn="auto" latinLnBrk="1" hangingPunct="1">
+              <a:lnSpc>
+                <a:spcPct val="100000"/>
+              </a:lnSpc>
+              <a:spcBef>
+                <a:spcPts val="0"/>
+              </a:spcBef>
+              <a:spcAft>
+                <a:spcPts val="0"/>
+              </a:spcAft>
+              <a:buClrTx/>
+              <a:buSzTx/>
+              <a:buFontTx/>
+              <a:buNone/>
+              <a:tabLst/>
+              <a:defRPr/>
+            </a:pPr>
+            <a:r>
+              <a:rPr kumimoji="0" lang="en-US" altLang="ko-KR" sz="7200" b="0" i="0" u="none" strike="noStrike" kern="1200" cap="none" spc="0" normalizeH="0" baseline="0" noProof="0" dirty="0">
+                <a:ln>
+                  <a:noFill/>
+                </a:ln>
+                <a:solidFill>
+                  <a:srgbClr val="EBEBEB"/>
+                </a:solidFill>
+                <a:effectLst>
+                  <a:glow rad="127000">
+                    <a:prstClr val="black">
+                      <a:lumMod val="75000"/>
+                      <a:lumOff val="25000"/>
+                    </a:prstClr>
+                  </a:glow>
+                </a:effectLst>
+                <a:uLnTx/>
+                <a:uFillTx/>
+                <a:latin typeface="Franklin Gothic Demi Cond" pitchFamily="34" charset="0"/>
+                <a:ea typeface="Asia견고딕" pitchFamily="2" charset="-127"/>
+                <a:cs typeface="+mn-cs"/>
+              </a:rPr>
+              <a:t>TRANSITION EFFECT</a:t>
+            </a:r>
+          </a:p>
+          <a:p>
+            <a:pPr marL="0" marR="0" lvl="0" indent="0" algn="l" defTabSz="914400" rtl="0" eaLnBrk="1" fontAlgn="auto" latinLnBrk="1" hangingPunct="1">
+              <a:lnSpc>
+                <a:spcPct val="100000"/>
+              </a:lnSpc>
+              <a:spcBef>
+                <a:spcPts val="0"/>
+              </a:spcBef>
+              <a:spcAft>
+                <a:spcPts val="0"/>
+              </a:spcAft>
+              <a:buClrTx/>
+              <a:buSzTx/>
+              <a:buFontTx/>
+              <a:buNone/>
+              <a:tabLst/>
+              <a:defRPr/>
+            </a:pPr>
+            <a:r>
+              <a:rPr lang="en-US" altLang="ko-KR" sz="7200" dirty="0">
+                <a:solidFill>
+                  <a:srgbClr val="EBEBEB"/>
+                </a:solidFill>
+                <a:effectLst>
+                  <a:glow rad="127000">
+                    <a:prstClr val="black">
+                      <a:lumMod val="75000"/>
+                      <a:lumOff val="25000"/>
+                    </a:prstClr>
+                  </a:glow>
+                </a:effectLst>
+                <a:latin typeface="Franklin Gothic Demi Cond" pitchFamily="34" charset="0"/>
+                <a:ea typeface="Asia견고딕" pitchFamily="2" charset="-127"/>
+              </a:rPr>
+              <a:t>TEST 2</a:t>
+            </a:r>
+            <a:endParaRPr kumimoji="0" lang="en-US" altLang="ko-KR" sz="7200" b="0" i="0" u="none" strike="noStrike" kern="1200" cap="none" spc="0" normalizeH="0" baseline="0" noProof="0" dirty="0">
+              <a:ln>
+                <a:noFill/>
+              </a:ln>
+              <a:solidFill>
+                <a:srgbClr val="EBEBEB"/>
+              </a:solidFill>
+              <a:effectLst>
+                <a:glow rad="127000">
+                  <a:prstClr val="black">
+                    <a:lumMod val="75000"/>
+                    <a:lumOff val="25000"/>
+                  </a:prstClr>
+                </a:glow>
+              </a:effectLst>
+              <a:uLnTx/>
+              <a:uFillTx/>
+              <a:latin typeface="Franklin Gothic Demi Cond" pitchFamily="34" charset="0"/>
+              <a:ea typeface="Asia견고딕" pitchFamily="2" charset="-127"/>
+              <a:cs typeface="+mn-cs"/>
+            </a:endParaRPr>
+          </a:p>
+        </p:txBody>
+      </p:sp>
+    </p:spTree>
+    <p:extLst>
+      <p:ext uri="{BB962C8B-B14F-4D97-AF65-F5344CB8AC3E}">
+        <p14:creationId xmlns:p14="http://schemas.microsoft.com/office/powerpoint/2010/main" val="2527957640"/>
+      </p:ext>
+    </p:extLst>
+  </p:cSld>
+  <p:clrMapOvr>
+    <a:masterClrMapping/>
+  </p:clrMapOvr>
+  <mc:AlternateContent xmlns:mc="http://schemas.openxmlformats.org/markup-compatibility/2006">
+    <mc:Choice xmlns:p14="http://schemas.microsoft.com/office/powerpoint/2010/main" Requires="p14">
+      <p:transition spd="med" p14:dur="700">
+        <p:fade/>
+      </p:transition>
+    </mc:Choice>
+    <mc:Fallback>
+      <p:transition spd="med">
+        <p:fade/>
+      </p:transition>
+    </mc:Fallback>
+  </mc:AlternateContent>
+</p:sld>
+</file>
+
+<file path=ppt/slides/slide11.xml><?xml version="1.0" encoding="utf-8"?>
+<p:sld xmlns:a="http://schemas.openxmlformats.org/drawingml/2006/main" xmlns:r="http://schemas.openxmlformats.org/officeDocument/2006/relationships" xmlns:p="http://schemas.openxmlformats.org/presentationml/2006/main">
+  <p:cSld>
+    <p:spTree>
+      <p:nvGrpSpPr>
+        <p:cNvPr id="1" name=""/>
+        <p:cNvGrpSpPr/>
+        <p:nvPr/>
+      </p:nvGrpSpPr>
+      <p:grpSpPr>
+        <a:xfrm>
+          <a:off x="0" y="0"/>
+          <a:ext cx="0" cy="0"/>
+          <a:chOff x="0" y="0"/>
+          <a:chExt cx="0" cy="0"/>
+        </a:xfrm>
+      </p:grpSpPr>
+      <p:sp>
+        <p:nvSpPr>
+          <p:cNvPr id="2" name="직사각형 1">
+            <a:extLst>
+              <a:ext uri="{FF2B5EF4-FFF2-40B4-BE49-F238E27FC236}">
+                <a16:creationId xmlns:a16="http://schemas.microsoft.com/office/drawing/2014/main" id="{4B243646-AE74-4F32-89B4-44F988F4C801}"/>
+              </a:ext>
+            </a:extLst>
+          </p:cNvPr>
+          <p:cNvSpPr/>
+          <p:nvPr/>
+        </p:nvSpPr>
+        <p:spPr>
+          <a:xfrm>
+            <a:off x="0" y="0"/>
+            <a:ext cx="18288000" cy="10287000"/>
+          </a:xfrm>
+          <a:prstGeom prst="rect">
+            <a:avLst/>
+          </a:prstGeom>
+          <a:solidFill>
+            <a:srgbClr val="002060"/>
+          </a:solidFill>
+          <a:ln w="25400" cap="flat" cmpd="sng" algn="ctr">
+            <a:noFill/>
+            <a:prstDash val="solid"/>
+          </a:ln>
+          <a:effectLst/>
+        </p:spPr>
+        <p:style>
+          <a:lnRef idx="2">
+            <a:schemeClr val="accent1">
+              <a:shade val="50000"/>
+            </a:schemeClr>
+          </a:lnRef>
+          <a:fillRef idx="1">
+            <a:schemeClr val="accent1"/>
+          </a:fillRef>
+          <a:effectRef idx="0">
+            <a:schemeClr val="accent1"/>
+          </a:effectRef>
+          <a:fontRef idx="minor">
+            <a:schemeClr val="lt1"/>
+          </a:fontRef>
+        </p:style>
+        <p:txBody>
+          <a:bodyPr rtlCol="0" anchor="ctr"/>
+          <a:lstStyle/>
+          <a:p>
+            <a:pPr algn="ctr"/>
+            <a:endParaRPr lang="ko-KR" altLang="en-US"/>
+          </a:p>
+        </p:txBody>
+      </p:sp>
+      <p:sp>
+        <p:nvSpPr>
+          <p:cNvPr id="17" name="TextBox 16">
+            <a:extLst>
+              <a:ext uri="{FF2B5EF4-FFF2-40B4-BE49-F238E27FC236}">
+                <a16:creationId xmlns:a16="http://schemas.microsoft.com/office/drawing/2014/main" id="{993D7C1D-E9C5-40D5-8536-2EBF3B4B6C97}"/>
+              </a:ext>
+            </a:extLst>
+          </p:cNvPr>
+          <p:cNvSpPr txBox="1"/>
+          <p:nvPr/>
+        </p:nvSpPr>
+        <p:spPr>
+          <a:xfrm>
+            <a:off x="5491333" y="4420225"/>
+            <a:ext cx="7305333" cy="1446550"/>
+          </a:xfrm>
+          <a:prstGeom prst="rect">
+            <a:avLst/>
+          </a:prstGeom>
+          <a:noFill/>
+          <a:scene3d>
+            <a:camera prst="perspectiveFront"/>
+            <a:lightRig rig="threePt" dir="t"/>
+          </a:scene3d>
+        </p:spPr>
+        <p:txBody>
+          <a:bodyPr wrap="none" rtlCol="0">
+            <a:spAutoFit/>
+          </a:bodyPr>
+          <a:lstStyle/>
+          <a:p>
+            <a:pPr marL="0" marR="0" lvl="0" indent="0" algn="l" defTabSz="914400" rtl="0" eaLnBrk="1" fontAlgn="auto" latinLnBrk="1" hangingPunct="1">
+              <a:lnSpc>
+                <a:spcPct val="100000"/>
+              </a:lnSpc>
+              <a:spcBef>
+                <a:spcPts val="0"/>
+              </a:spcBef>
+              <a:spcAft>
+                <a:spcPts val="0"/>
+              </a:spcAft>
+              <a:buClrTx/>
+              <a:buSzTx/>
+              <a:buFontTx/>
+              <a:buNone/>
+              <a:tabLst/>
+              <a:defRPr/>
+            </a:pPr>
+            <a:r>
+              <a:rPr kumimoji="0" lang="en-US" altLang="ko-KR" sz="8800" b="0" i="0" u="none" strike="noStrike" kern="1200" cap="none" spc="0" normalizeH="0" baseline="0" noProof="0" dirty="0">
+                <a:ln>
+                  <a:noFill/>
+                </a:ln>
+                <a:solidFill>
+                  <a:prstClr val="white"/>
+                </a:solidFill>
+                <a:effectLst/>
+                <a:uLnTx/>
+                <a:uFillTx/>
+                <a:latin typeface="Franklin Gothic Demi Cond" pitchFamily="34" charset="0"/>
+                <a:ea typeface="Asia견고딕" pitchFamily="2" charset="-127"/>
+                <a:cs typeface="+mn-cs"/>
+              </a:rPr>
+              <a:t>YOUR TEXT HERE</a:t>
+            </a:r>
+            <a:endParaRPr kumimoji="0" lang="ko-KR" altLang="en-US" sz="8800" b="0" i="0" u="none" strike="noStrike" kern="1200" cap="none" spc="0" normalizeH="0" baseline="0" noProof="0" dirty="0">
+              <a:ln>
+                <a:noFill/>
+              </a:ln>
+              <a:solidFill>
+                <a:prstClr val="white"/>
+              </a:solidFill>
+              <a:effectLst/>
+              <a:uLnTx/>
+              <a:uFillTx/>
+              <a:latin typeface="Franklin Gothic Demi Cond" pitchFamily="34" charset="0"/>
+              <a:ea typeface="Asia견고딕" pitchFamily="2" charset="-127"/>
+              <a:cs typeface="+mn-cs"/>
+            </a:endParaRPr>
+          </a:p>
+        </p:txBody>
+      </p:sp>
+    </p:spTree>
+    <p:extLst>
+      <p:ext uri="{BB962C8B-B14F-4D97-AF65-F5344CB8AC3E}">
+        <p14:creationId xmlns:p14="http://schemas.microsoft.com/office/powerpoint/2010/main" val="4228851822"/>
+      </p:ext>
+    </p:extLst>
+  </p:cSld>
+  <p:clrMapOvr>
+    <a:masterClrMapping/>
+  </p:clrMapOvr>
+</p:sld>
+</file>
+
 <file path=ppt/slides/slide2.xml><?xml version="1.0" encoding="utf-8"?>
 <p:sld xmlns:a="http://schemas.openxmlformats.org/drawingml/2006/main" xmlns:r="http://schemas.openxmlformats.org/officeDocument/2006/relationships" xmlns:p="http://schemas.openxmlformats.org/presentationml/2006/main">
   <p:cSld>
@@ -5347,7 +6296,7 @@
           <a:graphicData uri="http://schemas.openxmlformats.org/presentationml/2006/ole">
             <mc:AlternateContent xmlns:mc="http://schemas.openxmlformats.org/markup-compatibility/2006">
               <mc:Choice xmlns:v="urn:schemas-microsoft-com:vml" Requires="v">
-                <p:oleObj spid="_x0000_s1046" name="Image" r:id="rId3" imgW="24380640" imgH="13714200" progId="Photoshop.Image.19">
+                <p:oleObj spid="_x0000_s1050" name="Image" r:id="rId3" imgW="24380640" imgH="13714200" progId="Photoshop.Image.19">
                   <p:embed/>
                 </p:oleObj>
               </mc:Choice>
@@ -5573,6 +6522,14 @@
 <file path=ppt/slides/slide9.xml><?xml version="1.0" encoding="utf-8"?>
 <p:sld xmlns:a="http://schemas.openxmlformats.org/drawingml/2006/main" xmlns:r="http://schemas.openxmlformats.org/officeDocument/2006/relationships" xmlns:p="http://schemas.openxmlformats.org/presentationml/2006/main">
   <p:cSld>
+    <p:bg>
+      <p:bgPr>
+        <a:solidFill>
+          <a:schemeClr val="tx1"/>
+        </a:solidFill>
+        <a:effectLst/>
+      </p:bgPr>
+    </p:bg>
     <p:spTree>
       <p:nvGrpSpPr>
         <p:cNvPr id="1" name=""/>
@@ -5589,74 +6546,14 @@
       </p:grpSpPr>
       <p:sp>
         <p:nvSpPr>
-          <p:cNvPr id="2" name="직사각형 1">
-            <a:extLst>
-              <a:ext uri="{FF2B5EF4-FFF2-40B4-BE49-F238E27FC236}">
-                <a16:creationId xmlns:a16="http://schemas.microsoft.com/office/drawing/2014/main" id="{4B243646-AE74-4F32-89B4-44F988F4C801}"/>
-              </a:ext>
-            </a:extLst>
-          </p:cNvPr>
-          <p:cNvSpPr/>
-          <p:nvPr/>
-        </p:nvSpPr>
-        <p:spPr>
-          <a:xfrm>
-            <a:off x="0" y="0"/>
-            <a:ext cx="18288000" cy="10287000"/>
-          </a:xfrm>
-          <a:prstGeom prst="rect">
-            <a:avLst/>
-          </a:prstGeom>
-          <a:solidFill>
-            <a:srgbClr val="002060"/>
-          </a:solidFill>
-          <a:ln w="25400" cap="flat" cmpd="sng" algn="ctr">
-            <a:noFill/>
-            <a:prstDash val="solid"/>
-          </a:ln>
-          <a:effectLst/>
-        </p:spPr>
-        <p:style>
-          <a:lnRef idx="2">
-            <a:schemeClr val="accent1">
-              <a:shade val="50000"/>
-            </a:schemeClr>
-          </a:lnRef>
-          <a:fillRef idx="1">
-            <a:schemeClr val="accent1"/>
-          </a:fillRef>
-          <a:effectRef idx="0">
-            <a:schemeClr val="accent1"/>
-          </a:effectRef>
-          <a:fontRef idx="minor">
-            <a:schemeClr val="lt1"/>
-          </a:fontRef>
-        </p:style>
-        <p:txBody>
-          <a:bodyPr rtlCol="0" anchor="ctr"/>
-          <a:lstStyle/>
-          <a:p>
-            <a:pPr algn="ctr"/>
-            <a:endParaRPr lang="ko-KR" altLang="en-US"/>
-          </a:p>
-        </p:txBody>
-      </p:sp>
-      <p:sp>
-        <p:nvSpPr>
-          <p:cNvPr id="17" name="TextBox 16">
-            <a:extLst>
-              <a:ext uri="{FF2B5EF4-FFF2-40B4-BE49-F238E27FC236}">
-                <a16:creationId xmlns:a16="http://schemas.microsoft.com/office/drawing/2014/main" id="{993D7C1D-E9C5-40D5-8536-2EBF3B4B6C97}"/>
-              </a:ext>
-            </a:extLst>
-          </p:cNvPr>
+          <p:cNvPr id="2" name="TextBox 1"/>
           <p:cNvSpPr txBox="1"/>
           <p:nvPr/>
         </p:nvSpPr>
         <p:spPr>
           <a:xfrm>
-            <a:off x="5491333" y="4420225"/>
-            <a:ext cx="7305333" cy="1446550"/>
+            <a:off x="1800225" y="7038280"/>
+            <a:ext cx="7152920" cy="2308324"/>
           </a:xfrm>
           <a:prstGeom prst="rect">
             <a:avLst/>
@@ -5691,30 +6588,81 @@
               <a:defRPr/>
             </a:pPr>
             <a:r>
-              <a:rPr kumimoji="0" lang="en-US" altLang="ko-KR" sz="8800" b="0" i="0" u="none" strike="noStrike" kern="1200" cap="none" spc="0" normalizeH="0" baseline="0" noProof="0" dirty="0">
+              <a:rPr kumimoji="0" lang="en-US" altLang="ko-KR" sz="7200" b="0" i="0" u="none" strike="noStrike" kern="1200" cap="none" spc="0" normalizeH="0" baseline="0" noProof="0" dirty="0">
                 <a:ln>
                   <a:noFill/>
                 </a:ln>
                 <a:solidFill>
-                  <a:prstClr val="white"/>
-                </a:solidFill>
-                <a:effectLst/>
+                  <a:srgbClr val="EBEBEB"/>
+                </a:solidFill>
+                <a:effectLst>
+                  <a:glow rad="127000">
+                    <a:prstClr val="black">
+                      <a:lumMod val="75000"/>
+                      <a:lumOff val="25000"/>
+                    </a:prstClr>
+                  </a:glow>
+                </a:effectLst>
                 <a:uLnTx/>
                 <a:uFillTx/>
                 <a:latin typeface="Franklin Gothic Demi Cond" pitchFamily="34" charset="0"/>
                 <a:ea typeface="Asia견고딕" pitchFamily="2" charset="-127"/>
                 <a:cs typeface="+mn-cs"/>
               </a:rPr>
-              <a:t>YOUR TEXT HERE</a:t>
-            </a:r>
-            <a:endParaRPr kumimoji="0" lang="ko-KR" altLang="en-US" sz="8800" b="0" i="0" u="none" strike="noStrike" kern="1200" cap="none" spc="0" normalizeH="0" baseline="0" noProof="0" dirty="0">
+              <a:t>TRANSITION EFFECT</a:t>
+            </a:r>
+          </a:p>
+          <a:p>
+            <a:pPr marL="0" marR="0" lvl="0" indent="0" algn="l" defTabSz="914400" rtl="0" eaLnBrk="1" fontAlgn="auto" latinLnBrk="1" hangingPunct="1">
+              <a:lnSpc>
+                <a:spcPct val="100000"/>
+              </a:lnSpc>
+              <a:spcBef>
+                <a:spcPts val="0"/>
+              </a:spcBef>
+              <a:spcAft>
+                <a:spcPts val="0"/>
+              </a:spcAft>
+              <a:buClrTx/>
+              <a:buSzTx/>
+              <a:buFontTx/>
+              <a:buNone/>
+              <a:tabLst/>
+              <a:defRPr/>
+            </a:pPr>
+            <a:r>
+              <a:rPr lang="en-US" altLang="ko-KR" sz="7200" dirty="0">
+                <a:solidFill>
+                  <a:srgbClr val="EBEBEB"/>
+                </a:solidFill>
+                <a:effectLst>
+                  <a:glow rad="127000">
+                    <a:prstClr val="black">
+                      <a:lumMod val="75000"/>
+                      <a:lumOff val="25000"/>
+                    </a:prstClr>
+                  </a:glow>
+                </a:effectLst>
+                <a:latin typeface="Franklin Gothic Demi Cond" pitchFamily="34" charset="0"/>
+                <a:ea typeface="Asia견고딕" pitchFamily="2" charset="-127"/>
+              </a:rPr>
+              <a:t>TEST 1</a:t>
+            </a:r>
+            <a:endParaRPr kumimoji="0" lang="en-US" altLang="ko-KR" sz="7200" b="0" i="0" u="none" strike="noStrike" kern="1200" cap="none" spc="0" normalizeH="0" baseline="0" noProof="0" dirty="0">
               <a:ln>
                 <a:noFill/>
               </a:ln>
               <a:solidFill>
-                <a:prstClr val="white"/>
+                <a:srgbClr val="EBEBEB"/>
               </a:solidFill>
-              <a:effectLst/>
+              <a:effectLst>
+                <a:glow rad="127000">
+                  <a:prstClr val="black">
+                    <a:lumMod val="75000"/>
+                    <a:lumOff val="25000"/>
+                  </a:prstClr>
+                </a:glow>
+              </a:effectLst>
               <a:uLnTx/>
               <a:uFillTx/>
               <a:latin typeface="Franklin Gothic Demi Cond" pitchFamily="34" charset="0"/>
@@ -5727,13 +6675,25 @@
     </p:spTree>
     <p:extLst>
       <p:ext uri="{BB962C8B-B14F-4D97-AF65-F5344CB8AC3E}">
-        <p14:creationId xmlns:p14="http://schemas.microsoft.com/office/powerpoint/2010/main" val="4228851822"/>
+        <p14:creationId xmlns:p14="http://schemas.microsoft.com/office/powerpoint/2010/main" val="2474355077"/>
       </p:ext>
     </p:extLst>
   </p:cSld>
   <p:clrMapOvr>
     <a:masterClrMapping/>
   </p:clrMapOvr>
+  <mc:AlternateContent xmlns:mc="http://schemas.openxmlformats.org/markup-compatibility/2006">
+    <mc:Choice xmlns:p14="http://schemas.microsoft.com/office/powerpoint/2010/main" Requires="p14">
+      <p:transition spd="med" p14:dur="700">
+        <p:fade/>
+      </p:transition>
+    </mc:Choice>
+    <mc:Fallback>
+      <p:transition spd="med">
+        <p:fade/>
+      </p:transition>
+    </mc:Fallback>
+  </mc:AlternateContent>
 </p:sld>
 </file>
 

</xml_diff>